<commit_message>
changed filenames to match pptx
</commit_message>
<xml_diff>
--- a/Angular 2.pptx
+++ b/Angular 2.pptx
@@ -4295,11 +4295,15 @@
             </a:pPr>
             <a:r>
               <a:rPr lang="en-US" b="1" dirty="0"/>
-              <a:t>name: </a:t>
-            </a:r>
-            <a:r>
-              <a:rPr lang="en-US" dirty="0" err="1" smtClean="0"/>
-              <a:t>myAngularAppName</a:t>
+              <a:t>name</a:t>
+            </a:r>
+            <a:r>
+              <a:rPr lang="en-US" b="1"/>
+              <a:t>: </a:t>
+            </a:r>
+            <a:r>
+              <a:rPr lang="en-US" smtClean="0"/>
+              <a:t>angular2_presenation</a:t>
             </a:r>
             <a:r>
               <a:rPr lang="en-US" dirty="0" smtClean="0"/>
@@ -5344,7 +5348,6 @@
               <a:rPr lang="en-US" sz="2800" dirty="0" smtClean="0"/>
               <a:t>Dart</a:t>
             </a:r>
-            <a:endParaRPr lang="en-US" sz="2800" dirty="0" smtClean="0"/>
           </a:p>
           <a:p>
             <a:pPr marL="0" indent="0">
@@ -5380,7 +5383,6 @@
               <a:rPr lang="en-US" sz="2800" dirty="0" smtClean="0"/>
               <a:t>}</a:t>
             </a:r>
-            <a:endParaRPr lang="en-US" sz="2800" dirty="0" smtClean="0"/>
           </a:p>
           <a:p>
             <a:pPr marL="0" indent="0">

</xml_diff>

<commit_message>
added image and some code cleanup
</commit_message>
<xml_diff>
--- a/Angular 2.pptx
+++ b/Angular 2.pptx
@@ -5780,11 +5780,7 @@
             </a:r>
             <a:r>
               <a:rPr lang="en-US" dirty="0" smtClean="0"/>
-              <a:t> = </a:t>
-            </a:r>
-            <a:r>
-              <a:rPr lang="en-US" dirty="0" smtClean="0"/>
-              <a:t>“Hello Universe”;</a:t>
+              <a:t> = “Hello Universe”;</a:t>
             </a:r>
           </a:p>
           <a:p>
@@ -6316,11 +6312,7 @@
             </a:r>
             <a:r>
               <a:rPr lang="en-US" dirty="0"/>
-              <a:t>=&gt; </a:t>
-            </a:r>
-            <a:r>
-              <a:rPr lang="en-US" dirty="0"/>
-              <a:t>"images/logo.png</a:t>
+              <a:t>=&gt; "images/logo.png</a:t>
             </a:r>
             <a:r>
               <a:rPr lang="en-US" dirty="0" smtClean="0"/>
@@ -6844,11 +6836,7 @@
             </a:pPr>
             <a:r>
               <a:rPr lang="en-US" dirty="0" smtClean="0"/>
-              <a:t>&lt;/</a:t>
-            </a:r>
-            <a:r>
-              <a:rPr lang="en-US" dirty="0" smtClean="0"/>
-              <a:t>button&gt;</a:t>
+              <a:t>&lt;/button&gt;</a:t>
             </a:r>
           </a:p>
         </p:txBody>
@@ -7603,13 +7591,8 @@
             </a:r>
             <a:r>
               <a:rPr lang="en-US" sz="2800" dirty="0" smtClean="0"/>
-              <a:t> </a:t>
-            </a:r>
-            <a:r>
-              <a:rPr lang="en-US" sz="2800" dirty="0" smtClean="0"/>
-              <a:t>= “”;</a:t>
-            </a:r>
-            <a:endParaRPr lang="en-US" sz="2800" dirty="0" smtClean="0"/>
+              <a:t> = “”;</a:t>
+            </a:r>
           </a:p>
           <a:p>
             <a:pPr marL="0" indent="0">
@@ -7645,11 +7628,7 @@
             </a:r>
             <a:r>
               <a:rPr lang="en-US" sz="2800" dirty="0" smtClean="0"/>
-              <a:t>” </a:t>
-            </a:r>
-            <a:r>
-              <a:rPr lang="en-US" sz="2800" dirty="0" smtClean="0"/>
-              <a:t>type=“text”/&gt;</a:t>
+              <a:t>” type=“text”/&gt;</a:t>
             </a:r>
             <a:endParaRPr lang="en-US" sz="2800" dirty="0"/>
           </a:p>
@@ -8231,15 +8210,7 @@
             </a:pPr>
             <a:r>
               <a:rPr lang="en-US" sz="2800" dirty="0" smtClean="0"/>
-              <a:t> </a:t>
-            </a:r>
-            <a:r>
-              <a:rPr lang="en-US" sz="2800" dirty="0" smtClean="0"/>
-              <a:t> Click </a:t>
-            </a:r>
-            <a:r>
-              <a:rPr lang="en-US" sz="2800" dirty="0" smtClean="0"/>
-              <a:t>me</a:t>
+              <a:t>  Click me</a:t>
             </a:r>
           </a:p>
           <a:p>
@@ -10220,17 +10191,8 @@
           <a:p>
             <a:r>
               <a:rPr lang="en-US" dirty="0" smtClean="0"/>
-              <a:t>1</a:t>
-            </a:r>
-            <a:r>
-              <a:rPr lang="en-US" dirty="0" smtClean="0"/>
-              <a:t>. Create Dart </a:t>
-            </a:r>
-            <a:r>
-              <a:rPr lang="en-US" dirty="0" smtClean="0"/>
-              <a:t>file (component)</a:t>
-            </a:r>
-            <a:endParaRPr lang="en-US" dirty="0" smtClean="0"/>
+              <a:t>1. Create Dart file (component)</a:t>
+            </a:r>
           </a:p>
           <a:p>
             <a:r>
@@ -10245,27 +10207,17 @@
               <a:rPr lang="en-US" dirty="0" smtClean="0"/>
               <a:t>, otherwise part of Dart file.)</a:t>
             </a:r>
-            <a:endParaRPr lang="en-US" dirty="0" smtClean="0"/>
           </a:p>
           <a:p>
             <a:r>
               <a:rPr lang="en-US" dirty="0" smtClean="0"/>
-              <a:t>3. Import Dart file into </a:t>
-            </a:r>
+              <a:t>3. Import Dart file into parent component</a:t>
+            </a:r>
+          </a:p>
+          <a:p>
             <a:r>
               <a:rPr lang="en-US" dirty="0" smtClean="0"/>
-              <a:t>parent component</a:t>
-            </a:r>
-            <a:endParaRPr lang="en-US" dirty="0" smtClean="0"/>
-          </a:p>
-          <a:p>
-            <a:r>
-              <a:rPr lang="en-US" dirty="0" smtClean="0"/>
-              <a:t>4. Add to </a:t>
-            </a:r>
-            <a:r>
-              <a:rPr lang="en-US" dirty="0" smtClean="0"/>
-              <a:t>directives:</a:t>
+              <a:t>4. Add to directives:</a:t>
             </a:r>
           </a:p>
           <a:p>
@@ -15239,10 +15191,6 @@
               <a:rPr lang="en-US" dirty="0" smtClean="0"/>
               <a:t>"}</a:t>
             </a:r>
-            <a:r>
-              <a:rPr lang="en-US" dirty="0" smtClean="0"/>
-              <a:t/>
-            </a:r>
             <a:br>
               <a:rPr lang="en-US" dirty="0" smtClean="0"/>
             </a:br>
@@ -15648,11 +15596,7 @@
             </a:br>
             <a:r>
               <a:rPr lang="en-US" dirty="0" smtClean="0"/>
-              <a:t>  </a:t>
-            </a:r>
-            <a:r>
-              <a:rPr lang="en-US" dirty="0" smtClean="0"/>
-              <a:t>String </a:t>
+              <a:t>  String </a:t>
             </a:r>
             <a:r>
               <a:rPr lang="en-US" b="1" dirty="0"/>
@@ -15687,11 +15631,7 @@
             </a:br>
             <a:r>
               <a:rPr lang="en-US" dirty="0" smtClean="0"/>
-              <a:t>  </a:t>
-            </a:r>
-            <a:r>
-              <a:rPr lang="en-US" dirty="0" smtClean="0"/>
-              <a:t>List&lt;Map&gt; </a:t>
+              <a:t>  List&lt;Map&gt; </a:t>
             </a:r>
             <a:r>
               <a:rPr lang="en-US" dirty="0" err="1"/>
@@ -15733,11 +15673,7 @@
             </a:r>
             <a:r>
               <a:rPr lang="en-US" dirty="0" smtClean="0"/>
-              <a:t>() </a:t>
-            </a:r>
-            <a:r>
-              <a:rPr lang="en-US" dirty="0" smtClean="0"/>
-              <a:t>{</a:t>
+              <a:t>() {</a:t>
             </a:r>
           </a:p>
           <a:p>
@@ -15746,11 +15682,7 @@
             </a:pPr>
             <a:r>
               <a:rPr lang="en-US" dirty="0" smtClean="0"/>
-              <a:t>    </a:t>
-            </a:r>
-            <a:r>
-              <a:rPr lang="en-US" dirty="0" smtClean="0"/>
-              <a:t>Future </a:t>
+              <a:t>    Future </a:t>
             </a:r>
             <a:r>
               <a:rPr lang="en-US" dirty="0" err="1" smtClean="0"/>
@@ -15760,7 +15692,6 @@
               <a:rPr lang="en-US" dirty="0" smtClean="0"/>
               <a:t> = </a:t>
             </a:r>
-            <a:endParaRPr lang="en-US" dirty="0" smtClean="0"/>
           </a:p>
           <a:p>
             <a:pPr marL="0" indent="0">
@@ -15792,11 +15723,7 @@
             </a:r>
             <a:r>
               <a:rPr lang="en-US" dirty="0" smtClean="0"/>
-              <a:t>).then((data) </a:t>
-            </a:r>
-            <a:r>
-              <a:rPr lang="en-US" dirty="0" smtClean="0"/>
-              <a:t>{</a:t>
+              <a:t>).then((data) {</a:t>
             </a:r>
           </a:p>
           <a:p>
@@ -15805,11 +15732,7 @@
             </a:pPr>
             <a:r>
               <a:rPr lang="en-US" dirty="0" smtClean="0"/>
-              <a:t>        List&lt;Map</a:t>
-            </a:r>
-            <a:r>
-              <a:rPr lang="en-US" dirty="0" smtClean="0"/>
-              <a:t>&gt; decoded = </a:t>
+              <a:t>        List&lt;Map&gt; decoded = </a:t>
             </a:r>
             <a:r>
               <a:rPr lang="en-US" dirty="0" err="1" smtClean="0"/>
@@ -16720,11 +16643,7 @@
             </a:r>
             <a:r>
               <a:rPr lang="en-US" dirty="0" smtClean="0"/>
-              <a:t> </a:t>
-            </a:r>
-            <a:r>
-              <a:rPr lang="en-US" dirty="0" smtClean="0"/>
-              <a:t>{</a:t>
+              <a:t> {</a:t>
             </a:r>
           </a:p>
           <a:p>
@@ -16792,11 +16711,15 @@
             </a:r>
             <a:r>
               <a:rPr lang="en-US" dirty="0" err="1" smtClean="0"/>
-              <a:t>appServiceData</a:t>
+              <a:t>appService</a:t>
             </a:r>
             <a:r>
               <a:rPr lang="en-US" dirty="0" smtClean="0"/>
-              <a:t>) {</a:t>
+              <a:t>) </a:t>
+            </a:r>
+            <a:r>
+              <a:rPr lang="en-US" dirty="0" smtClean="0"/>
+              <a:t>{</a:t>
             </a:r>
             <a:br>
               <a:rPr lang="en-US" dirty="0" smtClean="0"/>
@@ -16806,8 +16729,8 @@
               <a:t>    </a:t>
             </a:r>
             <a:r>
-              <a:rPr lang="en-US" dirty="0" err="1" smtClean="0"/>
-              <a:t>appServiceData.getData</a:t>
+              <a:rPr lang="en-US" smtClean="0"/>
+              <a:t>appService.getData</a:t>
             </a:r>
             <a:r>
               <a:rPr lang="en-US" dirty="0" smtClean="0"/>

</xml_diff>

<commit_message>
updates from Monty's feedback
</commit_message>
<xml_diff>
--- a/Angular 2.pptx
+++ b/Angular 2.pptx
@@ -4430,246 +4430,441 @@
               <a:buNone/>
             </a:pPr>
             <a:r>
-              <a:rPr lang="en-US" b="1" dirty="0"/>
+              <a:rPr lang="en-US" b="1" dirty="0">
+                <a:latin typeface="Consolas" panose="020B0609020204030204" pitchFamily="49" charset="0"/>
+                <a:cs typeface="Consolas" panose="020B0609020204030204" pitchFamily="49" charset="0"/>
+              </a:rPr>
               <a:t>name: </a:t>
             </a:r>
             <a:r>
-              <a:rPr lang="en-US" dirty="0" smtClean="0"/>
+              <a:rPr lang="en-US" dirty="0" smtClean="0">
+                <a:latin typeface="Consolas" panose="020B0609020204030204" pitchFamily="49" charset="0"/>
+                <a:cs typeface="Consolas" panose="020B0609020204030204" pitchFamily="49" charset="0"/>
+              </a:rPr>
               <a:t>angular2_presenation</a:t>
             </a:r>
             <a:br>
-              <a:rPr lang="en-US" dirty="0" smtClean="0"/>
+              <a:rPr lang="en-US" dirty="0" smtClean="0">
+                <a:latin typeface="Consolas" panose="020B0609020204030204" pitchFamily="49" charset="0"/>
+                <a:cs typeface="Consolas" panose="020B0609020204030204" pitchFamily="49" charset="0"/>
+              </a:rPr>
             </a:br>
             <a:r>
-              <a:rPr lang="en-US" b="1" dirty="0"/>
+              <a:rPr lang="en-US" b="1" dirty="0">
+                <a:latin typeface="Consolas" panose="020B0609020204030204" pitchFamily="49" charset="0"/>
+                <a:cs typeface="Consolas" panose="020B0609020204030204" pitchFamily="49" charset="0"/>
+              </a:rPr>
               <a:t>description: </a:t>
             </a:r>
             <a:r>
-              <a:rPr lang="en-US" dirty="0" smtClean="0"/>
+              <a:rPr lang="en-US" dirty="0" smtClean="0">
+                <a:latin typeface="Consolas" panose="020B0609020204030204" pitchFamily="49" charset="0"/>
+                <a:cs typeface="Consolas" panose="020B0609020204030204" pitchFamily="49" charset="0"/>
+              </a:rPr>
               <a:t>A Dart app that uses Angular 2</a:t>
             </a:r>
             <a:br>
-              <a:rPr lang="en-US" dirty="0" smtClean="0"/>
+              <a:rPr lang="en-US" dirty="0" smtClean="0">
+                <a:latin typeface="Consolas" panose="020B0609020204030204" pitchFamily="49" charset="0"/>
+                <a:cs typeface="Consolas" panose="020B0609020204030204" pitchFamily="49" charset="0"/>
+              </a:rPr>
             </a:br>
             <a:r>
-              <a:rPr lang="en-US" b="1" dirty="0"/>
+              <a:rPr lang="en-US" b="1" dirty="0">
+                <a:latin typeface="Consolas" panose="020B0609020204030204" pitchFamily="49" charset="0"/>
+                <a:cs typeface="Consolas" panose="020B0609020204030204" pitchFamily="49" charset="0"/>
+              </a:rPr>
               <a:t>version: </a:t>
             </a:r>
             <a:r>
-              <a:rPr lang="en-US" dirty="0" smtClean="0"/>
+              <a:rPr lang="en-US" dirty="0" smtClean="0">
+                <a:latin typeface="Consolas" panose="020B0609020204030204" pitchFamily="49" charset="0"/>
+                <a:cs typeface="Consolas" panose="020B0609020204030204" pitchFamily="49" charset="0"/>
+              </a:rPr>
               <a:t>0.0.1</a:t>
             </a:r>
             <a:br>
-              <a:rPr lang="en-US" dirty="0" smtClean="0"/>
+              <a:rPr lang="en-US" dirty="0" smtClean="0">
+                <a:latin typeface="Consolas" panose="020B0609020204030204" pitchFamily="49" charset="0"/>
+                <a:cs typeface="Consolas" panose="020B0609020204030204" pitchFamily="49" charset="0"/>
+              </a:rPr>
             </a:br>
             <a:r>
-              <a:rPr lang="en-US" b="1" dirty="0"/>
+              <a:rPr lang="en-US" b="1" dirty="0">
+                <a:latin typeface="Consolas" panose="020B0609020204030204" pitchFamily="49" charset="0"/>
+                <a:cs typeface="Consolas" panose="020B0609020204030204" pitchFamily="49" charset="0"/>
+              </a:rPr>
               <a:t>environment:</a:t>
             </a:r>
             <a:br>
-              <a:rPr lang="en-US" b="1" dirty="0"/>
+              <a:rPr lang="en-US" b="1" dirty="0">
+                <a:latin typeface="Consolas" panose="020B0609020204030204" pitchFamily="49" charset="0"/>
+                <a:cs typeface="Consolas" panose="020B0609020204030204" pitchFamily="49" charset="0"/>
+              </a:rPr>
             </a:br>
             <a:r>
-              <a:rPr lang="en-US" b="1" dirty="0"/>
+              <a:rPr lang="en-US" b="1" dirty="0">
+                <a:latin typeface="Consolas" panose="020B0609020204030204" pitchFamily="49" charset="0"/>
+                <a:cs typeface="Consolas" panose="020B0609020204030204" pitchFamily="49" charset="0"/>
+              </a:rPr>
               <a:t>  </a:t>
             </a:r>
             <a:r>
-              <a:rPr lang="en-US" b="1" dirty="0" err="1"/>
+              <a:rPr lang="en-US" b="1" dirty="0" err="1">
+                <a:latin typeface="Consolas" panose="020B0609020204030204" pitchFamily="49" charset="0"/>
+                <a:cs typeface="Consolas" panose="020B0609020204030204" pitchFamily="49" charset="0"/>
+              </a:rPr>
               <a:t>sdk</a:t>
             </a:r>
             <a:r>
-              <a:rPr lang="en-US" b="1" dirty="0"/>
+              <a:rPr lang="en-US" b="1" dirty="0">
+                <a:latin typeface="Consolas" panose="020B0609020204030204" pitchFamily="49" charset="0"/>
+                <a:cs typeface="Consolas" panose="020B0609020204030204" pitchFamily="49" charset="0"/>
+              </a:rPr>
               <a:t>: </a:t>
             </a:r>
             <a:r>
-              <a:rPr lang="en-US" dirty="0"/>
+              <a:rPr lang="en-US" dirty="0">
+                <a:latin typeface="Consolas" panose="020B0609020204030204" pitchFamily="49" charset="0"/>
+                <a:cs typeface="Consolas" panose="020B0609020204030204" pitchFamily="49" charset="0"/>
+              </a:rPr>
               <a:t>'&gt;=1.13.0 &lt;2.0.0'</a:t>
             </a:r>
             <a:br>
-              <a:rPr lang="en-US" dirty="0"/>
+              <a:rPr lang="en-US" dirty="0">
+                <a:latin typeface="Consolas" panose="020B0609020204030204" pitchFamily="49" charset="0"/>
+                <a:cs typeface="Consolas" panose="020B0609020204030204" pitchFamily="49" charset="0"/>
+              </a:rPr>
             </a:br>
             <a:r>
-              <a:rPr lang="en-US" b="1" dirty="0"/>
+              <a:rPr lang="en-US" b="1" dirty="0">
+                <a:latin typeface="Consolas" panose="020B0609020204030204" pitchFamily="49" charset="0"/>
+                <a:cs typeface="Consolas" panose="020B0609020204030204" pitchFamily="49" charset="0"/>
+              </a:rPr>
               <a:t>dependencies:</a:t>
             </a:r>
             <a:br>
-              <a:rPr lang="en-US" b="1" dirty="0"/>
+              <a:rPr lang="en-US" b="1" dirty="0">
+                <a:latin typeface="Consolas" panose="020B0609020204030204" pitchFamily="49" charset="0"/>
+                <a:cs typeface="Consolas" panose="020B0609020204030204" pitchFamily="49" charset="0"/>
+              </a:rPr>
             </a:br>
             <a:r>
-              <a:rPr lang="en-US" b="1" dirty="0"/>
+              <a:rPr lang="en-US" b="1" dirty="0">
+                <a:latin typeface="Consolas" panose="020B0609020204030204" pitchFamily="49" charset="0"/>
+                <a:cs typeface="Consolas" panose="020B0609020204030204" pitchFamily="49" charset="0"/>
+              </a:rPr>
               <a:t>  angular2: </a:t>
             </a:r>
             <a:r>
-              <a:rPr lang="en-US" dirty="0" smtClean="0"/>
+              <a:rPr lang="en-US" dirty="0" smtClean="0">
+                <a:latin typeface="Consolas" panose="020B0609020204030204" pitchFamily="49" charset="0"/>
+                <a:cs typeface="Consolas" panose="020B0609020204030204" pitchFamily="49" charset="0"/>
+              </a:rPr>
               <a:t>2.0.0-beta.12</a:t>
             </a:r>
             <a:br>
-              <a:rPr lang="en-US" dirty="0" smtClean="0"/>
+              <a:rPr lang="en-US" dirty="0" smtClean="0">
+                <a:latin typeface="Consolas" panose="020B0609020204030204" pitchFamily="49" charset="0"/>
+                <a:cs typeface="Consolas" panose="020B0609020204030204" pitchFamily="49" charset="0"/>
+              </a:rPr>
             </a:br>
             <a:r>
-              <a:rPr lang="en-US" dirty="0" smtClean="0"/>
+              <a:rPr lang="en-US" dirty="0" smtClean="0">
+                <a:latin typeface="Consolas" panose="020B0609020204030204" pitchFamily="49" charset="0"/>
+                <a:cs typeface="Consolas" panose="020B0609020204030204" pitchFamily="49" charset="0"/>
+              </a:rPr>
               <a:t>  </a:t>
             </a:r>
             <a:r>
-              <a:rPr lang="en-US" b="1" dirty="0"/>
+              <a:rPr lang="en-US" b="1" dirty="0">
+                <a:latin typeface="Consolas" panose="020B0609020204030204" pitchFamily="49" charset="0"/>
+                <a:cs typeface="Consolas" panose="020B0609020204030204" pitchFamily="49" charset="0"/>
+              </a:rPr>
               <a:t>browser: </a:t>
             </a:r>
             <a:r>
-              <a:rPr lang="en-US" dirty="0" smtClean="0"/>
+              <a:rPr lang="en-US" dirty="0" smtClean="0">
+                <a:latin typeface="Consolas" panose="020B0609020204030204" pitchFamily="49" charset="0"/>
+                <a:cs typeface="Consolas" panose="020B0609020204030204" pitchFamily="49" charset="0"/>
+              </a:rPr>
               <a:t>^0.10.0</a:t>
             </a:r>
             <a:br>
-              <a:rPr lang="en-US" dirty="0" smtClean="0"/>
+              <a:rPr lang="en-US" dirty="0" smtClean="0">
+                <a:latin typeface="Consolas" panose="020B0609020204030204" pitchFamily="49" charset="0"/>
+                <a:cs typeface="Consolas" panose="020B0609020204030204" pitchFamily="49" charset="0"/>
+              </a:rPr>
             </a:br>
             <a:r>
-              <a:rPr lang="en-US" dirty="0" smtClean="0"/>
+              <a:rPr lang="en-US" dirty="0" smtClean="0">
+                <a:latin typeface="Consolas" panose="020B0609020204030204" pitchFamily="49" charset="0"/>
+                <a:cs typeface="Consolas" panose="020B0609020204030204" pitchFamily="49" charset="0"/>
+              </a:rPr>
               <a:t>  </a:t>
             </a:r>
             <a:r>
-              <a:rPr lang="en-US" b="1" dirty="0" err="1"/>
+              <a:rPr lang="en-US" b="1" dirty="0" err="1">
+                <a:latin typeface="Consolas" panose="020B0609020204030204" pitchFamily="49" charset="0"/>
+                <a:cs typeface="Consolas" panose="020B0609020204030204" pitchFamily="49" charset="0"/>
+              </a:rPr>
               <a:t>dart_to_js_script_rewriter</a:t>
             </a:r>
             <a:r>
-              <a:rPr lang="en-US" b="1" dirty="0"/>
+              <a:rPr lang="en-US" b="1" dirty="0">
+                <a:latin typeface="Consolas" panose="020B0609020204030204" pitchFamily="49" charset="0"/>
+                <a:cs typeface="Consolas" panose="020B0609020204030204" pitchFamily="49" charset="0"/>
+              </a:rPr>
               <a:t>: </a:t>
             </a:r>
             <a:r>
-              <a:rPr lang="en-US" dirty="0" smtClean="0"/>
+              <a:rPr lang="en-US" dirty="0" smtClean="0">
+                <a:latin typeface="Consolas" panose="020B0609020204030204" pitchFamily="49" charset="0"/>
+                <a:cs typeface="Consolas" panose="020B0609020204030204" pitchFamily="49" charset="0"/>
+              </a:rPr>
               <a:t>^0.1.0</a:t>
             </a:r>
             <a:br>
-              <a:rPr lang="en-US" dirty="0" smtClean="0"/>
+              <a:rPr lang="en-US" dirty="0" smtClean="0">
+                <a:latin typeface="Consolas" panose="020B0609020204030204" pitchFamily="49" charset="0"/>
+                <a:cs typeface="Consolas" panose="020B0609020204030204" pitchFamily="49" charset="0"/>
+              </a:rPr>
             </a:br>
             <a:r>
-              <a:rPr lang="en-US" b="1" dirty="0"/>
+              <a:rPr lang="en-US" b="1" dirty="0">
+                <a:latin typeface="Consolas" panose="020B0609020204030204" pitchFamily="49" charset="0"/>
+                <a:cs typeface="Consolas" panose="020B0609020204030204" pitchFamily="49" charset="0"/>
+              </a:rPr>
               <a:t>transformers:</a:t>
             </a:r>
             <a:br>
-              <a:rPr lang="en-US" b="1" dirty="0"/>
+              <a:rPr lang="en-US" b="1" dirty="0">
+                <a:latin typeface="Consolas" panose="020B0609020204030204" pitchFamily="49" charset="0"/>
+                <a:cs typeface="Consolas" panose="020B0609020204030204" pitchFamily="49" charset="0"/>
+              </a:rPr>
             </a:br>
             <a:r>
-              <a:rPr lang="en-US" dirty="0" smtClean="0"/>
+              <a:rPr lang="en-US" dirty="0" smtClean="0">
+                <a:latin typeface="Consolas" panose="020B0609020204030204" pitchFamily="49" charset="0"/>
+                <a:cs typeface="Consolas" panose="020B0609020204030204" pitchFamily="49" charset="0"/>
+              </a:rPr>
               <a:t>- </a:t>
             </a:r>
             <a:r>
-              <a:rPr lang="en-US" b="1" dirty="0"/>
+              <a:rPr lang="en-US" b="1" dirty="0">
+                <a:latin typeface="Consolas" panose="020B0609020204030204" pitchFamily="49" charset="0"/>
+                <a:cs typeface="Consolas" panose="020B0609020204030204" pitchFamily="49" charset="0"/>
+              </a:rPr>
               <a:t>angular2:</a:t>
             </a:r>
             <a:br>
-              <a:rPr lang="en-US" b="1" dirty="0"/>
+              <a:rPr lang="en-US" b="1" dirty="0">
+                <a:latin typeface="Consolas" panose="020B0609020204030204" pitchFamily="49" charset="0"/>
+                <a:cs typeface="Consolas" panose="020B0609020204030204" pitchFamily="49" charset="0"/>
+              </a:rPr>
             </a:br>
             <a:r>
-              <a:rPr lang="en-US" b="1" dirty="0"/>
+              <a:rPr lang="en-US" b="1" dirty="0">
+                <a:latin typeface="Consolas" panose="020B0609020204030204" pitchFamily="49" charset="0"/>
+                <a:cs typeface="Consolas" panose="020B0609020204030204" pitchFamily="49" charset="0"/>
+              </a:rPr>
               <a:t>    </a:t>
             </a:r>
             <a:r>
-              <a:rPr lang="en-US" b="1" dirty="0" err="1"/>
+              <a:rPr lang="en-US" b="1" dirty="0" err="1">
+                <a:latin typeface="Consolas" panose="020B0609020204030204" pitchFamily="49" charset="0"/>
+                <a:cs typeface="Consolas" panose="020B0609020204030204" pitchFamily="49" charset="0"/>
+              </a:rPr>
               <a:t>platform_directives</a:t>
             </a:r>
             <a:r>
-              <a:rPr lang="en-US" b="1" dirty="0"/>
+              <a:rPr lang="en-US" b="1" dirty="0">
+                <a:latin typeface="Consolas" panose="020B0609020204030204" pitchFamily="49" charset="0"/>
+                <a:cs typeface="Consolas" panose="020B0609020204030204" pitchFamily="49" charset="0"/>
+              </a:rPr>
               <a:t>:</a:t>
             </a:r>
             <a:br>
-              <a:rPr lang="en-US" b="1" dirty="0"/>
+              <a:rPr lang="en-US" b="1" dirty="0">
+                <a:latin typeface="Consolas" panose="020B0609020204030204" pitchFamily="49" charset="0"/>
+                <a:cs typeface="Consolas" panose="020B0609020204030204" pitchFamily="49" charset="0"/>
+              </a:rPr>
             </a:br>
             <a:r>
-              <a:rPr lang="en-US" b="1" dirty="0"/>
+              <a:rPr lang="en-US" b="1" dirty="0">
+                <a:latin typeface="Consolas" panose="020B0609020204030204" pitchFamily="49" charset="0"/>
+                <a:cs typeface="Consolas" panose="020B0609020204030204" pitchFamily="49" charset="0"/>
+              </a:rPr>
               <a:t>    </a:t>
             </a:r>
             <a:r>
-              <a:rPr lang="en-US" dirty="0" smtClean="0"/>
+              <a:rPr lang="en-US" dirty="0" smtClean="0">
+                <a:latin typeface="Consolas" panose="020B0609020204030204" pitchFamily="49" charset="0"/>
+                <a:cs typeface="Consolas" panose="020B0609020204030204" pitchFamily="49" charset="0"/>
+              </a:rPr>
               <a:t>- </a:t>
             </a:r>
             <a:r>
-              <a:rPr lang="en-US" dirty="0"/>
+              <a:rPr lang="en-US" dirty="0">
+                <a:latin typeface="Consolas" panose="020B0609020204030204" pitchFamily="49" charset="0"/>
+                <a:cs typeface="Consolas" panose="020B0609020204030204" pitchFamily="49" charset="0"/>
+              </a:rPr>
               <a:t>'package:angular2/</a:t>
             </a:r>
             <a:r>
-              <a:rPr lang="en-US" dirty="0" err="1"/>
+              <a:rPr lang="en-US" dirty="0" err="1">
+                <a:latin typeface="Consolas" panose="020B0609020204030204" pitchFamily="49" charset="0"/>
+                <a:cs typeface="Consolas" panose="020B0609020204030204" pitchFamily="49" charset="0"/>
+              </a:rPr>
               <a:t>common.dart#COMMON_DIRECTIVES</a:t>
             </a:r>
             <a:r>
-              <a:rPr lang="en-US" dirty="0"/>
+              <a:rPr lang="en-US" dirty="0">
+                <a:latin typeface="Consolas" panose="020B0609020204030204" pitchFamily="49" charset="0"/>
+                <a:cs typeface="Consolas" panose="020B0609020204030204" pitchFamily="49" charset="0"/>
+              </a:rPr>
               <a:t>'</a:t>
             </a:r>
             <a:br>
-              <a:rPr lang="en-US" dirty="0"/>
+              <a:rPr lang="en-US" dirty="0">
+                <a:latin typeface="Consolas" panose="020B0609020204030204" pitchFamily="49" charset="0"/>
+                <a:cs typeface="Consolas" panose="020B0609020204030204" pitchFamily="49" charset="0"/>
+              </a:rPr>
             </a:br>
             <a:r>
-              <a:rPr lang="en-US" dirty="0"/>
+              <a:rPr lang="en-US" dirty="0">
+                <a:latin typeface="Consolas" panose="020B0609020204030204" pitchFamily="49" charset="0"/>
+                <a:cs typeface="Consolas" panose="020B0609020204030204" pitchFamily="49" charset="0"/>
+              </a:rPr>
               <a:t>    </a:t>
             </a:r>
             <a:r>
-              <a:rPr lang="en-US" b="1" dirty="0" err="1"/>
+              <a:rPr lang="en-US" b="1" dirty="0" err="1">
+                <a:latin typeface="Consolas" panose="020B0609020204030204" pitchFamily="49" charset="0"/>
+                <a:cs typeface="Consolas" panose="020B0609020204030204" pitchFamily="49" charset="0"/>
+              </a:rPr>
               <a:t>platform_pipes</a:t>
             </a:r>
             <a:r>
-              <a:rPr lang="en-US" b="1" dirty="0"/>
+              <a:rPr lang="en-US" b="1" dirty="0">
+                <a:latin typeface="Consolas" panose="020B0609020204030204" pitchFamily="49" charset="0"/>
+                <a:cs typeface="Consolas" panose="020B0609020204030204" pitchFamily="49" charset="0"/>
+              </a:rPr>
               <a:t>:</a:t>
             </a:r>
             <a:br>
-              <a:rPr lang="en-US" b="1" dirty="0"/>
+              <a:rPr lang="en-US" b="1" dirty="0">
+                <a:latin typeface="Consolas" panose="020B0609020204030204" pitchFamily="49" charset="0"/>
+                <a:cs typeface="Consolas" panose="020B0609020204030204" pitchFamily="49" charset="0"/>
+              </a:rPr>
             </a:br>
             <a:r>
-              <a:rPr lang="en-US" b="1" dirty="0"/>
+              <a:rPr lang="en-US" b="1" dirty="0">
+                <a:latin typeface="Consolas" panose="020B0609020204030204" pitchFamily="49" charset="0"/>
+                <a:cs typeface="Consolas" panose="020B0609020204030204" pitchFamily="49" charset="0"/>
+              </a:rPr>
               <a:t>    </a:t>
             </a:r>
             <a:r>
-              <a:rPr lang="en-US" dirty="0" smtClean="0"/>
+              <a:rPr lang="en-US" dirty="0" smtClean="0">
+                <a:latin typeface="Consolas" panose="020B0609020204030204" pitchFamily="49" charset="0"/>
+                <a:cs typeface="Consolas" panose="020B0609020204030204" pitchFamily="49" charset="0"/>
+              </a:rPr>
               <a:t>- </a:t>
             </a:r>
             <a:r>
-              <a:rPr lang="en-US" dirty="0"/>
+              <a:rPr lang="en-US" dirty="0">
+                <a:latin typeface="Consolas" panose="020B0609020204030204" pitchFamily="49" charset="0"/>
+                <a:cs typeface="Consolas" panose="020B0609020204030204" pitchFamily="49" charset="0"/>
+              </a:rPr>
               <a:t>'package:angular2/</a:t>
             </a:r>
             <a:r>
-              <a:rPr lang="en-US" dirty="0" err="1"/>
+              <a:rPr lang="en-US" dirty="0" err="1">
+                <a:latin typeface="Consolas" panose="020B0609020204030204" pitchFamily="49" charset="0"/>
+                <a:cs typeface="Consolas" panose="020B0609020204030204" pitchFamily="49" charset="0"/>
+              </a:rPr>
               <a:t>common.dart#COMMON_PIPES</a:t>
             </a:r>
             <a:r>
-              <a:rPr lang="en-US" dirty="0"/>
+              <a:rPr lang="en-US" dirty="0">
+                <a:latin typeface="Consolas" panose="020B0609020204030204" pitchFamily="49" charset="0"/>
+                <a:cs typeface="Consolas" panose="020B0609020204030204" pitchFamily="49" charset="0"/>
+              </a:rPr>
               <a:t>'</a:t>
             </a:r>
             <a:br>
-              <a:rPr lang="en-US" dirty="0"/>
+              <a:rPr lang="en-US" dirty="0">
+                <a:latin typeface="Consolas" panose="020B0609020204030204" pitchFamily="49" charset="0"/>
+                <a:cs typeface="Consolas" panose="020B0609020204030204" pitchFamily="49" charset="0"/>
+              </a:rPr>
             </a:br>
             <a:r>
-              <a:rPr lang="en-US" dirty="0"/>
+              <a:rPr lang="en-US" dirty="0">
+                <a:latin typeface="Consolas" panose="020B0609020204030204" pitchFamily="49" charset="0"/>
+                <a:cs typeface="Consolas" panose="020B0609020204030204" pitchFamily="49" charset="0"/>
+              </a:rPr>
               <a:t>    </a:t>
             </a:r>
             <a:r>
-              <a:rPr lang="en-US" b="1" dirty="0" err="1"/>
+              <a:rPr lang="en-US" b="1" dirty="0" err="1">
+                <a:latin typeface="Consolas" panose="020B0609020204030204" pitchFamily="49" charset="0"/>
+                <a:cs typeface="Consolas" panose="020B0609020204030204" pitchFamily="49" charset="0"/>
+              </a:rPr>
               <a:t>entry_points</a:t>
             </a:r>
             <a:r>
-              <a:rPr lang="en-US" b="1" dirty="0"/>
+              <a:rPr lang="en-US" b="1" dirty="0">
+                <a:latin typeface="Consolas" panose="020B0609020204030204" pitchFamily="49" charset="0"/>
+                <a:cs typeface="Consolas" panose="020B0609020204030204" pitchFamily="49" charset="0"/>
+              </a:rPr>
               <a:t>: </a:t>
             </a:r>
             <a:r>
-              <a:rPr lang="en-US" dirty="0" smtClean="0"/>
+              <a:rPr lang="en-US" dirty="0" smtClean="0">
+                <a:latin typeface="Consolas" panose="020B0609020204030204" pitchFamily="49" charset="0"/>
+                <a:cs typeface="Consolas" panose="020B0609020204030204" pitchFamily="49" charset="0"/>
+              </a:rPr>
               <a:t>web/</a:t>
             </a:r>
             <a:r>
-              <a:rPr lang="en-US" dirty="0" err="1" smtClean="0"/>
+              <a:rPr lang="en-US" dirty="0" err="1" smtClean="0">
+                <a:latin typeface="Consolas" panose="020B0609020204030204" pitchFamily="49" charset="0"/>
+                <a:cs typeface="Consolas" panose="020B0609020204030204" pitchFamily="49" charset="0"/>
+              </a:rPr>
               <a:t>main.dart</a:t>
             </a:r>
             <a:r>
-              <a:rPr lang="en-US" dirty="0" smtClean="0"/>
+              <a:rPr lang="en-US" dirty="0" smtClean="0">
+                <a:latin typeface="Consolas" panose="020B0609020204030204" pitchFamily="49" charset="0"/>
+                <a:cs typeface="Consolas" panose="020B0609020204030204" pitchFamily="49" charset="0"/>
+              </a:rPr>
               <a:t/>
             </a:r>
             <a:br>
-              <a:rPr lang="en-US" dirty="0" smtClean="0"/>
+              <a:rPr lang="en-US" dirty="0" smtClean="0">
+                <a:latin typeface="Consolas" panose="020B0609020204030204" pitchFamily="49" charset="0"/>
+                <a:cs typeface="Consolas" panose="020B0609020204030204" pitchFamily="49" charset="0"/>
+              </a:rPr>
             </a:br>
             <a:r>
-              <a:rPr lang="en-US" dirty="0" smtClean="0"/>
+              <a:rPr lang="en-US" dirty="0" smtClean="0">
+                <a:latin typeface="Consolas" panose="020B0609020204030204" pitchFamily="49" charset="0"/>
+                <a:cs typeface="Consolas" panose="020B0609020204030204" pitchFamily="49" charset="0"/>
+              </a:rPr>
               <a:t>- </a:t>
             </a:r>
             <a:r>
-              <a:rPr lang="en-US" dirty="0" err="1" smtClean="0"/>
+              <a:rPr lang="en-US" dirty="0" err="1" smtClean="0">
+                <a:latin typeface="Consolas" panose="020B0609020204030204" pitchFamily="49" charset="0"/>
+                <a:cs typeface="Consolas" panose="020B0609020204030204" pitchFamily="49" charset="0"/>
+              </a:rPr>
               <a:t>dart_to_js_script_rewriter</a:t>
             </a:r>
-            <a:endParaRPr lang="en-US" dirty="0"/>
+            <a:endParaRPr lang="en-US" dirty="0">
+              <a:latin typeface="Consolas" panose="020B0609020204030204" pitchFamily="49" charset="0"/>
+              <a:cs typeface="Consolas" panose="020B0609020204030204" pitchFamily="49" charset="0"/>
+            </a:endParaRPr>
           </a:p>
         </p:txBody>
       </p:sp>
@@ -5097,41 +5292,69 @@
           <a:lstStyle/>
           <a:p>
             <a:r>
-              <a:rPr lang="en-US" dirty="0" smtClean="0"/>
-              <a:t>{{ }}</a:t>
-            </a:r>
-          </a:p>
-          <a:p>
-            <a:r>
-              <a:rPr lang="en-US" dirty="0" smtClean="0"/>
+              <a:rPr lang="en-US" dirty="0" smtClean="0">
+                <a:latin typeface="Consolas" panose="020B0609020204030204" pitchFamily="49" charset="0"/>
+                <a:cs typeface="Consolas" panose="020B0609020204030204" pitchFamily="49" charset="0"/>
+              </a:rPr>
+              <a:t>{{}}</a:t>
+            </a:r>
+            <a:endParaRPr lang="en-US" dirty="0" smtClean="0">
+              <a:latin typeface="Consolas" panose="020B0609020204030204" pitchFamily="49" charset="0"/>
+              <a:cs typeface="Consolas" panose="020B0609020204030204" pitchFamily="49" charset="0"/>
+            </a:endParaRPr>
+          </a:p>
+          <a:p>
+            <a:r>
+              <a:rPr lang="en-US" dirty="0" smtClean="0">
+                <a:latin typeface="Consolas" panose="020B0609020204030204" pitchFamily="49" charset="0"/>
+                <a:cs typeface="Consolas" panose="020B0609020204030204" pitchFamily="49" charset="0"/>
+              </a:rPr>
               <a:t>[]</a:t>
             </a:r>
           </a:p>
           <a:p>
             <a:r>
-              <a:rPr lang="en-US" dirty="0" smtClean="0"/>
+              <a:rPr lang="en-US" dirty="0" smtClean="0">
+                <a:latin typeface="Consolas" panose="020B0609020204030204" pitchFamily="49" charset="0"/>
+                <a:cs typeface="Consolas" panose="020B0609020204030204" pitchFamily="49" charset="0"/>
+              </a:rPr>
               <a:t>()</a:t>
             </a:r>
           </a:p>
           <a:p>
             <a:r>
-              <a:rPr lang="en-US" dirty="0" smtClean="0"/>
+              <a:rPr lang="en-US" dirty="0" smtClean="0">
+                <a:latin typeface="Consolas" panose="020B0609020204030204" pitchFamily="49" charset="0"/>
+                <a:cs typeface="Consolas" panose="020B0609020204030204" pitchFamily="49" charset="0"/>
+              </a:rPr>
               <a:t>[()]</a:t>
             </a:r>
           </a:p>
           <a:p>
             <a:r>
-              <a:rPr lang="en-US" dirty="0"/>
+              <a:rPr lang="en-US" dirty="0">
+                <a:latin typeface="Consolas" panose="020B0609020204030204" pitchFamily="49" charset="0"/>
+                <a:cs typeface="Consolas" panose="020B0609020204030204" pitchFamily="49" charset="0"/>
+              </a:rPr>
               <a:t>#</a:t>
             </a:r>
-            <a:endParaRPr lang="en-US" dirty="0" smtClean="0"/>
-          </a:p>
-          <a:p>
-            <a:r>
-              <a:rPr lang="en-US" dirty="0" smtClean="0"/>
+            <a:endParaRPr lang="en-US" dirty="0" smtClean="0">
+              <a:latin typeface="Consolas" panose="020B0609020204030204" pitchFamily="49" charset="0"/>
+              <a:cs typeface="Consolas" panose="020B0609020204030204" pitchFamily="49" charset="0"/>
+            </a:endParaRPr>
+          </a:p>
+          <a:p>
+            <a:r>
+              <a:rPr lang="en-US" dirty="0" smtClean="0">
+                <a:latin typeface="Consolas" panose="020B0609020204030204" pitchFamily="49" charset="0"/>
+                <a:cs typeface="Consolas" panose="020B0609020204030204" pitchFamily="49" charset="0"/>
+              </a:rPr>
               <a:t>*</a:t>
             </a:r>
-            <a:endParaRPr lang="en-US" dirty="0"/>
+            <a:endParaRPr lang="en-US" dirty="0">
+              <a:latin typeface="Consolas" panose="020B0609020204030204" pitchFamily="49" charset="0"/>
+              <a:cs typeface="Consolas" panose="020B0609020204030204" pitchFamily="49" charset="0"/>
+            </a:endParaRPr>
           </a:p>
         </p:txBody>
       </p:sp>
@@ -5740,7 +5963,11 @@
           <a:p>
             <a:r>
               <a:rPr lang="en-US" dirty="0" smtClean="0"/>
-              <a:t>{{ }} Basic binding</a:t>
+              <a:t>{{}} </a:t>
+            </a:r>
+            <a:r>
+              <a:rPr lang="en-US" dirty="0" smtClean="0"/>
+              <a:t>Basic binding</a:t>
             </a:r>
             <a:endParaRPr lang="en-US" dirty="0"/>
           </a:p>
@@ -5771,15 +5998,24 @@
               <a:buNone/>
             </a:pPr>
             <a:r>
-              <a:rPr lang="en-US" dirty="0" smtClean="0"/>
+              <a:rPr lang="en-US" sz="2800" dirty="0" smtClean="0">
+                <a:latin typeface="Consolas" panose="020B0609020204030204" pitchFamily="49" charset="0"/>
+                <a:cs typeface="Consolas" panose="020B0609020204030204" pitchFamily="49" charset="0"/>
+              </a:rPr>
               <a:t>String </a:t>
             </a:r>
             <a:r>
-              <a:rPr lang="en-US" dirty="0" err="1" smtClean="0"/>
+              <a:rPr lang="en-US" sz="2800" dirty="0" err="1" smtClean="0">
+                <a:latin typeface="Consolas" panose="020B0609020204030204" pitchFamily="49" charset="0"/>
+                <a:cs typeface="Consolas" panose="020B0609020204030204" pitchFamily="49" charset="0"/>
+              </a:rPr>
               <a:t>myString</a:t>
             </a:r>
             <a:r>
-              <a:rPr lang="en-US" dirty="0" smtClean="0"/>
+              <a:rPr lang="en-US" sz="2800" dirty="0" smtClean="0">
+                <a:latin typeface="Consolas" panose="020B0609020204030204" pitchFamily="49" charset="0"/>
+                <a:cs typeface="Consolas" panose="020B0609020204030204" pitchFamily="49" charset="0"/>
+              </a:rPr>
               <a:t> = “Hello Universe”;</a:t>
             </a:r>
           </a:p>
@@ -5800,18 +6036,30 @@
               <a:buNone/>
             </a:pPr>
             <a:r>
-              <a:rPr lang="en-US" dirty="0" smtClean="0"/>
-              <a:t>{{ </a:t>
-            </a:r>
-            <a:r>
-              <a:rPr lang="en-US" dirty="0" err="1" smtClean="0"/>
+              <a:rPr lang="en-US" sz="2800" dirty="0" smtClean="0">
+                <a:latin typeface="Consolas" panose="020B0609020204030204" pitchFamily="49" charset="0"/>
+                <a:cs typeface="Consolas" panose="020B0609020204030204" pitchFamily="49" charset="0"/>
+              </a:rPr>
+              <a:t>{{</a:t>
+            </a:r>
+            <a:r>
+              <a:rPr lang="en-US" sz="2800" dirty="0" err="1" smtClean="0">
+                <a:latin typeface="Consolas" panose="020B0609020204030204" pitchFamily="49" charset="0"/>
+                <a:cs typeface="Consolas" panose="020B0609020204030204" pitchFamily="49" charset="0"/>
+              </a:rPr>
               <a:t>myVar</a:t>
             </a:r>
             <a:r>
-              <a:rPr lang="en-US" dirty="0" smtClean="0"/>
-              <a:t> }}</a:t>
-            </a:r>
-            <a:endParaRPr lang="en-US" dirty="0"/>
+              <a:rPr lang="en-US" sz="2800" dirty="0" smtClean="0">
+                <a:latin typeface="Consolas" panose="020B0609020204030204" pitchFamily="49" charset="0"/>
+                <a:cs typeface="Consolas" panose="020B0609020204030204" pitchFamily="49" charset="0"/>
+              </a:rPr>
+              <a:t>}}</a:t>
+            </a:r>
+            <a:endParaRPr lang="en-US" sz="2800" dirty="0">
+              <a:latin typeface="Consolas" panose="020B0609020204030204" pitchFamily="49" charset="0"/>
+              <a:cs typeface="Consolas" panose="020B0609020204030204" pitchFamily="49" charset="0"/>
+            </a:endParaRPr>
           </a:p>
         </p:txBody>
       </p:sp>
@@ -6299,23 +6547,38 @@
               <a:buNone/>
             </a:pPr>
             <a:r>
-              <a:rPr lang="en-US" dirty="0" smtClean="0"/>
+              <a:rPr lang="en-US" sz="2400" dirty="0" smtClean="0">
+                <a:latin typeface="Consolas" panose="020B0609020204030204" pitchFamily="49" charset="0"/>
+                <a:cs typeface="Consolas" panose="020B0609020204030204" pitchFamily="49" charset="0"/>
+              </a:rPr>
               <a:t>String get </a:t>
             </a:r>
             <a:r>
-              <a:rPr lang="en-US" dirty="0" err="1" smtClean="0"/>
+              <a:rPr lang="en-US" sz="2400" dirty="0" err="1" smtClean="0">
+                <a:latin typeface="Consolas" panose="020B0609020204030204" pitchFamily="49" charset="0"/>
+                <a:cs typeface="Consolas" panose="020B0609020204030204" pitchFamily="49" charset="0"/>
+              </a:rPr>
               <a:t>mySrc</a:t>
             </a:r>
             <a:r>
-              <a:rPr lang="en-US" dirty="0" smtClean="0"/>
+              <a:rPr lang="en-US" sz="2400" dirty="0" smtClean="0">
+                <a:latin typeface="Consolas" panose="020B0609020204030204" pitchFamily="49" charset="0"/>
+                <a:cs typeface="Consolas" panose="020B0609020204030204" pitchFamily="49" charset="0"/>
+              </a:rPr>
               <a:t> </a:t>
             </a:r>
             <a:r>
-              <a:rPr lang="en-US" dirty="0"/>
+              <a:rPr lang="en-US" sz="2400" dirty="0">
+                <a:latin typeface="Consolas" panose="020B0609020204030204" pitchFamily="49" charset="0"/>
+                <a:cs typeface="Consolas" panose="020B0609020204030204" pitchFamily="49" charset="0"/>
+              </a:rPr>
               <a:t>=&gt; "images/logo.png</a:t>
             </a:r>
             <a:r>
-              <a:rPr lang="en-US" dirty="0" smtClean="0"/>
+              <a:rPr lang="en-US" sz="2400" dirty="0" smtClean="0">
+                <a:latin typeface="Consolas" panose="020B0609020204030204" pitchFamily="49" charset="0"/>
+                <a:cs typeface="Consolas" panose="020B0609020204030204" pitchFamily="49" charset="0"/>
+              </a:rPr>
               <a:t>";</a:t>
             </a:r>
           </a:p>
@@ -6336,31 +6599,52 @@
               <a:buNone/>
             </a:pPr>
             <a:r>
-              <a:rPr lang="en-US" dirty="0" smtClean="0"/>
+              <a:rPr lang="en-US" sz="2400" dirty="0" smtClean="0">
+                <a:latin typeface="Consolas" panose="020B0609020204030204" pitchFamily="49" charset="0"/>
+                <a:cs typeface="Consolas" panose="020B0609020204030204" pitchFamily="49" charset="0"/>
+              </a:rPr>
               <a:t>&lt;</a:t>
             </a:r>
             <a:r>
-              <a:rPr lang="en-US" dirty="0" err="1" smtClean="0"/>
+              <a:rPr lang="en-US" sz="2400" dirty="0" err="1" smtClean="0">
+                <a:latin typeface="Consolas" panose="020B0609020204030204" pitchFamily="49" charset="0"/>
+                <a:cs typeface="Consolas" panose="020B0609020204030204" pitchFamily="49" charset="0"/>
+              </a:rPr>
               <a:t>img</a:t>
             </a:r>
             <a:r>
-              <a:rPr lang="en-US" dirty="0" smtClean="0"/>
+              <a:rPr lang="en-US" sz="2400" dirty="0" smtClean="0">
+                <a:latin typeface="Consolas" panose="020B0609020204030204" pitchFamily="49" charset="0"/>
+                <a:cs typeface="Consolas" panose="020B0609020204030204" pitchFamily="49" charset="0"/>
+              </a:rPr>
               <a:t> [</a:t>
             </a:r>
             <a:r>
-              <a:rPr lang="en-US" dirty="0" err="1" smtClean="0"/>
+              <a:rPr lang="en-US" sz="2400" dirty="0" err="1" smtClean="0">
+                <a:latin typeface="Consolas" panose="020B0609020204030204" pitchFamily="49" charset="0"/>
+                <a:cs typeface="Consolas" panose="020B0609020204030204" pitchFamily="49" charset="0"/>
+              </a:rPr>
               <a:t>src</a:t>
             </a:r>
             <a:r>
-              <a:rPr lang="en-US" dirty="0" smtClean="0"/>
+              <a:rPr lang="en-US" sz="2400" dirty="0" smtClean="0">
+                <a:latin typeface="Consolas" panose="020B0609020204030204" pitchFamily="49" charset="0"/>
+                <a:cs typeface="Consolas" panose="020B0609020204030204" pitchFamily="49" charset="0"/>
+              </a:rPr>
               <a:t>]=“</a:t>
             </a:r>
             <a:r>
-              <a:rPr lang="en-US" dirty="0" err="1" smtClean="0"/>
+              <a:rPr lang="en-US" sz="2400" dirty="0" err="1" smtClean="0">
+                <a:latin typeface="Consolas" panose="020B0609020204030204" pitchFamily="49" charset="0"/>
+                <a:cs typeface="Consolas" panose="020B0609020204030204" pitchFamily="49" charset="0"/>
+              </a:rPr>
               <a:t>mySrc</a:t>
             </a:r>
             <a:r>
-              <a:rPr lang="en-US" dirty="0" smtClean="0"/>
+              <a:rPr lang="en-US" sz="2400" dirty="0" smtClean="0">
+                <a:latin typeface="Consolas" panose="020B0609020204030204" pitchFamily="49" charset="0"/>
+                <a:cs typeface="Consolas" panose="020B0609020204030204" pitchFamily="49" charset="0"/>
+              </a:rPr>
               <a:t>”/&gt;</a:t>
             </a:r>
           </a:p>
@@ -6758,7 +7042,9 @@
         </p:nvSpPr>
         <p:spPr/>
         <p:txBody>
-          <a:bodyPr/>
+          <a:bodyPr>
+            <a:normAutofit/>
+          </a:bodyPr>
           <a:lstStyle/>
           <a:p>
             <a:r>
@@ -6771,15 +7057,24 @@
               <a:buNone/>
             </a:pPr>
             <a:r>
-              <a:rPr lang="en-US" dirty="0" smtClean="0"/>
+              <a:rPr lang="en-US" sz="2800" dirty="0" smtClean="0">
+                <a:latin typeface="Consolas" panose="020B0609020204030204" pitchFamily="49" charset="0"/>
+                <a:cs typeface="Consolas" panose="020B0609020204030204" pitchFamily="49" charset="0"/>
+              </a:rPr>
               <a:t>void </a:t>
             </a:r>
             <a:r>
-              <a:rPr lang="en-US" dirty="0" err="1" smtClean="0"/>
+              <a:rPr lang="en-US" sz="2800" dirty="0" err="1" smtClean="0">
+                <a:latin typeface="Consolas" panose="020B0609020204030204" pitchFamily="49" charset="0"/>
+                <a:cs typeface="Consolas" panose="020B0609020204030204" pitchFamily="49" charset="0"/>
+              </a:rPr>
               <a:t>handleClickEvent</a:t>
             </a:r>
             <a:r>
-              <a:rPr lang="en-US" dirty="0" smtClean="0"/>
+              <a:rPr lang="en-US" sz="2800" dirty="0" smtClean="0">
+                <a:latin typeface="Consolas" panose="020B0609020204030204" pitchFamily="49" charset="0"/>
+                <a:cs typeface="Consolas" panose="020B0609020204030204" pitchFamily="49" charset="0"/>
+              </a:rPr>
               <a:t>() {</a:t>
             </a:r>
           </a:p>
@@ -6788,7 +7083,10 @@
               <a:buNone/>
             </a:pPr>
             <a:r>
-              <a:rPr lang="en-US" dirty="0" smtClean="0"/>
+              <a:rPr lang="en-US" sz="2800" dirty="0" smtClean="0">
+                <a:latin typeface="Consolas" panose="020B0609020204030204" pitchFamily="49" charset="0"/>
+                <a:cs typeface="Consolas" panose="020B0609020204030204" pitchFamily="49" charset="0"/>
+              </a:rPr>
               <a:t>  print(“You clicked it”);</a:t>
             </a:r>
           </a:p>
@@ -6797,7 +7095,10 @@
               <a:buNone/>
             </a:pPr>
             <a:r>
-              <a:rPr lang="en-US" dirty="0" smtClean="0"/>
+              <a:rPr lang="en-US" sz="2800" dirty="0" smtClean="0">
+                <a:latin typeface="Consolas" panose="020B0609020204030204" pitchFamily="49" charset="0"/>
+                <a:cs typeface="Consolas" panose="020B0609020204030204" pitchFamily="49" charset="0"/>
+              </a:rPr>
               <a:t>}</a:t>
             </a:r>
           </a:p>
@@ -6818,15 +7119,24 @@
               <a:buNone/>
             </a:pPr>
             <a:r>
-              <a:rPr lang="en-US" dirty="0" smtClean="0"/>
+              <a:rPr lang="en-US" sz="2800" dirty="0" smtClean="0">
+                <a:latin typeface="Consolas" panose="020B0609020204030204" pitchFamily="49" charset="0"/>
+                <a:cs typeface="Consolas" panose="020B0609020204030204" pitchFamily="49" charset="0"/>
+              </a:rPr>
               <a:t>&lt;button (click)=“</a:t>
             </a:r>
             <a:r>
-              <a:rPr lang="en-US" dirty="0" err="1" smtClean="0"/>
+              <a:rPr lang="en-US" sz="2800" dirty="0" err="1" smtClean="0">
+                <a:latin typeface="Consolas" panose="020B0609020204030204" pitchFamily="49" charset="0"/>
+                <a:cs typeface="Consolas" panose="020B0609020204030204" pitchFamily="49" charset="0"/>
+              </a:rPr>
               <a:t>handleClickEvent</a:t>
             </a:r>
             <a:r>
-              <a:rPr lang="en-US" dirty="0" smtClean="0"/>
+              <a:rPr lang="en-US" sz="2800" dirty="0" smtClean="0">
+                <a:latin typeface="Consolas" panose="020B0609020204030204" pitchFamily="49" charset="0"/>
+                <a:cs typeface="Consolas" panose="020B0609020204030204" pitchFamily="49" charset="0"/>
+              </a:rPr>
               <a:t>()”&gt;</a:t>
             </a:r>
           </a:p>
@@ -6835,7 +7145,10 @@
               <a:buNone/>
             </a:pPr>
             <a:r>
-              <a:rPr lang="en-US" dirty="0" smtClean="0"/>
+              <a:rPr lang="en-US" sz="2800" dirty="0" smtClean="0">
+                <a:latin typeface="Consolas" panose="020B0609020204030204" pitchFamily="49" charset="0"/>
+                <a:cs typeface="Consolas" panose="020B0609020204030204" pitchFamily="49" charset="0"/>
+              </a:rPr>
               <a:t>&lt;/button&gt;</a:t>
             </a:r>
           </a:p>
@@ -7582,17 +7895,37 @@
               <a:buNone/>
             </a:pPr>
             <a:r>
-              <a:rPr lang="en-US" sz="2800" dirty="0" smtClean="0"/>
+              <a:rPr lang="en-US" sz="2800" dirty="0" smtClean="0">
+                <a:latin typeface="Consolas" panose="020B0609020204030204" pitchFamily="49" charset="0"/>
+                <a:cs typeface="Consolas" panose="020B0609020204030204" pitchFamily="49" charset="0"/>
+              </a:rPr>
               <a:t>String </a:t>
             </a:r>
             <a:r>
-              <a:rPr lang="en-US" sz="2800" dirty="0" err="1" smtClean="0"/>
+              <a:rPr lang="en-US" sz="2800" dirty="0" err="1" smtClean="0">
+                <a:latin typeface="Consolas" panose="020B0609020204030204" pitchFamily="49" charset="0"/>
+                <a:cs typeface="Consolas" panose="020B0609020204030204" pitchFamily="49" charset="0"/>
+              </a:rPr>
               <a:t>myData</a:t>
             </a:r>
             <a:r>
-              <a:rPr lang="en-US" sz="2800" dirty="0" smtClean="0"/>
-              <a:t> = “”;</a:t>
-            </a:r>
+              <a:rPr lang="en-US" sz="2800" dirty="0" smtClean="0">
+                <a:latin typeface="Consolas" panose="020B0609020204030204" pitchFamily="49" charset="0"/>
+                <a:cs typeface="Consolas" panose="020B0609020204030204" pitchFamily="49" charset="0"/>
+              </a:rPr>
+              <a:t> = </a:t>
+            </a:r>
+            <a:r>
+              <a:rPr lang="en-US" sz="2800" dirty="0" smtClean="0">
+                <a:latin typeface="Consolas" panose="020B0609020204030204" pitchFamily="49" charset="0"/>
+                <a:cs typeface="Consolas" panose="020B0609020204030204" pitchFamily="49" charset="0"/>
+              </a:rPr>
+              <a:t>“”;</a:t>
+            </a:r>
+            <a:endParaRPr lang="en-US" sz="2800" dirty="0" smtClean="0">
+              <a:latin typeface="Consolas" panose="020B0609020204030204" pitchFamily="49" charset="0"/>
+              <a:cs typeface="Consolas" panose="020B0609020204030204" pitchFamily="49" charset="0"/>
+            </a:endParaRPr>
           </a:p>
           <a:p>
             <a:pPr marL="0" indent="0">
@@ -7611,26 +7944,44 @@
               <a:buNone/>
             </a:pPr>
             <a:r>
-              <a:rPr lang="en-US" sz="2800" dirty="0" smtClean="0"/>
+              <a:rPr lang="en-US" sz="2800" dirty="0" smtClean="0">
+                <a:latin typeface="Consolas" panose="020B0609020204030204" pitchFamily="49" charset="0"/>
+                <a:cs typeface="Consolas" panose="020B0609020204030204" pitchFamily="49" charset="0"/>
+              </a:rPr>
               <a:t>&lt;input [(</a:t>
             </a:r>
             <a:r>
-              <a:rPr lang="en-US" sz="2800" dirty="0" err="1" smtClean="0"/>
+              <a:rPr lang="en-US" sz="2800" dirty="0" err="1" smtClean="0">
+                <a:latin typeface="Consolas" panose="020B0609020204030204" pitchFamily="49" charset="0"/>
+                <a:cs typeface="Consolas" panose="020B0609020204030204" pitchFamily="49" charset="0"/>
+              </a:rPr>
               <a:t>ngModel</a:t>
             </a:r>
             <a:r>
-              <a:rPr lang="en-US" sz="2800" dirty="0" smtClean="0"/>
+              <a:rPr lang="en-US" sz="2800" dirty="0" smtClean="0">
+                <a:latin typeface="Consolas" panose="020B0609020204030204" pitchFamily="49" charset="0"/>
+                <a:cs typeface="Consolas" panose="020B0609020204030204" pitchFamily="49" charset="0"/>
+              </a:rPr>
               <a:t>)]=“</a:t>
             </a:r>
             <a:r>
-              <a:rPr lang="en-US" sz="2800" dirty="0" err="1" smtClean="0"/>
+              <a:rPr lang="en-US" sz="2800" dirty="0" err="1" smtClean="0">
+                <a:latin typeface="Consolas" panose="020B0609020204030204" pitchFamily="49" charset="0"/>
+                <a:cs typeface="Consolas" panose="020B0609020204030204" pitchFamily="49" charset="0"/>
+              </a:rPr>
               <a:t>myData</a:t>
             </a:r>
             <a:r>
-              <a:rPr lang="en-US" sz="2800" dirty="0" smtClean="0"/>
+              <a:rPr lang="en-US" sz="2800" dirty="0" smtClean="0">
+                <a:latin typeface="Consolas" panose="020B0609020204030204" pitchFamily="49" charset="0"/>
+                <a:cs typeface="Consolas" panose="020B0609020204030204" pitchFamily="49" charset="0"/>
+              </a:rPr>
               <a:t>” type=“text”/&gt;</a:t>
             </a:r>
-            <a:endParaRPr lang="en-US" sz="2800" dirty="0"/>
+            <a:endParaRPr lang="en-US" sz="2800" dirty="0">
+              <a:latin typeface="Consolas" panose="020B0609020204030204" pitchFamily="49" charset="0"/>
+              <a:cs typeface="Consolas" panose="020B0609020204030204" pitchFamily="49" charset="0"/>
+            </a:endParaRPr>
           </a:p>
         </p:txBody>
       </p:sp>
@@ -8120,15 +8471,24 @@
               <a:buNone/>
             </a:pPr>
             <a:r>
-              <a:rPr lang="en-US" sz="2800" dirty="0" smtClean="0"/>
+              <a:rPr lang="en-US" sz="2600" dirty="0" smtClean="0">
+                <a:latin typeface="Consolas" panose="020B0609020204030204" pitchFamily="49" charset="0"/>
+                <a:cs typeface="Consolas" panose="020B0609020204030204" pitchFamily="49" charset="0"/>
+              </a:rPr>
               <a:t>void </a:t>
             </a:r>
             <a:r>
-              <a:rPr lang="en-US" sz="2800" dirty="0" err="1" smtClean="0"/>
+              <a:rPr lang="en-US" sz="2600" dirty="0" err="1" smtClean="0">
+                <a:latin typeface="Consolas" panose="020B0609020204030204" pitchFamily="49" charset="0"/>
+                <a:cs typeface="Consolas" panose="020B0609020204030204" pitchFamily="49" charset="0"/>
+              </a:rPr>
               <a:t>handleClickEvent</a:t>
             </a:r>
             <a:r>
-              <a:rPr lang="en-US" sz="2800" dirty="0" smtClean="0"/>
+              <a:rPr lang="en-US" sz="2600" dirty="0" smtClean="0">
+                <a:latin typeface="Consolas" panose="020B0609020204030204" pitchFamily="49" charset="0"/>
+                <a:cs typeface="Consolas" panose="020B0609020204030204" pitchFamily="49" charset="0"/>
+              </a:rPr>
               <a:t>(data) {</a:t>
             </a:r>
           </a:p>
@@ -8137,7 +8497,10 @@
               <a:buNone/>
             </a:pPr>
             <a:r>
-              <a:rPr lang="en-US" sz="2800" dirty="0" smtClean="0"/>
+              <a:rPr lang="en-US" sz="2600" dirty="0" smtClean="0">
+                <a:latin typeface="Consolas" panose="020B0609020204030204" pitchFamily="49" charset="0"/>
+                <a:cs typeface="Consolas" panose="020B0609020204030204" pitchFamily="49" charset="0"/>
+              </a:rPr>
               <a:t>  print(“Your data is $data”);</a:t>
             </a:r>
           </a:p>
@@ -8146,7 +8509,10 @@
               <a:buNone/>
             </a:pPr>
             <a:r>
-              <a:rPr lang="en-US" sz="2800" dirty="0" smtClean="0"/>
+              <a:rPr lang="en-US" sz="2600" dirty="0" smtClean="0">
+                <a:latin typeface="Consolas" panose="020B0609020204030204" pitchFamily="49" charset="0"/>
+                <a:cs typeface="Consolas" panose="020B0609020204030204" pitchFamily="49" charset="0"/>
+              </a:rPr>
               <a:t>}</a:t>
             </a:r>
           </a:p>
@@ -8167,15 +8533,24 @@
               <a:buNone/>
             </a:pPr>
             <a:r>
-              <a:rPr lang="en-US" sz="2800" dirty="0" smtClean="0"/>
+              <a:rPr lang="en-US" sz="2600" dirty="0" smtClean="0">
+                <a:latin typeface="Consolas" panose="020B0609020204030204" pitchFamily="49" charset="0"/>
+                <a:cs typeface="Consolas" panose="020B0609020204030204" pitchFamily="49" charset="0"/>
+              </a:rPr>
               <a:t>&lt;input #</a:t>
             </a:r>
             <a:r>
-              <a:rPr lang="en-US" sz="2800" dirty="0" err="1" smtClean="0"/>
+              <a:rPr lang="en-US" sz="2600" dirty="0" err="1" smtClean="0">
+                <a:latin typeface="Consolas" panose="020B0609020204030204" pitchFamily="49" charset="0"/>
+                <a:cs typeface="Consolas" panose="020B0609020204030204" pitchFamily="49" charset="0"/>
+              </a:rPr>
               <a:t>myInput</a:t>
             </a:r>
             <a:r>
-              <a:rPr lang="en-US" sz="2800" dirty="0" smtClean="0"/>
+              <a:rPr lang="en-US" sz="2600" dirty="0" smtClean="0">
+                <a:latin typeface="Consolas" panose="020B0609020204030204" pitchFamily="49" charset="0"/>
+                <a:cs typeface="Consolas" panose="020B0609020204030204" pitchFamily="49" charset="0"/>
+              </a:rPr>
               <a:t> type=“text”/&gt;</a:t>
             </a:r>
           </a:p>
@@ -8184,23 +8559,38 @@
               <a:buNone/>
             </a:pPr>
             <a:r>
-              <a:rPr lang="en-US" sz="2800" dirty="0" smtClean="0"/>
+              <a:rPr lang="en-US" sz="2600" dirty="0" smtClean="0">
+                <a:latin typeface="Consolas" panose="020B0609020204030204" pitchFamily="49" charset="0"/>
+                <a:cs typeface="Consolas" panose="020B0609020204030204" pitchFamily="49" charset="0"/>
+              </a:rPr>
               <a:t>&lt;button (click)=“</a:t>
             </a:r>
             <a:r>
-              <a:rPr lang="en-US" sz="2800" dirty="0" err="1" smtClean="0"/>
+              <a:rPr lang="en-US" sz="2600" dirty="0" err="1" smtClean="0">
+                <a:latin typeface="Consolas" panose="020B0609020204030204" pitchFamily="49" charset="0"/>
+                <a:cs typeface="Consolas" panose="020B0609020204030204" pitchFamily="49" charset="0"/>
+              </a:rPr>
               <a:t>handleClickEvent</a:t>
             </a:r>
             <a:r>
-              <a:rPr lang="en-US" sz="2800" dirty="0" smtClean="0"/>
+              <a:rPr lang="en-US" sz="2600" dirty="0" smtClean="0">
+                <a:latin typeface="Consolas" panose="020B0609020204030204" pitchFamily="49" charset="0"/>
+                <a:cs typeface="Consolas" panose="020B0609020204030204" pitchFamily="49" charset="0"/>
+              </a:rPr>
               <a:t>(</a:t>
             </a:r>
             <a:r>
-              <a:rPr lang="en-US" sz="2800" dirty="0" err="1" smtClean="0"/>
+              <a:rPr lang="en-US" sz="2600" dirty="0" err="1" smtClean="0">
+                <a:latin typeface="Consolas" panose="020B0609020204030204" pitchFamily="49" charset="0"/>
+                <a:cs typeface="Consolas" panose="020B0609020204030204" pitchFamily="49" charset="0"/>
+              </a:rPr>
               <a:t>myInput</a:t>
             </a:r>
             <a:r>
-              <a:rPr lang="en-US" sz="2800" dirty="0" smtClean="0"/>
+              <a:rPr lang="en-US" sz="2600" dirty="0" smtClean="0">
+                <a:latin typeface="Consolas" panose="020B0609020204030204" pitchFamily="49" charset="0"/>
+                <a:cs typeface="Consolas" panose="020B0609020204030204" pitchFamily="49" charset="0"/>
+              </a:rPr>
               <a:t>)&gt;</a:t>
             </a:r>
           </a:p>
@@ -8209,7 +8599,10 @@
               <a:buNone/>
             </a:pPr>
             <a:r>
-              <a:rPr lang="en-US" sz="2800" dirty="0" smtClean="0"/>
+              <a:rPr lang="en-US" sz="2600" dirty="0" smtClean="0">
+                <a:latin typeface="Consolas" panose="020B0609020204030204" pitchFamily="49" charset="0"/>
+                <a:cs typeface="Consolas" panose="020B0609020204030204" pitchFamily="49" charset="0"/>
+              </a:rPr>
               <a:t>  Click me</a:t>
             </a:r>
           </a:p>
@@ -8218,10 +8611,16 @@
               <a:buNone/>
             </a:pPr>
             <a:r>
-              <a:rPr lang="en-US" sz="2800" dirty="0" smtClean="0"/>
+              <a:rPr lang="en-US" sz="2600" dirty="0" smtClean="0">
+                <a:latin typeface="Consolas" panose="020B0609020204030204" pitchFamily="49" charset="0"/>
+                <a:cs typeface="Consolas" panose="020B0609020204030204" pitchFamily="49" charset="0"/>
+              </a:rPr>
               <a:t>&lt;/button&gt;</a:t>
             </a:r>
-            <a:endParaRPr lang="en-US" sz="2800" dirty="0"/>
+            <a:endParaRPr lang="en-US" sz="2600" dirty="0">
+              <a:latin typeface="Consolas" panose="020B0609020204030204" pitchFamily="49" charset="0"/>
+              <a:cs typeface="Consolas" panose="020B0609020204030204" pitchFamily="49" charset="0"/>
+            </a:endParaRPr>
           </a:p>
         </p:txBody>
       </p:sp>
@@ -9136,15 +9535,24 @@
               <a:buNone/>
             </a:pPr>
             <a:r>
-              <a:rPr lang="en-US" dirty="0" smtClean="0"/>
+              <a:rPr lang="en-US" dirty="0" smtClean="0">
+                <a:latin typeface="Consolas" panose="020B0609020204030204" pitchFamily="49" charset="0"/>
+                <a:cs typeface="Consolas" panose="020B0609020204030204" pitchFamily="49" charset="0"/>
+              </a:rPr>
               <a:t>List </a:t>
             </a:r>
             <a:r>
-              <a:rPr lang="en-US" dirty="0" err="1" smtClean="0"/>
+              <a:rPr lang="en-US" dirty="0" err="1" smtClean="0">
+                <a:latin typeface="Consolas" panose="020B0609020204030204" pitchFamily="49" charset="0"/>
+                <a:cs typeface="Consolas" panose="020B0609020204030204" pitchFamily="49" charset="0"/>
+              </a:rPr>
               <a:t>myList</a:t>
             </a:r>
             <a:r>
-              <a:rPr lang="en-US" dirty="0" smtClean="0"/>
+              <a:rPr lang="en-US" dirty="0" smtClean="0">
+                <a:latin typeface="Consolas" panose="020B0609020204030204" pitchFamily="49" charset="0"/>
+                <a:cs typeface="Consolas" panose="020B0609020204030204" pitchFamily="49" charset="0"/>
+              </a:rPr>
               <a:t> = [“John”, “Bill”, “Fred”];</a:t>
             </a:r>
           </a:p>
@@ -9165,23 +9573,38 @@
               <a:buNone/>
             </a:pPr>
             <a:r>
-              <a:rPr lang="en-US" dirty="0" smtClean="0"/>
+              <a:rPr lang="en-US" dirty="0" smtClean="0">
+                <a:latin typeface="Consolas" panose="020B0609020204030204" pitchFamily="49" charset="0"/>
+                <a:cs typeface="Consolas" panose="020B0609020204030204" pitchFamily="49" charset="0"/>
+              </a:rPr>
               <a:t>&lt;div *</a:t>
             </a:r>
             <a:r>
-              <a:rPr lang="en-US" dirty="0" err="1" smtClean="0"/>
+              <a:rPr lang="en-US" dirty="0" err="1" smtClean="0">
+                <a:latin typeface="Consolas" panose="020B0609020204030204" pitchFamily="49" charset="0"/>
+                <a:cs typeface="Consolas" panose="020B0609020204030204" pitchFamily="49" charset="0"/>
+              </a:rPr>
               <a:t>ngFor</a:t>
             </a:r>
             <a:r>
-              <a:rPr lang="en-US" dirty="0" smtClean="0"/>
+              <a:rPr lang="en-US" dirty="0" smtClean="0">
+                <a:latin typeface="Consolas" panose="020B0609020204030204" pitchFamily="49" charset="0"/>
+                <a:cs typeface="Consolas" panose="020B0609020204030204" pitchFamily="49" charset="0"/>
+              </a:rPr>
               <a:t>=“#name of </a:t>
             </a:r>
             <a:r>
-              <a:rPr lang="en-US" dirty="0" err="1" smtClean="0"/>
+              <a:rPr lang="en-US" dirty="0" err="1" smtClean="0">
+                <a:latin typeface="Consolas" panose="020B0609020204030204" pitchFamily="49" charset="0"/>
+                <a:cs typeface="Consolas" panose="020B0609020204030204" pitchFamily="49" charset="0"/>
+              </a:rPr>
               <a:t>myList</a:t>
             </a:r>
             <a:r>
-              <a:rPr lang="en-US" dirty="0" smtClean="0"/>
+              <a:rPr lang="en-US" dirty="0" smtClean="0">
+                <a:latin typeface="Consolas" panose="020B0609020204030204" pitchFamily="49" charset="0"/>
+                <a:cs typeface="Consolas" panose="020B0609020204030204" pitchFamily="49" charset="0"/>
+              </a:rPr>
               <a:t>”&gt;</a:t>
             </a:r>
           </a:p>
@@ -9190,16 +9613,33 @@
               <a:buNone/>
             </a:pPr>
             <a:r>
-              <a:rPr lang="en-US" dirty="0" smtClean="0"/>
-              <a:t>  {{ name }}</a:t>
-            </a:r>
+              <a:rPr lang="en-US" dirty="0" smtClean="0">
+                <a:latin typeface="Consolas" panose="020B0609020204030204" pitchFamily="49" charset="0"/>
+                <a:cs typeface="Consolas" panose="020B0609020204030204" pitchFamily="49" charset="0"/>
+              </a:rPr>
+              <a:t>  </a:t>
+            </a:r>
+            <a:r>
+              <a:rPr lang="en-US" dirty="0" smtClean="0">
+                <a:latin typeface="Consolas" panose="020B0609020204030204" pitchFamily="49" charset="0"/>
+                <a:cs typeface="Consolas" panose="020B0609020204030204" pitchFamily="49" charset="0"/>
+              </a:rPr>
+              <a:t>{{name}}</a:t>
+            </a:r>
+            <a:endParaRPr lang="en-US" dirty="0" smtClean="0">
+              <a:latin typeface="Consolas" panose="020B0609020204030204" pitchFamily="49" charset="0"/>
+              <a:cs typeface="Consolas" panose="020B0609020204030204" pitchFamily="49" charset="0"/>
+            </a:endParaRPr>
           </a:p>
           <a:p>
             <a:pPr marL="0" indent="0">
               <a:buNone/>
             </a:pPr>
             <a:r>
-              <a:rPr lang="en-US" dirty="0" smtClean="0"/>
+              <a:rPr lang="en-US" dirty="0" smtClean="0">
+                <a:latin typeface="Consolas" panose="020B0609020204030204" pitchFamily="49" charset="0"/>
+                <a:cs typeface="Consolas" panose="020B0609020204030204" pitchFamily="49" charset="0"/>
+              </a:rPr>
               <a:t>&lt;/div&gt;</a:t>
             </a:r>
           </a:p>
@@ -9229,35 +9669,59 @@
               <a:buNone/>
             </a:pPr>
             <a:r>
-              <a:rPr lang="en-US" dirty="0" smtClean="0"/>
+              <a:rPr lang="en-US" dirty="0" smtClean="0">
+                <a:latin typeface="Consolas" panose="020B0609020204030204" pitchFamily="49" charset="0"/>
+                <a:cs typeface="Consolas" panose="020B0609020204030204" pitchFamily="49" charset="0"/>
+              </a:rPr>
               <a:t>&lt;template </a:t>
             </a:r>
             <a:r>
-              <a:rPr lang="en-US" dirty="0" err="1" smtClean="0"/>
+              <a:rPr lang="en-US" dirty="0" err="1" smtClean="0">
+                <a:latin typeface="Consolas" panose="020B0609020204030204" pitchFamily="49" charset="0"/>
+                <a:cs typeface="Consolas" panose="020B0609020204030204" pitchFamily="49" charset="0"/>
+              </a:rPr>
               <a:t>ngFor</a:t>
             </a:r>
             <a:r>
-              <a:rPr lang="en-US" dirty="0"/>
+              <a:rPr lang="en-US" dirty="0">
+                <a:latin typeface="Consolas" panose="020B0609020204030204" pitchFamily="49" charset="0"/>
+                <a:cs typeface="Consolas" panose="020B0609020204030204" pitchFamily="49" charset="0"/>
+              </a:rPr>
               <a:t> </a:t>
             </a:r>
             <a:r>
-              <a:rPr lang="en-US" dirty="0" smtClean="0"/>
+              <a:rPr lang="en-US" dirty="0" smtClean="0">
+                <a:latin typeface="Consolas" panose="020B0609020204030204" pitchFamily="49" charset="0"/>
+                <a:cs typeface="Consolas" panose="020B0609020204030204" pitchFamily="49" charset="0"/>
+              </a:rPr>
               <a:t>#name [</a:t>
             </a:r>
             <a:r>
-              <a:rPr lang="en-US" dirty="0" err="1" smtClean="0"/>
+              <a:rPr lang="en-US" dirty="0" err="1" smtClean="0">
+                <a:latin typeface="Consolas" panose="020B0609020204030204" pitchFamily="49" charset="0"/>
+                <a:cs typeface="Consolas" panose="020B0609020204030204" pitchFamily="49" charset="0"/>
+              </a:rPr>
               <a:t>ngForOf</a:t>
             </a:r>
             <a:r>
-              <a:rPr lang="en-US" dirty="0" smtClean="0"/>
+              <a:rPr lang="en-US" dirty="0" smtClean="0">
+                <a:latin typeface="Consolas" panose="020B0609020204030204" pitchFamily="49" charset="0"/>
+                <a:cs typeface="Consolas" panose="020B0609020204030204" pitchFamily="49" charset="0"/>
+              </a:rPr>
               <a:t>]=“</a:t>
             </a:r>
             <a:r>
-              <a:rPr lang="en-US" dirty="0" err="1" smtClean="0"/>
+              <a:rPr lang="en-US" dirty="0" err="1" smtClean="0">
+                <a:latin typeface="Consolas" panose="020B0609020204030204" pitchFamily="49" charset="0"/>
+                <a:cs typeface="Consolas" panose="020B0609020204030204" pitchFamily="49" charset="0"/>
+              </a:rPr>
               <a:t>myList</a:t>
             </a:r>
             <a:r>
-              <a:rPr lang="en-US" dirty="0" smtClean="0"/>
+              <a:rPr lang="en-US" dirty="0" smtClean="0">
+                <a:latin typeface="Consolas" panose="020B0609020204030204" pitchFamily="49" charset="0"/>
+                <a:cs typeface="Consolas" panose="020B0609020204030204" pitchFamily="49" charset="0"/>
+              </a:rPr>
               <a:t>”&gt;</a:t>
             </a:r>
           </a:p>
@@ -10956,7 +11420,11 @@
           <a:p>
             <a:r>
               <a:rPr lang="en-US" dirty="0" smtClean="0"/>
-              <a:t>JavaScript (ES5, ES6)</a:t>
+              <a:t>JavaScript (ES5, </a:t>
+            </a:r>
+            <a:r>
+              <a:rPr lang="en-US"/>
+              <a:t>ES6 (ES2015))</a:t>
             </a:r>
             <a:endParaRPr lang="en-US" dirty="0"/>
           </a:p>
@@ -11708,15 +12176,24 @@
               <a:buNone/>
             </a:pPr>
             <a:r>
-              <a:rPr lang="en-US" dirty="0" smtClean="0"/>
+              <a:rPr lang="en-US" dirty="0" smtClean="0">
+                <a:latin typeface="Consolas" panose="020B0609020204030204" pitchFamily="49" charset="0"/>
+                <a:cs typeface="Consolas" panose="020B0609020204030204" pitchFamily="49" charset="0"/>
+              </a:rPr>
               <a:t>@Input() String </a:t>
             </a:r>
             <a:r>
-              <a:rPr lang="en-US" dirty="0" err="1" smtClean="0"/>
+              <a:rPr lang="en-US" dirty="0" err="1" smtClean="0">
+                <a:latin typeface="Consolas" panose="020B0609020204030204" pitchFamily="49" charset="0"/>
+                <a:cs typeface="Consolas" panose="020B0609020204030204" pitchFamily="49" charset="0"/>
+              </a:rPr>
               <a:t>myString</a:t>
             </a:r>
             <a:r>
-              <a:rPr lang="en-US" dirty="0" smtClean="0"/>
+              <a:rPr lang="en-US" dirty="0" smtClean="0">
+                <a:latin typeface="Consolas" panose="020B0609020204030204" pitchFamily="49" charset="0"/>
+                <a:cs typeface="Consolas" panose="020B0609020204030204" pitchFamily="49" charset="0"/>
+              </a:rPr>
               <a:t>;</a:t>
             </a:r>
           </a:p>
@@ -11737,17 +12214,30 @@
               <a:buNone/>
             </a:pPr>
             <a:r>
-              <a:rPr lang="en-US" dirty="0" smtClean="0"/>
-              <a:t>{{ </a:t>
-            </a:r>
-            <a:r>
-              <a:rPr lang="en-US" dirty="0" err="1" smtClean="0"/>
+              <a:rPr lang="en-US" dirty="0" smtClean="0">
+                <a:latin typeface="Consolas" panose="020B0609020204030204" pitchFamily="49" charset="0"/>
+                <a:cs typeface="Consolas" panose="020B0609020204030204" pitchFamily="49" charset="0"/>
+              </a:rPr>
+              <a:t>{{</a:t>
+            </a:r>
+            <a:r>
+              <a:rPr lang="en-US" dirty="0" err="1" smtClean="0">
+                <a:latin typeface="Consolas" panose="020B0609020204030204" pitchFamily="49" charset="0"/>
+                <a:cs typeface="Consolas" panose="020B0609020204030204" pitchFamily="49" charset="0"/>
+              </a:rPr>
               <a:t>myString</a:t>
             </a:r>
             <a:r>
-              <a:rPr lang="en-US" dirty="0" smtClean="0"/>
-              <a:t> }}</a:t>
-            </a:r>
+              <a:rPr lang="en-US" dirty="0" smtClean="0">
+                <a:latin typeface="Consolas" panose="020B0609020204030204" pitchFamily="49" charset="0"/>
+                <a:cs typeface="Consolas" panose="020B0609020204030204" pitchFamily="49" charset="0"/>
+              </a:rPr>
+              <a:t>}}</a:t>
+            </a:r>
+            <a:endParaRPr lang="en-US" dirty="0" smtClean="0">
+              <a:latin typeface="Consolas" panose="020B0609020204030204" pitchFamily="49" charset="0"/>
+              <a:cs typeface="Consolas" panose="020B0609020204030204" pitchFamily="49" charset="0"/>
+            </a:endParaRPr>
           </a:p>
           <a:p>
             <a:pPr marL="0" indent="0">
@@ -11767,15 +12257,24 @@
               <a:buNone/>
             </a:pPr>
             <a:r>
-              <a:rPr lang="en-US" dirty="0" smtClean="0"/>
+              <a:rPr lang="en-US" dirty="0" smtClean="0">
+                <a:latin typeface="Consolas" panose="020B0609020204030204" pitchFamily="49" charset="0"/>
+                <a:cs typeface="Consolas" panose="020B0609020204030204" pitchFamily="49" charset="0"/>
+              </a:rPr>
               <a:t>String </a:t>
             </a:r>
             <a:r>
-              <a:rPr lang="en-US" dirty="0" err="1" smtClean="0"/>
+              <a:rPr lang="en-US" dirty="0" err="1" smtClean="0">
+                <a:latin typeface="Consolas" panose="020B0609020204030204" pitchFamily="49" charset="0"/>
+                <a:cs typeface="Consolas" panose="020B0609020204030204" pitchFamily="49" charset="0"/>
+              </a:rPr>
               <a:t>myString</a:t>
             </a:r>
             <a:r>
-              <a:rPr lang="en-US" dirty="0" smtClean="0"/>
+              <a:rPr lang="en-US" dirty="0" smtClean="0">
+                <a:latin typeface="Consolas" panose="020B0609020204030204" pitchFamily="49" charset="0"/>
+                <a:cs typeface="Consolas" panose="020B0609020204030204" pitchFamily="49" charset="0"/>
+              </a:rPr>
               <a:t> = “Hello Universe”;</a:t>
             </a:r>
           </a:p>
@@ -11796,23 +12295,38 @@
               <a:buNone/>
             </a:pPr>
             <a:r>
-              <a:rPr lang="en-US" dirty="0" smtClean="0"/>
+              <a:rPr lang="en-US" dirty="0" smtClean="0">
+                <a:latin typeface="Consolas" panose="020B0609020204030204" pitchFamily="49" charset="0"/>
+                <a:cs typeface="Consolas" panose="020B0609020204030204" pitchFamily="49" charset="0"/>
+              </a:rPr>
               <a:t>&lt;child-component [</a:t>
             </a:r>
             <a:r>
-              <a:rPr lang="en-US" dirty="0" err="1" smtClean="0"/>
+              <a:rPr lang="en-US" dirty="0" err="1" smtClean="0">
+                <a:latin typeface="Consolas" panose="020B0609020204030204" pitchFamily="49" charset="0"/>
+                <a:cs typeface="Consolas" panose="020B0609020204030204" pitchFamily="49" charset="0"/>
+              </a:rPr>
               <a:t>myString</a:t>
             </a:r>
             <a:r>
-              <a:rPr lang="en-US" dirty="0" smtClean="0"/>
+              <a:rPr lang="en-US" dirty="0" smtClean="0">
+                <a:latin typeface="Consolas" panose="020B0609020204030204" pitchFamily="49" charset="0"/>
+                <a:cs typeface="Consolas" panose="020B0609020204030204" pitchFamily="49" charset="0"/>
+              </a:rPr>
               <a:t>]=“</a:t>
             </a:r>
             <a:r>
-              <a:rPr lang="en-US" dirty="0" err="1" smtClean="0"/>
+              <a:rPr lang="en-US" dirty="0" err="1" smtClean="0">
+                <a:latin typeface="Consolas" panose="020B0609020204030204" pitchFamily="49" charset="0"/>
+                <a:cs typeface="Consolas" panose="020B0609020204030204" pitchFamily="49" charset="0"/>
+              </a:rPr>
               <a:t>myString</a:t>
             </a:r>
             <a:r>
-              <a:rPr lang="en-US" dirty="0" smtClean="0"/>
+              <a:rPr lang="en-US" dirty="0" smtClean="0">
+                <a:latin typeface="Consolas" panose="020B0609020204030204" pitchFamily="49" charset="0"/>
+                <a:cs typeface="Consolas" panose="020B0609020204030204" pitchFamily="49" charset="0"/>
+              </a:rPr>
               <a:t>”&gt;</a:t>
             </a:r>
           </a:p>
@@ -11821,7 +12335,10 @@
               <a:buNone/>
             </a:pPr>
             <a:r>
-              <a:rPr lang="en-US" dirty="0" smtClean="0"/>
+              <a:rPr lang="en-US" dirty="0" smtClean="0">
+                <a:latin typeface="Consolas" panose="020B0609020204030204" pitchFamily="49" charset="0"/>
+                <a:cs typeface="Consolas" panose="020B0609020204030204" pitchFamily="49" charset="0"/>
+              </a:rPr>
               <a:t>&lt;/child-component&gt;</a:t>
             </a:r>
           </a:p>
@@ -12760,7 +13277,7 @@
         <p:spPr/>
         <p:txBody>
           <a:bodyPr>
-            <a:normAutofit fontScale="77500" lnSpcReduction="20000"/>
+            <a:normAutofit fontScale="92500"/>
           </a:bodyPr>
           <a:lstStyle/>
           <a:p>
@@ -12775,94 +13292,156 @@
               <a:buNone/>
             </a:pPr>
             <a:r>
-              <a:rPr lang="en-US" dirty="0" smtClean="0"/>
+              <a:rPr lang="en-US" sz="2200" dirty="0" smtClean="0">
+                <a:latin typeface="Consolas" panose="020B0609020204030204" pitchFamily="49" charset="0"/>
+                <a:cs typeface="Consolas" panose="020B0609020204030204" pitchFamily="49" charset="0"/>
+              </a:rPr>
               <a:t>@</a:t>
             </a:r>
             <a:r>
-              <a:rPr lang="en-US" dirty="0"/>
+              <a:rPr lang="en-US" sz="2200" dirty="0">
+                <a:latin typeface="Consolas" panose="020B0609020204030204" pitchFamily="49" charset="0"/>
+                <a:cs typeface="Consolas" panose="020B0609020204030204" pitchFamily="49" charset="0"/>
+              </a:rPr>
               <a:t>Output() </a:t>
             </a:r>
             <a:r>
-              <a:rPr lang="en-US" dirty="0" err="1" smtClean="0"/>
+              <a:rPr lang="en-US" sz="2200" dirty="0" err="1" smtClean="0">
+                <a:latin typeface="Consolas" panose="020B0609020204030204" pitchFamily="49" charset="0"/>
+                <a:cs typeface="Consolas" panose="020B0609020204030204" pitchFamily="49" charset="0"/>
+              </a:rPr>
               <a:t>EventEmitter</a:t>
             </a:r>
             <a:r>
-              <a:rPr lang="en-US" dirty="0" smtClean="0"/>
+              <a:rPr lang="en-US" sz="2200" dirty="0" smtClean="0">
+                <a:latin typeface="Consolas" panose="020B0609020204030204" pitchFamily="49" charset="0"/>
+                <a:cs typeface="Consolas" panose="020B0609020204030204" pitchFamily="49" charset="0"/>
+              </a:rPr>
               <a:t> </a:t>
             </a:r>
             <a:r>
-              <a:rPr lang="en-US" dirty="0"/>
+              <a:rPr lang="en-US" sz="2200" dirty="0">
+                <a:latin typeface="Consolas" panose="020B0609020204030204" pitchFamily="49" charset="0"/>
+                <a:cs typeface="Consolas" panose="020B0609020204030204" pitchFamily="49" charset="0"/>
+              </a:rPr>
               <a:t>clicked </a:t>
             </a:r>
             <a:r>
-              <a:rPr lang="en-US" dirty="0" smtClean="0"/>
+              <a:rPr lang="en-US" sz="2200" dirty="0" smtClean="0">
+                <a:latin typeface="Consolas" panose="020B0609020204030204" pitchFamily="49" charset="0"/>
+                <a:cs typeface="Consolas" panose="020B0609020204030204" pitchFamily="49" charset="0"/>
+              </a:rPr>
               <a:t>= </a:t>
             </a:r>
             <a:r>
-              <a:rPr lang="en-US" b="1" dirty="0"/>
+              <a:rPr lang="en-US" sz="2200" b="1" dirty="0" smtClean="0">
+                <a:latin typeface="Consolas" panose="020B0609020204030204" pitchFamily="49" charset="0"/>
+                <a:cs typeface="Consolas" panose="020B0609020204030204" pitchFamily="49" charset="0"/>
+              </a:rPr>
               <a:t>new </a:t>
             </a:r>
             <a:r>
-              <a:rPr lang="en-US" b="1" dirty="0" smtClean="0"/>
-              <a:t>	</a:t>
-            </a:r>
-            <a:r>
-              <a:rPr lang="en-US" dirty="0" err="1" smtClean="0"/>
+              <a:rPr lang="en-US" sz="2200" dirty="0" err="1" smtClean="0">
+                <a:latin typeface="Consolas" panose="020B0609020204030204" pitchFamily="49" charset="0"/>
+                <a:cs typeface="Consolas" panose="020B0609020204030204" pitchFamily="49" charset="0"/>
+              </a:rPr>
               <a:t>EventEmitter</a:t>
             </a:r>
             <a:r>
-              <a:rPr lang="en-US" dirty="0" smtClean="0"/>
+              <a:rPr lang="en-US" sz="2200" dirty="0" smtClean="0">
+                <a:latin typeface="Consolas" panose="020B0609020204030204" pitchFamily="49" charset="0"/>
+                <a:cs typeface="Consolas" panose="020B0609020204030204" pitchFamily="49" charset="0"/>
+              </a:rPr>
               <a:t>()</a:t>
             </a:r>
             <a:r>
-              <a:rPr lang="en-US" dirty="0"/>
+              <a:rPr lang="en-US" sz="2200" dirty="0">
+                <a:latin typeface="Consolas" panose="020B0609020204030204" pitchFamily="49" charset="0"/>
+                <a:cs typeface="Consolas" panose="020B0609020204030204" pitchFamily="49" charset="0"/>
+              </a:rPr>
               <a:t>;</a:t>
             </a:r>
             <a:br>
-              <a:rPr lang="en-US" dirty="0"/>
+              <a:rPr lang="en-US" sz="2200" dirty="0">
+                <a:latin typeface="Consolas" panose="020B0609020204030204" pitchFamily="49" charset="0"/>
+                <a:cs typeface="Consolas" panose="020B0609020204030204" pitchFamily="49" charset="0"/>
+              </a:rPr>
             </a:br>
-            <a:endParaRPr lang="en-US" dirty="0" smtClean="0"/>
+            <a:endParaRPr lang="en-US" sz="2200" dirty="0" smtClean="0">
+              <a:latin typeface="Consolas" panose="020B0609020204030204" pitchFamily="49" charset="0"/>
+              <a:cs typeface="Consolas" panose="020B0609020204030204" pitchFamily="49" charset="0"/>
+            </a:endParaRPr>
           </a:p>
           <a:p>
             <a:pPr marL="0" indent="0">
               <a:buNone/>
             </a:pPr>
             <a:r>
-              <a:rPr lang="en-US" b="1" dirty="0" smtClean="0"/>
+              <a:rPr lang="en-US" sz="2200" b="1" dirty="0" smtClean="0">
+                <a:latin typeface="Consolas" panose="020B0609020204030204" pitchFamily="49" charset="0"/>
+                <a:cs typeface="Consolas" panose="020B0609020204030204" pitchFamily="49" charset="0"/>
+              </a:rPr>
               <a:t>void </a:t>
             </a:r>
             <a:r>
-              <a:rPr lang="en-US" dirty="0" err="1"/>
+              <a:rPr lang="en-US" sz="2200" dirty="0" err="1">
+                <a:latin typeface="Consolas" panose="020B0609020204030204" pitchFamily="49" charset="0"/>
+                <a:cs typeface="Consolas" panose="020B0609020204030204" pitchFamily="49" charset="0"/>
+              </a:rPr>
               <a:t>handleClickEvent</a:t>
             </a:r>
             <a:r>
-              <a:rPr lang="en-US" dirty="0" smtClean="0"/>
+              <a:rPr lang="en-US" sz="2200" dirty="0" smtClean="0">
+                <a:latin typeface="Consolas" panose="020B0609020204030204" pitchFamily="49" charset="0"/>
+                <a:cs typeface="Consolas" panose="020B0609020204030204" pitchFamily="49" charset="0"/>
+              </a:rPr>
               <a:t>(data) {</a:t>
             </a:r>
             <a:br>
-              <a:rPr lang="en-US" dirty="0" smtClean="0"/>
+              <a:rPr lang="en-US" sz="2200" dirty="0" smtClean="0">
+                <a:latin typeface="Consolas" panose="020B0609020204030204" pitchFamily="49" charset="0"/>
+                <a:cs typeface="Consolas" panose="020B0609020204030204" pitchFamily="49" charset="0"/>
+              </a:rPr>
             </a:br>
             <a:r>
-              <a:rPr lang="en-US" dirty="0" smtClean="0"/>
+              <a:rPr lang="en-US" sz="2200" dirty="0" smtClean="0">
+                <a:latin typeface="Consolas" panose="020B0609020204030204" pitchFamily="49" charset="0"/>
+                <a:cs typeface="Consolas" panose="020B0609020204030204" pitchFamily="49" charset="0"/>
+              </a:rPr>
               <a:t>  </a:t>
             </a:r>
             <a:r>
-              <a:rPr lang="en-US" dirty="0" err="1" smtClean="0"/>
+              <a:rPr lang="en-US" sz="2200" dirty="0" err="1" smtClean="0">
+                <a:latin typeface="Consolas" panose="020B0609020204030204" pitchFamily="49" charset="0"/>
+                <a:cs typeface="Consolas" panose="020B0609020204030204" pitchFamily="49" charset="0"/>
+              </a:rPr>
               <a:t>clicked.emit</a:t>
             </a:r>
             <a:r>
-              <a:rPr lang="en-US" dirty="0" smtClean="0"/>
+              <a:rPr lang="en-US" sz="2200" dirty="0" smtClean="0">
+                <a:latin typeface="Consolas" panose="020B0609020204030204" pitchFamily="49" charset="0"/>
+                <a:cs typeface="Consolas" panose="020B0609020204030204" pitchFamily="49" charset="0"/>
+              </a:rPr>
               <a:t>(data)</a:t>
             </a:r>
             <a:r>
-              <a:rPr lang="en-US" dirty="0"/>
+              <a:rPr lang="en-US" sz="2200" dirty="0">
+                <a:latin typeface="Consolas" panose="020B0609020204030204" pitchFamily="49" charset="0"/>
+                <a:cs typeface="Consolas" panose="020B0609020204030204" pitchFamily="49" charset="0"/>
+              </a:rPr>
               <a:t>;</a:t>
             </a:r>
             <a:br>
-              <a:rPr lang="en-US" dirty="0"/>
+              <a:rPr lang="en-US" sz="2200" dirty="0">
+                <a:latin typeface="Consolas" panose="020B0609020204030204" pitchFamily="49" charset="0"/>
+                <a:cs typeface="Consolas" panose="020B0609020204030204" pitchFamily="49" charset="0"/>
+              </a:rPr>
             </a:br>
             <a:r>
-              <a:rPr lang="en-US" dirty="0" smtClean="0"/>
+              <a:rPr lang="en-US" sz="2200" dirty="0" smtClean="0">
+                <a:latin typeface="Consolas" panose="020B0609020204030204" pitchFamily="49" charset="0"/>
+                <a:cs typeface="Consolas" panose="020B0609020204030204" pitchFamily="49" charset="0"/>
+              </a:rPr>
               <a:t>}</a:t>
             </a:r>
           </a:p>
@@ -12883,46 +13462,79 @@
               <a:buNone/>
             </a:pPr>
             <a:r>
-              <a:rPr lang="en-US" dirty="0" smtClean="0"/>
+              <a:rPr lang="en-US" sz="2200" dirty="0" smtClean="0">
+                <a:latin typeface="Consolas" panose="020B0609020204030204" pitchFamily="49" charset="0"/>
+                <a:cs typeface="Consolas" panose="020B0609020204030204" pitchFamily="49" charset="0"/>
+              </a:rPr>
               <a:t>&lt;</a:t>
             </a:r>
             <a:r>
-              <a:rPr lang="en-US" dirty="0"/>
+              <a:rPr lang="en-US" sz="2200" dirty="0">
+                <a:latin typeface="Consolas" panose="020B0609020204030204" pitchFamily="49" charset="0"/>
+                <a:cs typeface="Consolas" panose="020B0609020204030204" pitchFamily="49" charset="0"/>
+              </a:rPr>
               <a:t>input #</a:t>
             </a:r>
             <a:r>
-              <a:rPr lang="en-US" dirty="0" err="1"/>
+              <a:rPr lang="en-US" sz="2200" dirty="0" err="1">
+                <a:latin typeface="Consolas" panose="020B0609020204030204" pitchFamily="49" charset="0"/>
+                <a:cs typeface="Consolas" panose="020B0609020204030204" pitchFamily="49" charset="0"/>
+              </a:rPr>
               <a:t>myData</a:t>
             </a:r>
             <a:r>
-              <a:rPr lang="en-US" dirty="0"/>
+              <a:rPr lang="en-US" sz="2200" dirty="0">
+                <a:latin typeface="Consolas" panose="020B0609020204030204" pitchFamily="49" charset="0"/>
+                <a:cs typeface="Consolas" panose="020B0609020204030204" pitchFamily="49" charset="0"/>
+              </a:rPr>
               <a:t> type="text"/&gt;</a:t>
             </a:r>
             <a:br>
-              <a:rPr lang="en-US" dirty="0"/>
+              <a:rPr lang="en-US" sz="2200" dirty="0">
+                <a:latin typeface="Consolas" panose="020B0609020204030204" pitchFamily="49" charset="0"/>
+                <a:cs typeface="Consolas" panose="020B0609020204030204" pitchFamily="49" charset="0"/>
+              </a:rPr>
             </a:br>
             <a:r>
-              <a:rPr lang="en-US" dirty="0" smtClean="0"/>
+              <a:rPr lang="en-US" sz="2200" dirty="0" smtClean="0">
+                <a:latin typeface="Consolas" panose="020B0609020204030204" pitchFamily="49" charset="0"/>
+                <a:cs typeface="Consolas" panose="020B0609020204030204" pitchFamily="49" charset="0"/>
+              </a:rPr>
               <a:t>&lt;</a:t>
             </a:r>
             <a:r>
-              <a:rPr lang="en-US" dirty="0"/>
+              <a:rPr lang="en-US" sz="2200" dirty="0">
+                <a:latin typeface="Consolas" panose="020B0609020204030204" pitchFamily="49" charset="0"/>
+                <a:cs typeface="Consolas" panose="020B0609020204030204" pitchFamily="49" charset="0"/>
+              </a:rPr>
               <a:t>button (click)="</a:t>
             </a:r>
             <a:r>
-              <a:rPr lang="en-US" dirty="0" err="1" smtClean="0"/>
+              <a:rPr lang="en-US" sz="2200" dirty="0" err="1" smtClean="0">
+                <a:latin typeface="Consolas" panose="020B0609020204030204" pitchFamily="49" charset="0"/>
+                <a:cs typeface="Consolas" panose="020B0609020204030204" pitchFamily="49" charset="0"/>
+              </a:rPr>
               <a:t>handleClickEvent</a:t>
             </a:r>
             <a:r>
-              <a:rPr lang="en-US" dirty="0" smtClean="0"/>
+              <a:rPr lang="en-US" sz="2200" dirty="0" smtClean="0">
+                <a:latin typeface="Consolas" panose="020B0609020204030204" pitchFamily="49" charset="0"/>
+                <a:cs typeface="Consolas" panose="020B0609020204030204" pitchFamily="49" charset="0"/>
+              </a:rPr>
               <a:t>(</a:t>
             </a:r>
             <a:r>
-              <a:rPr lang="en-US" dirty="0" err="1" smtClean="0"/>
+              <a:rPr lang="en-US" sz="2200" dirty="0" err="1" smtClean="0">
+                <a:latin typeface="Consolas" panose="020B0609020204030204" pitchFamily="49" charset="0"/>
+                <a:cs typeface="Consolas" panose="020B0609020204030204" pitchFamily="49" charset="0"/>
+              </a:rPr>
               <a:t>myData.value</a:t>
             </a:r>
             <a:r>
-              <a:rPr lang="en-US" dirty="0" smtClean="0"/>
+              <a:rPr lang="en-US" sz="2200" dirty="0" smtClean="0">
+                <a:latin typeface="Consolas" panose="020B0609020204030204" pitchFamily="49" charset="0"/>
+                <a:cs typeface="Consolas" panose="020B0609020204030204" pitchFamily="49" charset="0"/>
+              </a:rPr>
               <a:t>)"&gt;</a:t>
             </a:r>
           </a:p>
@@ -12931,7 +13543,10 @@
               <a:buNone/>
             </a:pPr>
             <a:r>
-              <a:rPr lang="en-US" dirty="0" smtClean="0"/>
+              <a:rPr lang="en-US" sz="2200" dirty="0" smtClean="0">
+                <a:latin typeface="Consolas" panose="020B0609020204030204" pitchFamily="49" charset="0"/>
+                <a:cs typeface="Consolas" panose="020B0609020204030204" pitchFamily="49" charset="0"/>
+              </a:rPr>
               <a:t>  Click Me</a:t>
             </a:r>
           </a:p>
@@ -12940,11 +13555,17 @@
               <a:buNone/>
             </a:pPr>
             <a:r>
-              <a:rPr lang="en-US" dirty="0" smtClean="0"/>
+              <a:rPr lang="en-US" sz="2200" dirty="0" smtClean="0">
+                <a:latin typeface="Consolas" panose="020B0609020204030204" pitchFamily="49" charset="0"/>
+                <a:cs typeface="Consolas" panose="020B0609020204030204" pitchFamily="49" charset="0"/>
+              </a:rPr>
               <a:t>&lt;/</a:t>
             </a:r>
             <a:r>
-              <a:rPr lang="en-US" dirty="0"/>
+              <a:rPr lang="en-US" sz="2200" dirty="0">
+                <a:latin typeface="Consolas" panose="020B0609020204030204" pitchFamily="49" charset="0"/>
+                <a:cs typeface="Consolas" panose="020B0609020204030204" pitchFamily="49" charset="0"/>
+              </a:rPr>
               <a:t>button&gt;</a:t>
             </a:r>
           </a:p>
@@ -13718,30 +14339,51 @@
               <a:buNone/>
             </a:pPr>
             <a:r>
-              <a:rPr lang="en-US" sz="2400" b="1" dirty="0" smtClean="0"/>
+              <a:rPr lang="en-US" sz="2400" b="1" dirty="0" smtClean="0">
+                <a:latin typeface="Consolas" panose="020B0609020204030204" pitchFamily="49" charset="0"/>
+                <a:cs typeface="Consolas" panose="020B0609020204030204" pitchFamily="49" charset="0"/>
+              </a:rPr>
               <a:t>void </a:t>
             </a:r>
             <a:r>
-              <a:rPr lang="en-US" sz="2400" dirty="0" err="1"/>
+              <a:rPr lang="en-US" sz="2400" dirty="0" err="1">
+                <a:latin typeface="Consolas" panose="020B0609020204030204" pitchFamily="49" charset="0"/>
+                <a:cs typeface="Consolas" panose="020B0609020204030204" pitchFamily="49" charset="0"/>
+              </a:rPr>
               <a:t>handleClicked</a:t>
             </a:r>
             <a:r>
-              <a:rPr lang="en-US" sz="2400" dirty="0" smtClean="0"/>
+              <a:rPr lang="en-US" sz="2400" dirty="0" smtClean="0">
+                <a:latin typeface="Consolas" panose="020B0609020204030204" pitchFamily="49" charset="0"/>
+                <a:cs typeface="Consolas" panose="020B0609020204030204" pitchFamily="49" charset="0"/>
+              </a:rPr>
               <a:t>(data) {</a:t>
             </a:r>
             <a:br>
-              <a:rPr lang="en-US" sz="2400" dirty="0" smtClean="0"/>
+              <a:rPr lang="en-US" sz="2400" dirty="0" smtClean="0">
+                <a:latin typeface="Consolas" panose="020B0609020204030204" pitchFamily="49" charset="0"/>
+                <a:cs typeface="Consolas" panose="020B0609020204030204" pitchFamily="49" charset="0"/>
+              </a:rPr>
             </a:br>
             <a:r>
-              <a:rPr lang="en-US" sz="2400" dirty="0" smtClean="0"/>
+              <a:rPr lang="en-US" sz="2400" dirty="0" smtClean="0">
+                <a:latin typeface="Consolas" panose="020B0609020204030204" pitchFamily="49" charset="0"/>
+                <a:cs typeface="Consolas" panose="020B0609020204030204" pitchFamily="49" charset="0"/>
+              </a:rPr>
               <a:t>  </a:t>
             </a:r>
             <a:r>
-              <a:rPr lang="en-US" sz="2400" dirty="0" err="1" smtClean="0"/>
+              <a:rPr lang="en-US" sz="2400" dirty="0" err="1" smtClean="0">
+                <a:latin typeface="Consolas" panose="020B0609020204030204" pitchFamily="49" charset="0"/>
+                <a:cs typeface="Consolas" panose="020B0609020204030204" pitchFamily="49" charset="0"/>
+              </a:rPr>
               <a:t>myString</a:t>
             </a:r>
             <a:r>
-              <a:rPr lang="en-US" sz="2400" dirty="0" smtClean="0"/>
+              <a:rPr lang="en-US" sz="2400" dirty="0" smtClean="0">
+                <a:latin typeface="Consolas" panose="020B0609020204030204" pitchFamily="49" charset="0"/>
+                <a:cs typeface="Consolas" panose="020B0609020204030204" pitchFamily="49" charset="0"/>
+              </a:rPr>
               <a:t> = data;</a:t>
             </a:r>
           </a:p>
@@ -13750,7 +14392,10 @@
               <a:buNone/>
             </a:pPr>
             <a:r>
-              <a:rPr lang="en-US" sz="2400" dirty="0" smtClean="0"/>
+              <a:rPr lang="en-US" sz="2400" dirty="0" smtClean="0">
+                <a:latin typeface="Consolas" panose="020B0609020204030204" pitchFamily="49" charset="0"/>
+                <a:cs typeface="Consolas" panose="020B0609020204030204" pitchFamily="49" charset="0"/>
+              </a:rPr>
               <a:t>}</a:t>
             </a:r>
           </a:p>
@@ -13771,15 +14416,24 @@
               <a:buNone/>
             </a:pPr>
             <a:r>
-              <a:rPr lang="en-US" sz="2400" dirty="0" smtClean="0"/>
+              <a:rPr lang="en-US" sz="2400" dirty="0" smtClean="0">
+                <a:latin typeface="Consolas" panose="020B0609020204030204" pitchFamily="49" charset="0"/>
+                <a:cs typeface="Consolas" panose="020B0609020204030204" pitchFamily="49" charset="0"/>
+              </a:rPr>
               <a:t>&lt;child-component (clicked)=“</a:t>
             </a:r>
             <a:r>
-              <a:rPr lang="en-US" sz="2400" dirty="0" err="1" smtClean="0"/>
+              <a:rPr lang="en-US" sz="2400" dirty="0" err="1" smtClean="0">
+                <a:latin typeface="Consolas" panose="020B0609020204030204" pitchFamily="49" charset="0"/>
+                <a:cs typeface="Consolas" panose="020B0609020204030204" pitchFamily="49" charset="0"/>
+              </a:rPr>
               <a:t>handleClicked</a:t>
             </a:r>
             <a:r>
-              <a:rPr lang="en-US" sz="2400" dirty="0" smtClean="0"/>
+              <a:rPr lang="en-US" sz="2400" dirty="0" smtClean="0">
+                <a:latin typeface="Consolas" panose="020B0609020204030204" pitchFamily="49" charset="0"/>
+                <a:cs typeface="Consolas" panose="020B0609020204030204" pitchFamily="49" charset="0"/>
+              </a:rPr>
               <a:t>($event)“&gt;</a:t>
             </a:r>
           </a:p>
@@ -13788,7 +14442,10 @@
               <a:buNone/>
             </a:pPr>
             <a:r>
-              <a:rPr lang="en-US" sz="2400" dirty="0" smtClean="0"/>
+              <a:rPr lang="en-US" sz="2400" dirty="0" smtClean="0">
+                <a:latin typeface="Consolas" panose="020B0609020204030204" pitchFamily="49" charset="0"/>
+                <a:cs typeface="Consolas" panose="020B0609020204030204" pitchFamily="49" charset="0"/>
+              </a:rPr>
               <a:t>&lt;/child-component&gt;</a:t>
             </a:r>
           </a:p>
@@ -15103,102 +15760,180 @@
               <a:buNone/>
             </a:pPr>
             <a:r>
-              <a:rPr lang="en-US" dirty="0" smtClean="0"/>
+              <a:rPr lang="en-US" dirty="0" smtClean="0">
+                <a:latin typeface="Consolas" panose="020B0609020204030204" pitchFamily="49" charset="0"/>
+                <a:cs typeface="Consolas" panose="020B0609020204030204" pitchFamily="49" charset="0"/>
+              </a:rPr>
               <a:t>[</a:t>
             </a:r>
             <a:br>
-              <a:rPr lang="en-US" dirty="0" smtClean="0"/>
+              <a:rPr lang="en-US" dirty="0" smtClean="0">
+                <a:latin typeface="Consolas" panose="020B0609020204030204" pitchFamily="49" charset="0"/>
+                <a:cs typeface="Consolas" panose="020B0609020204030204" pitchFamily="49" charset="0"/>
+              </a:rPr>
             </a:br>
             <a:r>
-              <a:rPr lang="en-US" dirty="0" smtClean="0"/>
+              <a:rPr lang="en-US" dirty="0" smtClean="0">
+                <a:latin typeface="Consolas" panose="020B0609020204030204" pitchFamily="49" charset="0"/>
+                <a:cs typeface="Consolas" panose="020B0609020204030204" pitchFamily="49" charset="0"/>
+              </a:rPr>
               <a:t>  {</a:t>
             </a:r>
             <a:r>
-              <a:rPr lang="en-US" dirty="0"/>
+              <a:rPr lang="en-US" dirty="0">
+                <a:latin typeface="Consolas" panose="020B0609020204030204" pitchFamily="49" charset="0"/>
+                <a:cs typeface="Consolas" panose="020B0609020204030204" pitchFamily="49" charset="0"/>
+              </a:rPr>
               <a:t>"</a:t>
             </a:r>
             <a:r>
-              <a:rPr lang="en-US" dirty="0" err="1"/>
+              <a:rPr lang="en-US" dirty="0" err="1">
+                <a:latin typeface="Consolas" panose="020B0609020204030204" pitchFamily="49" charset="0"/>
+                <a:cs typeface="Consolas" panose="020B0609020204030204" pitchFamily="49" charset="0"/>
+              </a:rPr>
               <a:t>name":"John</a:t>
             </a:r>
             <a:r>
-              <a:rPr lang="en-US" dirty="0"/>
+              <a:rPr lang="en-US" dirty="0">
+                <a:latin typeface="Consolas" panose="020B0609020204030204" pitchFamily="49" charset="0"/>
+                <a:cs typeface="Consolas" panose="020B0609020204030204" pitchFamily="49" charset="0"/>
+              </a:rPr>
               <a:t>"</a:t>
             </a:r>
             <a:r>
-              <a:rPr lang="en-US" dirty="0" smtClean="0"/>
+              <a:rPr lang="en-US" dirty="0" smtClean="0">
+                <a:latin typeface="Consolas" panose="020B0609020204030204" pitchFamily="49" charset="0"/>
+                <a:cs typeface="Consolas" panose="020B0609020204030204" pitchFamily="49" charset="0"/>
+              </a:rPr>
               <a:t>}</a:t>
             </a:r>
             <a:r>
-              <a:rPr lang="en-US" dirty="0"/>
+              <a:rPr lang="en-US" dirty="0">
+                <a:latin typeface="Consolas" panose="020B0609020204030204" pitchFamily="49" charset="0"/>
+                <a:cs typeface="Consolas" panose="020B0609020204030204" pitchFamily="49" charset="0"/>
+              </a:rPr>
               <a:t>,</a:t>
             </a:r>
             <a:br>
-              <a:rPr lang="en-US" dirty="0"/>
+              <a:rPr lang="en-US" dirty="0">
+                <a:latin typeface="Consolas" panose="020B0609020204030204" pitchFamily="49" charset="0"/>
+                <a:cs typeface="Consolas" panose="020B0609020204030204" pitchFamily="49" charset="0"/>
+              </a:rPr>
             </a:br>
             <a:r>
-              <a:rPr lang="en-US" dirty="0"/>
+              <a:rPr lang="en-US" dirty="0">
+                <a:latin typeface="Consolas" panose="020B0609020204030204" pitchFamily="49" charset="0"/>
+                <a:cs typeface="Consolas" panose="020B0609020204030204" pitchFamily="49" charset="0"/>
+              </a:rPr>
               <a:t>  </a:t>
             </a:r>
             <a:r>
-              <a:rPr lang="en-US" dirty="0" smtClean="0"/>
+              <a:rPr lang="en-US" dirty="0" smtClean="0">
+                <a:latin typeface="Consolas" panose="020B0609020204030204" pitchFamily="49" charset="0"/>
+                <a:cs typeface="Consolas" panose="020B0609020204030204" pitchFamily="49" charset="0"/>
+              </a:rPr>
               <a:t>{</a:t>
             </a:r>
             <a:r>
-              <a:rPr lang="en-US" dirty="0"/>
+              <a:rPr lang="en-US" dirty="0">
+                <a:latin typeface="Consolas" panose="020B0609020204030204" pitchFamily="49" charset="0"/>
+                <a:cs typeface="Consolas" panose="020B0609020204030204" pitchFamily="49" charset="0"/>
+              </a:rPr>
               <a:t>"</a:t>
             </a:r>
             <a:r>
-              <a:rPr lang="en-US" dirty="0" err="1"/>
+              <a:rPr lang="en-US" dirty="0" err="1">
+                <a:latin typeface="Consolas" panose="020B0609020204030204" pitchFamily="49" charset="0"/>
+                <a:cs typeface="Consolas" panose="020B0609020204030204" pitchFamily="49" charset="0"/>
+              </a:rPr>
               <a:t>name":"Bill</a:t>
             </a:r>
             <a:r>
-              <a:rPr lang="en-US" dirty="0"/>
+              <a:rPr lang="en-US" dirty="0">
+                <a:latin typeface="Consolas" panose="020B0609020204030204" pitchFamily="49" charset="0"/>
+                <a:cs typeface="Consolas" panose="020B0609020204030204" pitchFamily="49" charset="0"/>
+              </a:rPr>
               <a:t>"</a:t>
             </a:r>
             <a:r>
-              <a:rPr lang="en-US" dirty="0" smtClean="0"/>
+              <a:rPr lang="en-US" dirty="0" smtClean="0">
+                <a:latin typeface="Consolas" panose="020B0609020204030204" pitchFamily="49" charset="0"/>
+                <a:cs typeface="Consolas" panose="020B0609020204030204" pitchFamily="49" charset="0"/>
+              </a:rPr>
               <a:t>}</a:t>
             </a:r>
             <a:r>
-              <a:rPr lang="en-US" dirty="0"/>
+              <a:rPr lang="en-US" dirty="0">
+                <a:latin typeface="Consolas" panose="020B0609020204030204" pitchFamily="49" charset="0"/>
+                <a:cs typeface="Consolas" panose="020B0609020204030204" pitchFamily="49" charset="0"/>
+              </a:rPr>
               <a:t>,</a:t>
             </a:r>
             <a:br>
-              <a:rPr lang="en-US" dirty="0"/>
+              <a:rPr lang="en-US" dirty="0">
+                <a:latin typeface="Consolas" panose="020B0609020204030204" pitchFamily="49" charset="0"/>
+                <a:cs typeface="Consolas" panose="020B0609020204030204" pitchFamily="49" charset="0"/>
+              </a:rPr>
             </a:br>
             <a:r>
-              <a:rPr lang="en-US" dirty="0"/>
+              <a:rPr lang="en-US" dirty="0">
+                <a:latin typeface="Consolas" panose="020B0609020204030204" pitchFamily="49" charset="0"/>
+                <a:cs typeface="Consolas" panose="020B0609020204030204" pitchFamily="49" charset="0"/>
+              </a:rPr>
               <a:t>  </a:t>
             </a:r>
             <a:r>
-              <a:rPr lang="en-US" dirty="0" smtClean="0"/>
+              <a:rPr lang="en-US" dirty="0" smtClean="0">
+                <a:latin typeface="Consolas" panose="020B0609020204030204" pitchFamily="49" charset="0"/>
+                <a:cs typeface="Consolas" panose="020B0609020204030204" pitchFamily="49" charset="0"/>
+              </a:rPr>
               <a:t>{</a:t>
             </a:r>
             <a:r>
-              <a:rPr lang="en-US" dirty="0"/>
+              <a:rPr lang="en-US" dirty="0">
+                <a:latin typeface="Consolas" panose="020B0609020204030204" pitchFamily="49" charset="0"/>
+                <a:cs typeface="Consolas" panose="020B0609020204030204" pitchFamily="49" charset="0"/>
+              </a:rPr>
               <a:t>"</a:t>
             </a:r>
             <a:r>
-              <a:rPr lang="en-US" dirty="0" err="1"/>
+              <a:rPr lang="en-US" dirty="0" err="1">
+                <a:latin typeface="Consolas" panose="020B0609020204030204" pitchFamily="49" charset="0"/>
+                <a:cs typeface="Consolas" panose="020B0609020204030204" pitchFamily="49" charset="0"/>
+              </a:rPr>
               <a:t>name</a:t>
             </a:r>
             <a:r>
-              <a:rPr lang="en-US" dirty="0" err="1" smtClean="0"/>
+              <a:rPr lang="en-US" dirty="0" err="1" smtClean="0">
+                <a:latin typeface="Consolas" panose="020B0609020204030204" pitchFamily="49" charset="0"/>
+                <a:cs typeface="Consolas" panose="020B0609020204030204" pitchFamily="49" charset="0"/>
+              </a:rPr>
               <a:t>":“Fred</a:t>
             </a:r>
             <a:r>
-              <a:rPr lang="en-US" dirty="0" smtClean="0"/>
+              <a:rPr lang="en-US" dirty="0" smtClean="0">
+                <a:latin typeface="Consolas" panose="020B0609020204030204" pitchFamily="49" charset="0"/>
+                <a:cs typeface="Consolas" panose="020B0609020204030204" pitchFamily="49" charset="0"/>
+              </a:rPr>
               <a:t>"}</a:t>
             </a:r>
             <a:br>
-              <a:rPr lang="en-US" dirty="0" smtClean="0"/>
+              <a:rPr lang="en-US" dirty="0" smtClean="0">
+                <a:latin typeface="Consolas" panose="020B0609020204030204" pitchFamily="49" charset="0"/>
+                <a:cs typeface="Consolas" panose="020B0609020204030204" pitchFamily="49" charset="0"/>
+              </a:rPr>
             </a:br>
             <a:r>
-              <a:rPr lang="en-US" dirty="0" smtClean="0"/>
+              <a:rPr lang="en-US" dirty="0" smtClean="0">
+                <a:latin typeface="Consolas" panose="020B0609020204030204" pitchFamily="49" charset="0"/>
+                <a:cs typeface="Consolas" panose="020B0609020204030204" pitchFamily="49" charset="0"/>
+              </a:rPr>
               <a:t>]</a:t>
             </a:r>
-            <a:endParaRPr lang="en-US" dirty="0"/>
+            <a:endParaRPr lang="en-US" dirty="0">
+              <a:latin typeface="Consolas" panose="020B0609020204030204" pitchFamily="49" charset="0"/>
+              <a:cs typeface="Consolas" panose="020B0609020204030204" pitchFamily="49" charset="0"/>
+            </a:endParaRPr>
           </a:p>
         </p:txBody>
       </p:sp>
@@ -15494,185 +16229,322 @@
               <a:buNone/>
             </a:pPr>
             <a:r>
-              <a:rPr lang="en-US" b="1" dirty="0"/>
+              <a:rPr lang="en-US" b="1" dirty="0">
+                <a:latin typeface="Consolas" panose="020B0609020204030204" pitchFamily="49" charset="0"/>
+                <a:cs typeface="Consolas" panose="020B0609020204030204" pitchFamily="49" charset="0"/>
+              </a:rPr>
               <a:t>import </a:t>
             </a:r>
             <a:r>
-              <a:rPr lang="en-US" dirty="0"/>
+              <a:rPr lang="en-US" dirty="0">
+                <a:latin typeface="Consolas" panose="020B0609020204030204" pitchFamily="49" charset="0"/>
+                <a:cs typeface="Consolas" panose="020B0609020204030204" pitchFamily="49" charset="0"/>
+              </a:rPr>
               <a:t>'package:angular2/angular2.dart';</a:t>
             </a:r>
             <a:br>
-              <a:rPr lang="en-US" dirty="0"/>
+              <a:rPr lang="en-US" dirty="0">
+                <a:latin typeface="Consolas" panose="020B0609020204030204" pitchFamily="49" charset="0"/>
+                <a:cs typeface="Consolas" panose="020B0609020204030204" pitchFamily="49" charset="0"/>
+              </a:rPr>
             </a:br>
             <a:r>
-              <a:rPr lang="en-US" b="1" dirty="0"/>
+              <a:rPr lang="en-US" b="1" dirty="0">
+                <a:latin typeface="Consolas" panose="020B0609020204030204" pitchFamily="49" charset="0"/>
+                <a:cs typeface="Consolas" panose="020B0609020204030204" pitchFamily="49" charset="0"/>
+              </a:rPr>
               <a:t>import </a:t>
             </a:r>
             <a:r>
-              <a:rPr lang="en-US" dirty="0"/>
+              <a:rPr lang="en-US" dirty="0">
+                <a:latin typeface="Consolas" panose="020B0609020204030204" pitchFamily="49" charset="0"/>
+                <a:cs typeface="Consolas" panose="020B0609020204030204" pitchFamily="49" charset="0"/>
+              </a:rPr>
               <a:t>'</a:t>
             </a:r>
             <a:r>
-              <a:rPr lang="en-US" dirty="0" err="1"/>
+              <a:rPr lang="en-US" dirty="0" err="1">
+                <a:latin typeface="Consolas" panose="020B0609020204030204" pitchFamily="49" charset="0"/>
+                <a:cs typeface="Consolas" panose="020B0609020204030204" pitchFamily="49" charset="0"/>
+              </a:rPr>
               <a:t>dart:html</a:t>
             </a:r>
             <a:r>
-              <a:rPr lang="en-US" dirty="0"/>
+              <a:rPr lang="en-US" dirty="0">
+                <a:latin typeface="Consolas" panose="020B0609020204030204" pitchFamily="49" charset="0"/>
+                <a:cs typeface="Consolas" panose="020B0609020204030204" pitchFamily="49" charset="0"/>
+              </a:rPr>
               <a:t>';</a:t>
             </a:r>
             <a:br>
-              <a:rPr lang="en-US" dirty="0"/>
+              <a:rPr lang="en-US" dirty="0">
+                <a:latin typeface="Consolas" panose="020B0609020204030204" pitchFamily="49" charset="0"/>
+                <a:cs typeface="Consolas" panose="020B0609020204030204" pitchFamily="49" charset="0"/>
+              </a:rPr>
             </a:br>
             <a:r>
-              <a:rPr lang="en-US" b="1" dirty="0"/>
+              <a:rPr lang="en-US" b="1" dirty="0">
+                <a:latin typeface="Consolas" panose="020B0609020204030204" pitchFamily="49" charset="0"/>
+                <a:cs typeface="Consolas" panose="020B0609020204030204" pitchFamily="49" charset="0"/>
+              </a:rPr>
               <a:t>import </a:t>
             </a:r>
             <a:r>
-              <a:rPr lang="en-US" dirty="0"/>
+              <a:rPr lang="en-US" dirty="0">
+                <a:latin typeface="Consolas" panose="020B0609020204030204" pitchFamily="49" charset="0"/>
+                <a:cs typeface="Consolas" panose="020B0609020204030204" pitchFamily="49" charset="0"/>
+              </a:rPr>
               <a:t>'</a:t>
             </a:r>
             <a:r>
-              <a:rPr lang="en-US" dirty="0" err="1"/>
+              <a:rPr lang="en-US" dirty="0" err="1">
+                <a:latin typeface="Consolas" panose="020B0609020204030204" pitchFamily="49" charset="0"/>
+                <a:cs typeface="Consolas" panose="020B0609020204030204" pitchFamily="49" charset="0"/>
+              </a:rPr>
               <a:t>dart:convert</a:t>
             </a:r>
             <a:r>
-              <a:rPr lang="en-US" dirty="0"/>
+              <a:rPr lang="en-US" dirty="0">
+                <a:latin typeface="Consolas" panose="020B0609020204030204" pitchFamily="49" charset="0"/>
+                <a:cs typeface="Consolas" panose="020B0609020204030204" pitchFamily="49" charset="0"/>
+              </a:rPr>
               <a:t>';</a:t>
             </a:r>
             <a:br>
-              <a:rPr lang="en-US" dirty="0"/>
+              <a:rPr lang="en-US" dirty="0">
+                <a:latin typeface="Consolas" panose="020B0609020204030204" pitchFamily="49" charset="0"/>
+                <a:cs typeface="Consolas" panose="020B0609020204030204" pitchFamily="49" charset="0"/>
+              </a:rPr>
             </a:br>
             <a:r>
-              <a:rPr lang="en-US" b="1" dirty="0"/>
+              <a:rPr lang="en-US" b="1" dirty="0">
+                <a:latin typeface="Consolas" panose="020B0609020204030204" pitchFamily="49" charset="0"/>
+                <a:cs typeface="Consolas" panose="020B0609020204030204" pitchFamily="49" charset="0"/>
+              </a:rPr>
               <a:t>import </a:t>
             </a:r>
             <a:r>
-              <a:rPr lang="en-US" dirty="0"/>
+              <a:rPr lang="en-US" dirty="0">
+                <a:latin typeface="Consolas" panose="020B0609020204030204" pitchFamily="49" charset="0"/>
+                <a:cs typeface="Consolas" panose="020B0609020204030204" pitchFamily="49" charset="0"/>
+              </a:rPr>
               <a:t>'</a:t>
             </a:r>
             <a:r>
-              <a:rPr lang="en-US" dirty="0" err="1"/>
+              <a:rPr lang="en-US" dirty="0" err="1">
+                <a:latin typeface="Consolas" panose="020B0609020204030204" pitchFamily="49" charset="0"/>
+                <a:cs typeface="Consolas" panose="020B0609020204030204" pitchFamily="49" charset="0"/>
+              </a:rPr>
               <a:t>dart:async</a:t>
             </a:r>
             <a:r>
-              <a:rPr lang="en-US" dirty="0"/>
+              <a:rPr lang="en-US" dirty="0">
+                <a:latin typeface="Consolas" panose="020B0609020204030204" pitchFamily="49" charset="0"/>
+                <a:cs typeface="Consolas" panose="020B0609020204030204" pitchFamily="49" charset="0"/>
+              </a:rPr>
               <a:t>';</a:t>
             </a:r>
             <a:br>
-              <a:rPr lang="en-US" dirty="0"/>
+              <a:rPr lang="en-US" dirty="0">
+                <a:latin typeface="Consolas" panose="020B0609020204030204" pitchFamily="49" charset="0"/>
+                <a:cs typeface="Consolas" panose="020B0609020204030204" pitchFamily="49" charset="0"/>
+              </a:rPr>
             </a:br>
             <a:r>
-              <a:rPr lang="en-US" dirty="0"/>
+              <a:rPr lang="en-US" dirty="0">
+                <a:latin typeface="Consolas" panose="020B0609020204030204" pitchFamily="49" charset="0"/>
+                <a:cs typeface="Consolas" panose="020B0609020204030204" pitchFamily="49" charset="0"/>
+              </a:rPr>
               <a:t/>
             </a:r>
             <a:br>
-              <a:rPr lang="en-US" dirty="0"/>
+              <a:rPr lang="en-US" dirty="0">
+                <a:latin typeface="Consolas" panose="020B0609020204030204" pitchFamily="49" charset="0"/>
+                <a:cs typeface="Consolas" panose="020B0609020204030204" pitchFamily="49" charset="0"/>
+              </a:rPr>
             </a:br>
             <a:r>
-              <a:rPr lang="en-US" dirty="0"/>
+              <a:rPr lang="en-US" dirty="0">
+                <a:latin typeface="Consolas" panose="020B0609020204030204" pitchFamily="49" charset="0"/>
+                <a:cs typeface="Consolas" panose="020B0609020204030204" pitchFamily="49" charset="0"/>
+              </a:rPr>
               <a:t>@Injectable()</a:t>
             </a:r>
-            <a:r>
-              <a:rPr lang="en-US"/>
+            <a:br>
+              <a:rPr lang="en-US" dirty="0">
+                <a:latin typeface="Consolas" panose="020B0609020204030204" pitchFamily="49" charset="0"/>
+                <a:cs typeface="Consolas" panose="020B0609020204030204" pitchFamily="49" charset="0"/>
+              </a:rPr>
+            </a:br>
+            <a:r>
+              <a:rPr lang="en-US" b="1" dirty="0" smtClean="0">
+                <a:latin typeface="Consolas" panose="020B0609020204030204" pitchFamily="49" charset="0"/>
+                <a:cs typeface="Consolas" panose="020B0609020204030204" pitchFamily="49" charset="0"/>
+              </a:rPr>
+              <a:t>class </a:t>
+            </a:r>
+            <a:r>
+              <a:rPr lang="en-US" dirty="0" err="1" smtClean="0">
+                <a:latin typeface="Consolas" panose="020B0609020204030204" pitchFamily="49" charset="0"/>
+                <a:cs typeface="Consolas" panose="020B0609020204030204" pitchFamily="49" charset="0"/>
+              </a:rPr>
+              <a:t>AppService</a:t>
+            </a:r>
+            <a:r>
+              <a:rPr lang="en-US" dirty="0" smtClean="0">
+                <a:latin typeface="Consolas" panose="020B0609020204030204" pitchFamily="49" charset="0"/>
+                <a:cs typeface="Consolas" panose="020B0609020204030204" pitchFamily="49" charset="0"/>
+              </a:rPr>
+              <a:t> {</a:t>
+            </a:r>
+            <a:br>
+              <a:rPr lang="en-US" dirty="0" smtClean="0">
+                <a:latin typeface="Consolas" panose="020B0609020204030204" pitchFamily="49" charset="0"/>
+                <a:cs typeface="Consolas" panose="020B0609020204030204" pitchFamily="49" charset="0"/>
+              </a:rPr>
+            </a:br>
+            <a:r>
+              <a:rPr lang="en-US" dirty="0" smtClean="0">
+                <a:latin typeface="Consolas" panose="020B0609020204030204" pitchFamily="49" charset="0"/>
+                <a:cs typeface="Consolas" panose="020B0609020204030204" pitchFamily="49" charset="0"/>
+              </a:rPr>
+              <a:t>  String </a:t>
+            </a:r>
+            <a:r>
+              <a:rPr lang="en-US" b="1" dirty="0">
+                <a:latin typeface="Consolas" panose="020B0609020204030204" pitchFamily="49" charset="0"/>
+                <a:cs typeface="Consolas" panose="020B0609020204030204" pitchFamily="49" charset="0"/>
+              </a:rPr>
+              <a:t>get </a:t>
+            </a:r>
+            <a:r>
+              <a:rPr lang="en-US" dirty="0" err="1">
+                <a:latin typeface="Consolas" panose="020B0609020204030204" pitchFamily="49" charset="0"/>
+                <a:cs typeface="Consolas" panose="020B0609020204030204" pitchFamily="49" charset="0"/>
+              </a:rPr>
+              <a:t>pathToData</a:t>
+            </a:r>
+            <a:r>
+              <a:rPr lang="en-US" dirty="0">
+                <a:latin typeface="Consolas" panose="020B0609020204030204" pitchFamily="49" charset="0"/>
+                <a:cs typeface="Consolas" panose="020B0609020204030204" pitchFamily="49" charset="0"/>
+              </a:rPr>
+              <a:t> </a:t>
+            </a:r>
+            <a:r>
+              <a:rPr lang="en-US" dirty="0" smtClean="0">
+                <a:latin typeface="Consolas" panose="020B0609020204030204" pitchFamily="49" charset="0"/>
+                <a:cs typeface="Consolas" panose="020B0609020204030204" pitchFamily="49" charset="0"/>
+              </a:rPr>
+              <a:t>=&gt; </a:t>
+            </a:r>
+            <a:r>
+              <a:rPr lang="en-US" dirty="0">
+                <a:latin typeface="Consolas" panose="020B0609020204030204" pitchFamily="49" charset="0"/>
+                <a:cs typeface="Consolas" panose="020B0609020204030204" pitchFamily="49" charset="0"/>
+              </a:rPr>
+              <a:t>"../web/</a:t>
+            </a:r>
+            <a:r>
+              <a:rPr lang="en-US" dirty="0" err="1">
+                <a:latin typeface="Consolas" panose="020B0609020204030204" pitchFamily="49" charset="0"/>
+                <a:cs typeface="Consolas" panose="020B0609020204030204" pitchFamily="49" charset="0"/>
+              </a:rPr>
+              <a:t>data.json</a:t>
+            </a:r>
+            <a:r>
+              <a:rPr lang="en-US" dirty="0">
+                <a:latin typeface="Consolas" panose="020B0609020204030204" pitchFamily="49" charset="0"/>
+                <a:cs typeface="Consolas" panose="020B0609020204030204" pitchFamily="49" charset="0"/>
+              </a:rPr>
+              <a:t>";</a:t>
+            </a:r>
+            <a:br>
+              <a:rPr lang="en-US" dirty="0">
+                <a:latin typeface="Consolas" panose="020B0609020204030204" pitchFamily="49" charset="0"/>
+                <a:cs typeface="Consolas" panose="020B0609020204030204" pitchFamily="49" charset="0"/>
+              </a:rPr>
+            </a:br>
+            <a:r>
+              <a:rPr lang="en-US" dirty="0" smtClean="0">
+                <a:latin typeface="Consolas" panose="020B0609020204030204" pitchFamily="49" charset="0"/>
+                <a:cs typeface="Consolas" panose="020B0609020204030204" pitchFamily="49" charset="0"/>
+              </a:rPr>
+              <a:t>  List&lt;Map&gt; </a:t>
+            </a:r>
+            <a:r>
+              <a:rPr lang="en-US" dirty="0" err="1">
+                <a:latin typeface="Consolas" panose="020B0609020204030204" pitchFamily="49" charset="0"/>
+                <a:cs typeface="Consolas" panose="020B0609020204030204" pitchFamily="49" charset="0"/>
+              </a:rPr>
+              <a:t>theData</a:t>
+            </a:r>
+            <a:r>
+              <a:rPr lang="en-US" dirty="0">
+                <a:latin typeface="Consolas" panose="020B0609020204030204" pitchFamily="49" charset="0"/>
+                <a:cs typeface="Consolas" panose="020B0609020204030204" pitchFamily="49" charset="0"/>
+              </a:rPr>
+              <a:t> </a:t>
+            </a:r>
+            <a:r>
+              <a:rPr lang="en-US" dirty="0" smtClean="0">
+                <a:latin typeface="Consolas" panose="020B0609020204030204" pitchFamily="49" charset="0"/>
+                <a:cs typeface="Consolas" panose="020B0609020204030204" pitchFamily="49" charset="0"/>
+              </a:rPr>
+              <a:t>= []</a:t>
+            </a:r>
+            <a:r>
+              <a:rPr lang="en-US" dirty="0">
+                <a:latin typeface="Consolas" panose="020B0609020204030204" pitchFamily="49" charset="0"/>
+                <a:cs typeface="Consolas" panose="020B0609020204030204" pitchFamily="49" charset="0"/>
+              </a:rPr>
+              <a:t>;</a:t>
+            </a:r>
+            <a:br>
+              <a:rPr lang="en-US" dirty="0">
+                <a:latin typeface="Consolas" panose="020B0609020204030204" pitchFamily="49" charset="0"/>
+                <a:cs typeface="Consolas" panose="020B0609020204030204" pitchFamily="49" charset="0"/>
+              </a:rPr>
+            </a:br>
+            <a:r>
+              <a:rPr lang="en-US" dirty="0">
+                <a:latin typeface="Consolas" panose="020B0609020204030204" pitchFamily="49" charset="0"/>
+                <a:cs typeface="Consolas" panose="020B0609020204030204" pitchFamily="49" charset="0"/>
+              </a:rPr>
               <a:t/>
             </a:r>
             <a:br>
-              <a:rPr lang="en-US"/>
+              <a:rPr lang="en-US" dirty="0">
+                <a:latin typeface="Consolas" panose="020B0609020204030204" pitchFamily="49" charset="0"/>
+                <a:cs typeface="Consolas" panose="020B0609020204030204" pitchFamily="49" charset="0"/>
+              </a:rPr>
             </a:br>
             <a:r>
-              <a:rPr lang="en-US" b="1" smtClean="0"/>
-              <a:t>class </a:t>
-            </a:r>
-            <a:r>
-              <a:rPr lang="en-US" dirty="0" err="1" smtClean="0"/>
-              <a:t>AppService</a:t>
-            </a:r>
-            <a:r>
-              <a:rPr lang="en-US" dirty="0" smtClean="0"/>
-              <a:t> {</a:t>
-            </a:r>
-            <a:br>
-              <a:rPr lang="en-US" dirty="0" smtClean="0"/>
-            </a:br>
-            <a:r>
-              <a:rPr lang="en-US" dirty="0" smtClean="0"/>
-              <a:t>  String </a:t>
-            </a:r>
-            <a:r>
-              <a:rPr lang="en-US" b="1" dirty="0"/>
-              <a:t>get </a:t>
-            </a:r>
-            <a:r>
-              <a:rPr lang="en-US" dirty="0" err="1"/>
-              <a:t>pathToData</a:t>
-            </a:r>
-            <a:r>
-              <a:rPr lang="en-US" dirty="0"/>
-              <a:t> </a:t>
-            </a:r>
-            <a:r>
-              <a:rPr lang="en-US" dirty="0" smtClean="0"/>
-              <a:t>=&gt; </a:t>
-            </a:r>
-            <a:r>
-              <a:rPr lang="en-US" dirty="0"/>
-              <a:t>"../web/</a:t>
-            </a:r>
-            <a:r>
-              <a:rPr lang="en-US" dirty="0" err="1"/>
-              <a:t>data.json</a:t>
-            </a:r>
-            <a:r>
-              <a:rPr lang="en-US" dirty="0"/>
-              <a:t>";</a:t>
-            </a:r>
-            <a:br>
-              <a:rPr lang="en-US" dirty="0"/>
-            </a:br>
-            <a:r>
-              <a:rPr lang="en-US" dirty="0" smtClean="0"/>
-              <a:t>  List&lt;Map&gt; </a:t>
-            </a:r>
-            <a:r>
-              <a:rPr lang="en-US" dirty="0" err="1"/>
-              <a:t>theData</a:t>
-            </a:r>
-            <a:r>
-              <a:rPr lang="en-US" dirty="0"/>
-              <a:t> </a:t>
-            </a:r>
-            <a:r>
-              <a:rPr lang="en-US" dirty="0" smtClean="0"/>
-              <a:t>= []</a:t>
-            </a:r>
-            <a:r>
-              <a:rPr lang="en-US" dirty="0"/>
-              <a:t>;</a:t>
-            </a:r>
-            <a:br>
-              <a:rPr lang="en-US" dirty="0"/>
-            </a:br>
-            <a:r>
-              <a:rPr lang="en-US" dirty="0"/>
-              <a:t/>
-            </a:r>
-            <a:br>
-              <a:rPr lang="en-US" dirty="0"/>
-            </a:br>
-            <a:r>
-              <a:rPr lang="en-US" dirty="0"/>
+              <a:rPr lang="en-US" dirty="0">
+                <a:latin typeface="Consolas" panose="020B0609020204030204" pitchFamily="49" charset="0"/>
+                <a:cs typeface="Consolas" panose="020B0609020204030204" pitchFamily="49" charset="0"/>
+              </a:rPr>
               <a:t>  </a:t>
             </a:r>
             <a:r>
-              <a:rPr lang="en-US" dirty="0" smtClean="0"/>
+              <a:rPr lang="en-US" dirty="0" smtClean="0">
+                <a:latin typeface="Consolas" panose="020B0609020204030204" pitchFamily="49" charset="0"/>
+                <a:cs typeface="Consolas" panose="020B0609020204030204" pitchFamily="49" charset="0"/>
+              </a:rPr>
               <a:t>Future </a:t>
             </a:r>
             <a:r>
-              <a:rPr lang="en-US" dirty="0" err="1"/>
+              <a:rPr lang="en-US" dirty="0" err="1">
+                <a:latin typeface="Consolas" panose="020B0609020204030204" pitchFamily="49" charset="0"/>
+                <a:cs typeface="Consolas" panose="020B0609020204030204" pitchFamily="49" charset="0"/>
+              </a:rPr>
               <a:t>getData</a:t>
             </a:r>
             <a:r>
-              <a:rPr lang="en-US" dirty="0" smtClean="0"/>
+              <a:rPr lang="en-US" dirty="0" smtClean="0">
+                <a:latin typeface="Consolas" panose="020B0609020204030204" pitchFamily="49" charset="0"/>
+                <a:cs typeface="Consolas" panose="020B0609020204030204" pitchFamily="49" charset="0"/>
+              </a:rPr>
               <a:t>() {</a:t>
             </a:r>
           </a:p>
@@ -15681,15 +16553,24 @@
               <a:buNone/>
             </a:pPr>
             <a:r>
-              <a:rPr lang="en-US" dirty="0" smtClean="0"/>
+              <a:rPr lang="en-US" dirty="0" smtClean="0">
+                <a:latin typeface="Consolas" panose="020B0609020204030204" pitchFamily="49" charset="0"/>
+                <a:cs typeface="Consolas" panose="020B0609020204030204" pitchFamily="49" charset="0"/>
+              </a:rPr>
               <a:t>    Future </a:t>
             </a:r>
             <a:r>
-              <a:rPr lang="en-US" dirty="0" err="1" smtClean="0"/>
+              <a:rPr lang="en-US" dirty="0" err="1" smtClean="0">
+                <a:latin typeface="Consolas" panose="020B0609020204030204" pitchFamily="49" charset="0"/>
+                <a:cs typeface="Consolas" panose="020B0609020204030204" pitchFamily="49" charset="0"/>
+              </a:rPr>
               <a:t>dataReceived</a:t>
             </a:r>
             <a:r>
-              <a:rPr lang="en-US" dirty="0" smtClean="0"/>
+              <a:rPr lang="en-US" dirty="0" smtClean="0">
+                <a:latin typeface="Consolas" panose="020B0609020204030204" pitchFamily="49" charset="0"/>
+                <a:cs typeface="Consolas" panose="020B0609020204030204" pitchFamily="49" charset="0"/>
+              </a:rPr>
               <a:t> = </a:t>
             </a:r>
           </a:p>
@@ -15698,31 +16579,52 @@
               <a:buNone/>
             </a:pPr>
             <a:r>
-              <a:rPr lang="en-US" dirty="0"/>
+              <a:rPr lang="en-US" dirty="0">
+                <a:latin typeface="Consolas" panose="020B0609020204030204" pitchFamily="49" charset="0"/>
+                <a:cs typeface="Consolas" panose="020B0609020204030204" pitchFamily="49" charset="0"/>
+              </a:rPr>
               <a:t> </a:t>
             </a:r>
             <a:r>
-              <a:rPr lang="en-US" dirty="0" smtClean="0"/>
+              <a:rPr lang="en-US" dirty="0" smtClean="0">
+                <a:latin typeface="Consolas" panose="020B0609020204030204" pitchFamily="49" charset="0"/>
+                <a:cs typeface="Consolas" panose="020B0609020204030204" pitchFamily="49" charset="0"/>
+              </a:rPr>
               <a:t>     </a:t>
             </a:r>
             <a:r>
-              <a:rPr lang="en-US" dirty="0" err="1" smtClean="0"/>
+              <a:rPr lang="en-US" dirty="0" err="1" smtClean="0">
+                <a:latin typeface="Consolas" panose="020B0609020204030204" pitchFamily="49" charset="0"/>
+                <a:cs typeface="Consolas" panose="020B0609020204030204" pitchFamily="49" charset="0"/>
+              </a:rPr>
               <a:t>HttpRequest.</a:t>
             </a:r>
             <a:r>
-              <a:rPr lang="en-US" i="1" dirty="0" err="1" smtClean="0"/>
+              <a:rPr lang="en-US" i="1" dirty="0" err="1" smtClean="0">
+                <a:latin typeface="Consolas" panose="020B0609020204030204" pitchFamily="49" charset="0"/>
+                <a:cs typeface="Consolas" panose="020B0609020204030204" pitchFamily="49" charset="0"/>
+              </a:rPr>
               <a:t>getString</a:t>
             </a:r>
             <a:r>
-              <a:rPr lang="en-US" dirty="0" smtClean="0"/>
+              <a:rPr lang="en-US" dirty="0" smtClean="0">
+                <a:latin typeface="Consolas" panose="020B0609020204030204" pitchFamily="49" charset="0"/>
+                <a:cs typeface="Consolas" panose="020B0609020204030204" pitchFamily="49" charset="0"/>
+              </a:rPr>
               <a:t>(</a:t>
             </a:r>
             <a:r>
-              <a:rPr lang="en-US" dirty="0" err="1" smtClean="0"/>
+              <a:rPr lang="en-US" dirty="0" err="1" smtClean="0">
+                <a:latin typeface="Consolas" panose="020B0609020204030204" pitchFamily="49" charset="0"/>
+                <a:cs typeface="Consolas" panose="020B0609020204030204" pitchFamily="49" charset="0"/>
+              </a:rPr>
               <a:t>pathToData</a:t>
             </a:r>
             <a:r>
-              <a:rPr lang="en-US" dirty="0" smtClean="0"/>
+              <a:rPr lang="en-US" dirty="0" smtClean="0">
+                <a:latin typeface="Consolas" panose="020B0609020204030204" pitchFamily="49" charset="0"/>
+                <a:cs typeface="Consolas" panose="020B0609020204030204" pitchFamily="49" charset="0"/>
+              </a:rPr>
               <a:t>).then((data) {</a:t>
             </a:r>
           </a:p>
@@ -15731,53 +16633,92 @@
               <a:buNone/>
             </a:pPr>
             <a:r>
-              <a:rPr lang="en-US" dirty="0" smtClean="0"/>
+              <a:rPr lang="en-US" dirty="0" smtClean="0">
+                <a:latin typeface="Consolas" panose="020B0609020204030204" pitchFamily="49" charset="0"/>
+                <a:cs typeface="Consolas" panose="020B0609020204030204" pitchFamily="49" charset="0"/>
+              </a:rPr>
               <a:t>        List&lt;Map&gt; decoded = </a:t>
             </a:r>
             <a:r>
-              <a:rPr lang="en-US" dirty="0" err="1" smtClean="0"/>
+              <a:rPr lang="en-US" dirty="0" err="1" smtClean="0">
+                <a:latin typeface="Consolas" panose="020B0609020204030204" pitchFamily="49" charset="0"/>
+                <a:cs typeface="Consolas" panose="020B0609020204030204" pitchFamily="49" charset="0"/>
+              </a:rPr>
               <a:t>JSON.decode</a:t>
             </a:r>
             <a:r>
-              <a:rPr lang="en-US" dirty="0" smtClean="0"/>
+              <a:rPr lang="en-US" dirty="0" smtClean="0">
+                <a:latin typeface="Consolas" panose="020B0609020204030204" pitchFamily="49" charset="0"/>
+                <a:cs typeface="Consolas" panose="020B0609020204030204" pitchFamily="49" charset="0"/>
+              </a:rPr>
               <a:t>(data)</a:t>
             </a:r>
             <a:r>
-              <a:rPr lang="en-US" dirty="0"/>
+              <a:rPr lang="en-US" dirty="0">
+                <a:latin typeface="Consolas" panose="020B0609020204030204" pitchFamily="49" charset="0"/>
+                <a:cs typeface="Consolas" panose="020B0609020204030204" pitchFamily="49" charset="0"/>
+              </a:rPr>
               <a:t>;</a:t>
             </a:r>
             <a:br>
-              <a:rPr lang="en-US" dirty="0"/>
+              <a:rPr lang="en-US" dirty="0">
+                <a:latin typeface="Consolas" panose="020B0609020204030204" pitchFamily="49" charset="0"/>
+                <a:cs typeface="Consolas" panose="020B0609020204030204" pitchFamily="49" charset="0"/>
+              </a:rPr>
             </a:br>
             <a:r>
-              <a:rPr lang="en-US" dirty="0"/>
+              <a:rPr lang="en-US" dirty="0">
+                <a:latin typeface="Consolas" panose="020B0609020204030204" pitchFamily="49" charset="0"/>
+                <a:cs typeface="Consolas" panose="020B0609020204030204" pitchFamily="49" charset="0"/>
+              </a:rPr>
               <a:t>      </a:t>
             </a:r>
             <a:r>
-              <a:rPr lang="en-US" dirty="0" smtClean="0"/>
+              <a:rPr lang="en-US" dirty="0" smtClean="0">
+                <a:latin typeface="Consolas" panose="020B0609020204030204" pitchFamily="49" charset="0"/>
+                <a:cs typeface="Consolas" panose="020B0609020204030204" pitchFamily="49" charset="0"/>
+              </a:rPr>
               <a:t>  </a:t>
             </a:r>
             <a:r>
-              <a:rPr lang="en-US" b="1" dirty="0" smtClean="0"/>
+              <a:rPr lang="en-US" b="1" dirty="0" smtClean="0">
+                <a:latin typeface="Consolas" panose="020B0609020204030204" pitchFamily="49" charset="0"/>
+                <a:cs typeface="Consolas" panose="020B0609020204030204" pitchFamily="49" charset="0"/>
+              </a:rPr>
               <a:t>return </a:t>
             </a:r>
             <a:r>
-              <a:rPr lang="en-US" dirty="0" smtClean="0"/>
+              <a:rPr lang="en-US" dirty="0" smtClean="0">
+                <a:latin typeface="Consolas" panose="020B0609020204030204" pitchFamily="49" charset="0"/>
+                <a:cs typeface="Consolas" panose="020B0609020204030204" pitchFamily="49" charset="0"/>
+              </a:rPr>
               <a:t>decoded</a:t>
             </a:r>
             <a:r>
-              <a:rPr lang="en-US" dirty="0"/>
+              <a:rPr lang="en-US" dirty="0">
+                <a:latin typeface="Consolas" panose="020B0609020204030204" pitchFamily="49" charset="0"/>
+                <a:cs typeface="Consolas" panose="020B0609020204030204" pitchFamily="49" charset="0"/>
+              </a:rPr>
               <a:t>;</a:t>
             </a:r>
             <a:br>
-              <a:rPr lang="en-US" dirty="0"/>
+              <a:rPr lang="en-US" dirty="0">
+                <a:latin typeface="Consolas" panose="020B0609020204030204" pitchFamily="49" charset="0"/>
+                <a:cs typeface="Consolas" panose="020B0609020204030204" pitchFamily="49" charset="0"/>
+              </a:rPr>
             </a:br>
             <a:r>
-              <a:rPr lang="en-US" dirty="0"/>
+              <a:rPr lang="en-US" dirty="0">
+                <a:latin typeface="Consolas" panose="020B0609020204030204" pitchFamily="49" charset="0"/>
+                <a:cs typeface="Consolas" panose="020B0609020204030204" pitchFamily="49" charset="0"/>
+              </a:rPr>
               <a:t>    </a:t>
             </a:r>
             <a:r>
-              <a:rPr lang="en-US" dirty="0" smtClean="0"/>
+              <a:rPr lang="en-US" dirty="0" smtClean="0">
+                <a:latin typeface="Consolas" panose="020B0609020204030204" pitchFamily="49" charset="0"/>
+                <a:cs typeface="Consolas" panose="020B0609020204030204" pitchFamily="49" charset="0"/>
+              </a:rPr>
               <a:t>  });</a:t>
             </a:r>
           </a:p>
@@ -15786,30 +16727,51 @@
               <a:buNone/>
             </a:pPr>
             <a:r>
-              <a:rPr lang="en-US" dirty="0" smtClean="0"/>
+              <a:rPr lang="en-US" dirty="0" smtClean="0">
+                <a:latin typeface="Consolas" panose="020B0609020204030204" pitchFamily="49" charset="0"/>
+                <a:cs typeface="Consolas" panose="020B0609020204030204" pitchFamily="49" charset="0"/>
+              </a:rPr>
               <a:t>    </a:t>
             </a:r>
             <a:r>
-              <a:rPr lang="en-US" b="1" dirty="0"/>
+              <a:rPr lang="en-US" b="1" dirty="0">
+                <a:latin typeface="Consolas" panose="020B0609020204030204" pitchFamily="49" charset="0"/>
+                <a:cs typeface="Consolas" panose="020B0609020204030204" pitchFamily="49" charset="0"/>
+              </a:rPr>
               <a:t>return </a:t>
             </a:r>
             <a:r>
-              <a:rPr lang="en-US" dirty="0" err="1" smtClean="0"/>
+              <a:rPr lang="en-US" dirty="0" err="1" smtClean="0">
+                <a:latin typeface="Consolas" panose="020B0609020204030204" pitchFamily="49" charset="0"/>
+                <a:cs typeface="Consolas" panose="020B0609020204030204" pitchFamily="49" charset="0"/>
+              </a:rPr>
               <a:t>dataReceived</a:t>
             </a:r>
             <a:r>
-              <a:rPr lang="en-US" dirty="0"/>
+              <a:rPr lang="en-US" dirty="0">
+                <a:latin typeface="Consolas" panose="020B0609020204030204" pitchFamily="49" charset="0"/>
+                <a:cs typeface="Consolas" panose="020B0609020204030204" pitchFamily="49" charset="0"/>
+              </a:rPr>
               <a:t>;</a:t>
             </a:r>
             <a:br>
-              <a:rPr lang="en-US" dirty="0"/>
+              <a:rPr lang="en-US" dirty="0">
+                <a:latin typeface="Consolas" panose="020B0609020204030204" pitchFamily="49" charset="0"/>
+                <a:cs typeface="Consolas" panose="020B0609020204030204" pitchFamily="49" charset="0"/>
+              </a:rPr>
             </a:br>
             <a:r>
-              <a:rPr lang="en-US" dirty="0"/>
+              <a:rPr lang="en-US" dirty="0">
+                <a:latin typeface="Consolas" panose="020B0609020204030204" pitchFamily="49" charset="0"/>
+                <a:cs typeface="Consolas" panose="020B0609020204030204" pitchFamily="49" charset="0"/>
+              </a:rPr>
               <a:t>  </a:t>
             </a:r>
             <a:r>
-              <a:rPr lang="en-US" dirty="0" smtClean="0"/>
+              <a:rPr lang="en-US" dirty="0" smtClean="0">
+                <a:latin typeface="Consolas" panose="020B0609020204030204" pitchFamily="49" charset="0"/>
+                <a:cs typeface="Consolas" panose="020B0609020204030204" pitchFamily="49" charset="0"/>
+              </a:rPr>
               <a:t>}</a:t>
             </a:r>
           </a:p>
@@ -15818,10 +16780,16 @@
               <a:buNone/>
             </a:pPr>
             <a:r>
-              <a:rPr lang="en-US" dirty="0" smtClean="0"/>
+              <a:rPr lang="en-US" dirty="0" smtClean="0">
+                <a:latin typeface="Consolas" panose="020B0609020204030204" pitchFamily="49" charset="0"/>
+                <a:cs typeface="Consolas" panose="020B0609020204030204" pitchFamily="49" charset="0"/>
+              </a:rPr>
               <a:t>}</a:t>
             </a:r>
-            <a:endParaRPr lang="en-US" dirty="0"/>
+            <a:endParaRPr lang="en-US" dirty="0">
+              <a:latin typeface="Consolas" panose="020B0609020204030204" pitchFamily="49" charset="0"/>
+              <a:cs typeface="Consolas" panose="020B0609020204030204" pitchFamily="49" charset="0"/>
+            </a:endParaRPr>
           </a:p>
         </p:txBody>
       </p:sp>
@@ -16547,37 +17515,64 @@
               <a:buNone/>
             </a:pPr>
             <a:r>
-              <a:rPr lang="en-US" b="1" dirty="0"/>
+              <a:rPr lang="en-US" b="1" dirty="0">
+                <a:latin typeface="Consolas" panose="020B0609020204030204" pitchFamily="49" charset="0"/>
+                <a:cs typeface="Consolas" panose="020B0609020204030204" pitchFamily="49" charset="0"/>
+              </a:rPr>
               <a:t>import </a:t>
             </a:r>
             <a:r>
-              <a:rPr lang="en-US" dirty="0"/>
+              <a:rPr lang="en-US" dirty="0">
+                <a:latin typeface="Consolas" panose="020B0609020204030204" pitchFamily="49" charset="0"/>
+                <a:cs typeface="Consolas" panose="020B0609020204030204" pitchFamily="49" charset="0"/>
+              </a:rPr>
               <a:t>'</a:t>
             </a:r>
             <a:r>
-              <a:rPr lang="en-US" dirty="0" err="1"/>
+              <a:rPr lang="en-US" dirty="0" err="1">
+                <a:latin typeface="Consolas" panose="020B0609020204030204" pitchFamily="49" charset="0"/>
+                <a:cs typeface="Consolas" panose="020B0609020204030204" pitchFamily="49" charset="0"/>
+              </a:rPr>
               <a:t>app_service.dart</a:t>
             </a:r>
             <a:r>
-              <a:rPr lang="en-US" dirty="0"/>
+              <a:rPr lang="en-US" dirty="0">
+                <a:latin typeface="Consolas" panose="020B0609020204030204" pitchFamily="49" charset="0"/>
+                <a:cs typeface="Consolas" panose="020B0609020204030204" pitchFamily="49" charset="0"/>
+              </a:rPr>
               <a:t>';</a:t>
             </a:r>
             <a:br>
-              <a:rPr lang="en-US" dirty="0"/>
+              <a:rPr lang="en-US" dirty="0">
+                <a:latin typeface="Consolas" panose="020B0609020204030204" pitchFamily="49" charset="0"/>
+                <a:cs typeface="Consolas" panose="020B0609020204030204" pitchFamily="49" charset="0"/>
+              </a:rPr>
             </a:br>
             <a:r>
-              <a:rPr lang="en-US" dirty="0"/>
+              <a:rPr lang="en-US" dirty="0">
+                <a:latin typeface="Consolas" panose="020B0609020204030204" pitchFamily="49" charset="0"/>
+                <a:cs typeface="Consolas" panose="020B0609020204030204" pitchFamily="49" charset="0"/>
+              </a:rPr>
               <a:t/>
             </a:r>
             <a:br>
-              <a:rPr lang="en-US" dirty="0"/>
+              <a:rPr lang="en-US" dirty="0">
+                <a:latin typeface="Consolas" panose="020B0609020204030204" pitchFamily="49" charset="0"/>
+                <a:cs typeface="Consolas" panose="020B0609020204030204" pitchFamily="49" charset="0"/>
+              </a:rPr>
             </a:br>
             <a:r>
-              <a:rPr lang="en-US" dirty="0"/>
+              <a:rPr lang="en-US" dirty="0">
+                <a:latin typeface="Consolas" panose="020B0609020204030204" pitchFamily="49" charset="0"/>
+                <a:cs typeface="Consolas" panose="020B0609020204030204" pitchFamily="49" charset="0"/>
+              </a:rPr>
               <a:t>@Component</a:t>
             </a:r>
             <a:r>
-              <a:rPr lang="en-US" dirty="0" smtClean="0"/>
+              <a:rPr lang="en-US" dirty="0" smtClean="0">
+                <a:latin typeface="Consolas" panose="020B0609020204030204" pitchFamily="49" charset="0"/>
+                <a:cs typeface="Consolas" panose="020B0609020204030204" pitchFamily="49" charset="0"/>
+              </a:rPr>
               <a:t>(</a:t>
             </a:r>
           </a:p>
@@ -16586,63 +17581,108 @@
               <a:buNone/>
             </a:pPr>
             <a:r>
-              <a:rPr lang="en-US" dirty="0" smtClean="0"/>
+              <a:rPr lang="en-US" dirty="0" smtClean="0">
+                <a:latin typeface="Consolas" panose="020B0609020204030204" pitchFamily="49" charset="0"/>
+                <a:cs typeface="Consolas" panose="020B0609020204030204" pitchFamily="49" charset="0"/>
+              </a:rPr>
               <a:t>  …</a:t>
             </a:r>
             <a:r>
-              <a:rPr lang="en-US" dirty="0"/>
+              <a:rPr lang="en-US" dirty="0">
+                <a:latin typeface="Consolas" panose="020B0609020204030204" pitchFamily="49" charset="0"/>
+                <a:cs typeface="Consolas" panose="020B0609020204030204" pitchFamily="49" charset="0"/>
+              </a:rPr>
               <a:t/>
             </a:r>
             <a:br>
-              <a:rPr lang="en-US" dirty="0"/>
+              <a:rPr lang="en-US" dirty="0">
+                <a:latin typeface="Consolas" panose="020B0609020204030204" pitchFamily="49" charset="0"/>
+                <a:cs typeface="Consolas" panose="020B0609020204030204" pitchFamily="49" charset="0"/>
+              </a:rPr>
             </a:br>
             <a:r>
-              <a:rPr lang="en-US" dirty="0" smtClean="0"/>
+              <a:rPr lang="en-US" dirty="0" smtClean="0">
+                <a:latin typeface="Consolas" panose="020B0609020204030204" pitchFamily="49" charset="0"/>
+                <a:cs typeface="Consolas" panose="020B0609020204030204" pitchFamily="49" charset="0"/>
+              </a:rPr>
               <a:t>  providers: </a:t>
             </a:r>
             <a:r>
-              <a:rPr lang="en-US" b="1" dirty="0" err="1"/>
+              <a:rPr lang="en-US" b="1" dirty="0" err="1">
+                <a:latin typeface="Consolas" panose="020B0609020204030204" pitchFamily="49" charset="0"/>
+                <a:cs typeface="Consolas" panose="020B0609020204030204" pitchFamily="49" charset="0"/>
+              </a:rPr>
               <a:t>const</a:t>
             </a:r>
             <a:r>
-              <a:rPr lang="en-US" b="1" dirty="0"/>
+              <a:rPr lang="en-US" b="1" dirty="0">
+                <a:latin typeface="Consolas" panose="020B0609020204030204" pitchFamily="49" charset="0"/>
+                <a:cs typeface="Consolas" panose="020B0609020204030204" pitchFamily="49" charset="0"/>
+              </a:rPr>
               <a:t> </a:t>
             </a:r>
             <a:r>
-              <a:rPr lang="en-US" dirty="0" smtClean="0"/>
+              <a:rPr lang="en-US" dirty="0" smtClean="0">
+                <a:latin typeface="Consolas" panose="020B0609020204030204" pitchFamily="49" charset="0"/>
+                <a:cs typeface="Consolas" panose="020B0609020204030204" pitchFamily="49" charset="0"/>
+              </a:rPr>
               <a:t>[</a:t>
             </a:r>
             <a:r>
-              <a:rPr lang="en-US" dirty="0" err="1" smtClean="0"/>
+              <a:rPr lang="en-US" dirty="0" err="1" smtClean="0">
+                <a:latin typeface="Consolas" panose="020B0609020204030204" pitchFamily="49" charset="0"/>
+                <a:cs typeface="Consolas" panose="020B0609020204030204" pitchFamily="49" charset="0"/>
+              </a:rPr>
               <a:t>AppService</a:t>
             </a:r>
             <a:r>
-              <a:rPr lang="en-US" dirty="0" smtClean="0"/>
+              <a:rPr lang="en-US" dirty="0" smtClean="0">
+                <a:latin typeface="Consolas" panose="020B0609020204030204" pitchFamily="49" charset="0"/>
+                <a:cs typeface="Consolas" panose="020B0609020204030204" pitchFamily="49" charset="0"/>
+              </a:rPr>
               <a:t>]</a:t>
             </a:r>
             <a:r>
-              <a:rPr lang="en-US" dirty="0"/>
+              <a:rPr lang="en-US" dirty="0">
+                <a:latin typeface="Consolas" panose="020B0609020204030204" pitchFamily="49" charset="0"/>
+                <a:cs typeface="Consolas" panose="020B0609020204030204" pitchFamily="49" charset="0"/>
+              </a:rPr>
               <a:t>)</a:t>
             </a:r>
             <a:br>
-              <a:rPr lang="en-US" dirty="0"/>
+              <a:rPr lang="en-US" dirty="0">
+                <a:latin typeface="Consolas" panose="020B0609020204030204" pitchFamily="49" charset="0"/>
+                <a:cs typeface="Consolas" panose="020B0609020204030204" pitchFamily="49" charset="0"/>
+              </a:rPr>
             </a:br>
-            <a:endParaRPr lang="en-US" dirty="0" smtClean="0"/>
+            <a:endParaRPr lang="en-US" dirty="0" smtClean="0">
+              <a:latin typeface="Consolas" panose="020B0609020204030204" pitchFamily="49" charset="0"/>
+              <a:cs typeface="Consolas" panose="020B0609020204030204" pitchFamily="49" charset="0"/>
+            </a:endParaRPr>
           </a:p>
           <a:p>
             <a:pPr marL="0" indent="0">
               <a:buNone/>
             </a:pPr>
             <a:r>
-              <a:rPr lang="en-US" b="1" dirty="0" smtClean="0"/>
+              <a:rPr lang="en-US" b="1" dirty="0" smtClean="0">
+                <a:latin typeface="Consolas" panose="020B0609020204030204" pitchFamily="49" charset="0"/>
+                <a:cs typeface="Consolas" panose="020B0609020204030204" pitchFamily="49" charset="0"/>
+              </a:rPr>
               <a:t>class </a:t>
             </a:r>
             <a:r>
-              <a:rPr lang="en-US" dirty="0" err="1" smtClean="0"/>
+              <a:rPr lang="en-US" dirty="0" err="1" smtClean="0">
+                <a:latin typeface="Consolas" panose="020B0609020204030204" pitchFamily="49" charset="0"/>
+                <a:cs typeface="Consolas" panose="020B0609020204030204" pitchFamily="49" charset="0"/>
+              </a:rPr>
               <a:t>MainComponent</a:t>
             </a:r>
             <a:r>
-              <a:rPr lang="en-US" dirty="0" smtClean="0"/>
+              <a:rPr lang="en-US" dirty="0" smtClean="0">
+                <a:latin typeface="Consolas" panose="020B0609020204030204" pitchFamily="49" charset="0"/>
+                <a:cs typeface="Consolas" panose="020B0609020204030204" pitchFamily="49" charset="0"/>
+              </a:rPr>
               <a:t> {</a:t>
             </a:r>
           </a:p>
@@ -16651,7 +17691,10 @@
               <a:buNone/>
             </a:pPr>
             <a:r>
-              <a:rPr lang="en-US" dirty="0" smtClean="0"/>
+              <a:rPr lang="en-US" dirty="0" smtClean="0">
+                <a:latin typeface="Consolas" panose="020B0609020204030204" pitchFamily="49" charset="0"/>
+                <a:cs typeface="Consolas" panose="020B0609020204030204" pitchFamily="49" charset="0"/>
+              </a:rPr>
               <a:t>  …</a:t>
             </a:r>
           </a:p>
@@ -16660,121 +17703,207 @@
               <a:buNone/>
             </a:pPr>
             <a:r>
-              <a:rPr lang="en-US" dirty="0" smtClean="0"/>
+              <a:rPr lang="en-US" dirty="0" smtClean="0">
+                <a:latin typeface="Consolas" panose="020B0609020204030204" pitchFamily="49" charset="0"/>
+                <a:cs typeface="Consolas" panose="020B0609020204030204" pitchFamily="49" charset="0"/>
+              </a:rPr>
               <a:t>  List&lt;Map&gt; </a:t>
             </a:r>
             <a:r>
-              <a:rPr lang="en-US" dirty="0" err="1"/>
+              <a:rPr lang="en-US" dirty="0" err="1">
+                <a:latin typeface="Consolas" panose="020B0609020204030204" pitchFamily="49" charset="0"/>
+                <a:cs typeface="Consolas" panose="020B0609020204030204" pitchFamily="49" charset="0"/>
+              </a:rPr>
               <a:t>myList</a:t>
             </a:r>
             <a:r>
-              <a:rPr lang="en-US" dirty="0"/>
+              <a:rPr lang="en-US" dirty="0">
+                <a:latin typeface="Consolas" panose="020B0609020204030204" pitchFamily="49" charset="0"/>
+                <a:cs typeface="Consolas" panose="020B0609020204030204" pitchFamily="49" charset="0"/>
+              </a:rPr>
               <a:t> </a:t>
             </a:r>
             <a:r>
-              <a:rPr lang="en-US" dirty="0" smtClean="0"/>
+              <a:rPr lang="en-US" dirty="0" smtClean="0">
+                <a:latin typeface="Consolas" panose="020B0609020204030204" pitchFamily="49" charset="0"/>
+                <a:cs typeface="Consolas" panose="020B0609020204030204" pitchFamily="49" charset="0"/>
+              </a:rPr>
               <a:t>= []</a:t>
             </a:r>
             <a:r>
-              <a:rPr lang="en-US" dirty="0"/>
+              <a:rPr lang="en-US" dirty="0">
+                <a:latin typeface="Consolas" panose="020B0609020204030204" pitchFamily="49" charset="0"/>
+                <a:cs typeface="Consolas" panose="020B0609020204030204" pitchFamily="49" charset="0"/>
+              </a:rPr>
               <a:t>;</a:t>
             </a:r>
             <a:br>
-              <a:rPr lang="en-US" dirty="0"/>
+              <a:rPr lang="en-US" dirty="0">
+                <a:latin typeface="Consolas" panose="020B0609020204030204" pitchFamily="49" charset="0"/>
+                <a:cs typeface="Consolas" panose="020B0609020204030204" pitchFamily="49" charset="0"/>
+              </a:rPr>
             </a:br>
             <a:r>
-              <a:rPr lang="en-US" dirty="0"/>
+              <a:rPr lang="en-US" dirty="0">
+                <a:latin typeface="Consolas" panose="020B0609020204030204" pitchFamily="49" charset="0"/>
+                <a:cs typeface="Consolas" panose="020B0609020204030204" pitchFamily="49" charset="0"/>
+              </a:rPr>
               <a:t/>
             </a:r>
             <a:br>
-              <a:rPr lang="en-US" dirty="0"/>
+              <a:rPr lang="en-US" dirty="0">
+                <a:latin typeface="Consolas" panose="020B0609020204030204" pitchFamily="49" charset="0"/>
+                <a:cs typeface="Consolas" panose="020B0609020204030204" pitchFamily="49" charset="0"/>
+              </a:rPr>
             </a:br>
             <a:r>
-              <a:rPr lang="en-US" dirty="0" smtClean="0"/>
+              <a:rPr lang="en-US" dirty="0" smtClean="0">
+                <a:latin typeface="Consolas" panose="020B0609020204030204" pitchFamily="49" charset="0"/>
+                <a:cs typeface="Consolas" panose="020B0609020204030204" pitchFamily="49" charset="0"/>
+              </a:rPr>
               <a:t>  </a:t>
             </a:r>
             <a:r>
-              <a:rPr lang="en-US" dirty="0" err="1" smtClean="0"/>
+              <a:rPr lang="en-US" dirty="0" err="1" smtClean="0">
+                <a:latin typeface="Consolas" panose="020B0609020204030204" pitchFamily="49" charset="0"/>
+                <a:cs typeface="Consolas" panose="020B0609020204030204" pitchFamily="49" charset="0"/>
+              </a:rPr>
               <a:t>MainComponent</a:t>
             </a:r>
             <a:r>
-              <a:rPr lang="en-US" dirty="0" smtClean="0"/>
+              <a:rPr lang="en-US" dirty="0" smtClean="0">
+                <a:latin typeface="Consolas" panose="020B0609020204030204" pitchFamily="49" charset="0"/>
+                <a:cs typeface="Consolas" panose="020B0609020204030204" pitchFamily="49" charset="0"/>
+              </a:rPr>
               <a:t>(</a:t>
             </a:r>
             <a:r>
-              <a:rPr lang="en-US" dirty="0" err="1" smtClean="0"/>
+              <a:rPr lang="en-US" dirty="0" err="1" smtClean="0">
+                <a:latin typeface="Consolas" panose="020B0609020204030204" pitchFamily="49" charset="0"/>
+                <a:cs typeface="Consolas" panose="020B0609020204030204" pitchFamily="49" charset="0"/>
+              </a:rPr>
               <a:t>AppService</a:t>
             </a:r>
             <a:r>
-              <a:rPr lang="en-US" dirty="0" smtClean="0"/>
+              <a:rPr lang="en-US" dirty="0" smtClean="0">
+                <a:latin typeface="Consolas" panose="020B0609020204030204" pitchFamily="49" charset="0"/>
+                <a:cs typeface="Consolas" panose="020B0609020204030204" pitchFamily="49" charset="0"/>
+              </a:rPr>
               <a:t> </a:t>
             </a:r>
             <a:r>
-              <a:rPr lang="en-US" dirty="0" err="1" smtClean="0"/>
+              <a:rPr lang="en-US" dirty="0" err="1" smtClean="0">
+                <a:latin typeface="Consolas" panose="020B0609020204030204" pitchFamily="49" charset="0"/>
+                <a:cs typeface="Consolas" panose="020B0609020204030204" pitchFamily="49" charset="0"/>
+              </a:rPr>
               <a:t>appService</a:t>
             </a:r>
             <a:r>
-              <a:rPr lang="en-US" dirty="0" smtClean="0"/>
-              <a:t>) </a:t>
-            </a:r>
-            <a:r>
-              <a:rPr lang="en-US" dirty="0" smtClean="0"/>
-              <a:t>{</a:t>
+              <a:rPr lang="en-US" dirty="0" smtClean="0">
+                <a:latin typeface="Consolas" panose="020B0609020204030204" pitchFamily="49" charset="0"/>
+                <a:cs typeface="Consolas" panose="020B0609020204030204" pitchFamily="49" charset="0"/>
+              </a:rPr>
+              <a:t>) {</a:t>
             </a:r>
             <a:br>
-              <a:rPr lang="en-US" dirty="0" smtClean="0"/>
+              <a:rPr lang="en-US" dirty="0" smtClean="0">
+                <a:latin typeface="Consolas" panose="020B0609020204030204" pitchFamily="49" charset="0"/>
+                <a:cs typeface="Consolas" panose="020B0609020204030204" pitchFamily="49" charset="0"/>
+              </a:rPr>
             </a:br>
             <a:r>
-              <a:rPr lang="en-US" dirty="0" smtClean="0"/>
+              <a:rPr lang="en-US" dirty="0" smtClean="0">
+                <a:latin typeface="Consolas" panose="020B0609020204030204" pitchFamily="49" charset="0"/>
+                <a:cs typeface="Consolas" panose="020B0609020204030204" pitchFamily="49" charset="0"/>
+              </a:rPr>
               <a:t>    </a:t>
             </a:r>
             <a:r>
-              <a:rPr lang="en-US" smtClean="0"/>
+              <a:rPr lang="en-US" dirty="0" err="1" smtClean="0">
+                <a:latin typeface="Consolas" panose="020B0609020204030204" pitchFamily="49" charset="0"/>
+                <a:cs typeface="Consolas" panose="020B0609020204030204" pitchFamily="49" charset="0"/>
+              </a:rPr>
               <a:t>appService.getData</a:t>
             </a:r>
             <a:r>
-              <a:rPr lang="en-US" dirty="0" smtClean="0"/>
+              <a:rPr lang="en-US" dirty="0" smtClean="0">
+                <a:latin typeface="Consolas" panose="020B0609020204030204" pitchFamily="49" charset="0"/>
+                <a:cs typeface="Consolas" panose="020B0609020204030204" pitchFamily="49" charset="0"/>
+              </a:rPr>
               <a:t>().then((data) {</a:t>
             </a:r>
             <a:br>
-              <a:rPr lang="en-US" dirty="0" smtClean="0"/>
+              <a:rPr lang="en-US" dirty="0" smtClean="0">
+                <a:latin typeface="Consolas" panose="020B0609020204030204" pitchFamily="49" charset="0"/>
+                <a:cs typeface="Consolas" panose="020B0609020204030204" pitchFamily="49" charset="0"/>
+              </a:rPr>
             </a:br>
             <a:r>
-              <a:rPr lang="en-US" dirty="0" smtClean="0"/>
+              <a:rPr lang="en-US" dirty="0" smtClean="0">
+                <a:latin typeface="Consolas" panose="020B0609020204030204" pitchFamily="49" charset="0"/>
+                <a:cs typeface="Consolas" panose="020B0609020204030204" pitchFamily="49" charset="0"/>
+              </a:rPr>
               <a:t>      </a:t>
             </a:r>
             <a:r>
-              <a:rPr lang="en-US" dirty="0" err="1" smtClean="0"/>
+              <a:rPr lang="en-US" dirty="0" err="1" smtClean="0">
+                <a:latin typeface="Consolas" panose="020B0609020204030204" pitchFamily="49" charset="0"/>
+                <a:cs typeface="Consolas" panose="020B0609020204030204" pitchFamily="49" charset="0"/>
+              </a:rPr>
               <a:t>myList</a:t>
             </a:r>
             <a:r>
-              <a:rPr lang="en-US" dirty="0" smtClean="0"/>
+              <a:rPr lang="en-US" dirty="0" smtClean="0">
+                <a:latin typeface="Consolas" panose="020B0609020204030204" pitchFamily="49" charset="0"/>
+                <a:cs typeface="Consolas" panose="020B0609020204030204" pitchFamily="49" charset="0"/>
+              </a:rPr>
               <a:t> = data</a:t>
             </a:r>
             <a:r>
-              <a:rPr lang="en-US" dirty="0"/>
+              <a:rPr lang="en-US" dirty="0">
+                <a:latin typeface="Consolas" panose="020B0609020204030204" pitchFamily="49" charset="0"/>
+                <a:cs typeface="Consolas" panose="020B0609020204030204" pitchFamily="49" charset="0"/>
+              </a:rPr>
               <a:t>;</a:t>
             </a:r>
             <a:br>
-              <a:rPr lang="en-US" dirty="0"/>
+              <a:rPr lang="en-US" dirty="0">
+                <a:latin typeface="Consolas" panose="020B0609020204030204" pitchFamily="49" charset="0"/>
+                <a:cs typeface="Consolas" panose="020B0609020204030204" pitchFamily="49" charset="0"/>
+              </a:rPr>
             </a:br>
             <a:r>
-              <a:rPr lang="en-US" dirty="0"/>
+              <a:rPr lang="en-US" dirty="0">
+                <a:latin typeface="Consolas" panose="020B0609020204030204" pitchFamily="49" charset="0"/>
+                <a:cs typeface="Consolas" panose="020B0609020204030204" pitchFamily="49" charset="0"/>
+              </a:rPr>
               <a:t>  </a:t>
             </a:r>
             <a:r>
-              <a:rPr lang="en-US" dirty="0" smtClean="0"/>
+              <a:rPr lang="en-US" dirty="0" smtClean="0">
+                <a:latin typeface="Consolas" panose="020B0609020204030204" pitchFamily="49" charset="0"/>
+                <a:cs typeface="Consolas" panose="020B0609020204030204" pitchFamily="49" charset="0"/>
+              </a:rPr>
               <a:t>  });</a:t>
             </a:r>
             <a:r>
-              <a:rPr lang="en-US" dirty="0"/>
+              <a:rPr lang="en-US" dirty="0">
+                <a:latin typeface="Consolas" panose="020B0609020204030204" pitchFamily="49" charset="0"/>
+                <a:cs typeface="Consolas" panose="020B0609020204030204" pitchFamily="49" charset="0"/>
+              </a:rPr>
               <a:t/>
             </a:r>
             <a:br>
-              <a:rPr lang="en-US" dirty="0"/>
+              <a:rPr lang="en-US" dirty="0">
+                <a:latin typeface="Consolas" panose="020B0609020204030204" pitchFamily="49" charset="0"/>
+                <a:cs typeface="Consolas" panose="020B0609020204030204" pitchFamily="49" charset="0"/>
+              </a:rPr>
             </a:br>
             <a:r>
-              <a:rPr lang="en-US" dirty="0" smtClean="0"/>
+              <a:rPr lang="en-US" dirty="0" smtClean="0">
+                <a:latin typeface="Consolas" panose="020B0609020204030204" pitchFamily="49" charset="0"/>
+                <a:cs typeface="Consolas" panose="020B0609020204030204" pitchFamily="49" charset="0"/>
+              </a:rPr>
               <a:t>  }</a:t>
             </a:r>
           </a:p>
@@ -16783,7 +17912,10 @@
               <a:buNone/>
             </a:pPr>
             <a:r>
-              <a:rPr lang="en-US" dirty="0" smtClean="0"/>
+              <a:rPr lang="en-US" dirty="0" smtClean="0">
+                <a:latin typeface="Consolas" panose="020B0609020204030204" pitchFamily="49" charset="0"/>
+                <a:cs typeface="Consolas" panose="020B0609020204030204" pitchFamily="49" charset="0"/>
+              </a:rPr>
               <a:t>…</a:t>
             </a:r>
           </a:p>
@@ -16792,10 +17924,16 @@
               <a:buNone/>
             </a:pPr>
             <a:r>
-              <a:rPr lang="en-US" dirty="0"/>
+              <a:rPr lang="en-US" dirty="0">
+                <a:latin typeface="Consolas" panose="020B0609020204030204" pitchFamily="49" charset="0"/>
+                <a:cs typeface="Consolas" panose="020B0609020204030204" pitchFamily="49" charset="0"/>
+              </a:rPr>
               <a:t>}</a:t>
             </a:r>
-            <a:endParaRPr lang="en-US" dirty="0" smtClean="0"/>
+            <a:endParaRPr lang="en-US" dirty="0" smtClean="0">
+              <a:latin typeface="Consolas" panose="020B0609020204030204" pitchFamily="49" charset="0"/>
+              <a:cs typeface="Consolas" panose="020B0609020204030204" pitchFamily="49" charset="0"/>
+            </a:endParaRPr>
           </a:p>
           <a:p>
             <a:pPr marL="0" indent="0">
@@ -17520,37 +18658,92 @@
               <a:buNone/>
             </a:pPr>
             <a:r>
-              <a:rPr lang="en-US" dirty="0"/>
+              <a:rPr lang="en-US" dirty="0">
+                <a:latin typeface="Consolas" panose="020B0609020204030204" pitchFamily="49" charset="0"/>
+                <a:cs typeface="Consolas" panose="020B0609020204030204" pitchFamily="49" charset="0"/>
+              </a:rPr>
               <a:t>&lt;div *</a:t>
             </a:r>
             <a:r>
-              <a:rPr lang="en-US" dirty="0" err="1"/>
+              <a:rPr lang="en-US" dirty="0" err="1">
+                <a:latin typeface="Consolas" panose="020B0609020204030204" pitchFamily="49" charset="0"/>
+                <a:cs typeface="Consolas" panose="020B0609020204030204" pitchFamily="49" charset="0"/>
+              </a:rPr>
               <a:t>ngFor</a:t>
             </a:r>
             <a:r>
-              <a:rPr lang="en-US" dirty="0"/>
+              <a:rPr lang="en-US" dirty="0">
+                <a:latin typeface="Consolas" panose="020B0609020204030204" pitchFamily="49" charset="0"/>
+                <a:cs typeface="Consolas" panose="020B0609020204030204" pitchFamily="49" charset="0"/>
+              </a:rPr>
               <a:t>="#data of </a:t>
             </a:r>
             <a:r>
-              <a:rPr lang="en-US" dirty="0" err="1"/>
+              <a:rPr lang="en-US" dirty="0" err="1">
+                <a:latin typeface="Consolas" panose="020B0609020204030204" pitchFamily="49" charset="0"/>
+                <a:cs typeface="Consolas" panose="020B0609020204030204" pitchFamily="49" charset="0"/>
+              </a:rPr>
               <a:t>myList</a:t>
             </a:r>
             <a:r>
-              <a:rPr lang="en-US" dirty="0"/>
+              <a:rPr lang="en-US" dirty="0">
+                <a:latin typeface="Consolas" panose="020B0609020204030204" pitchFamily="49" charset="0"/>
+                <a:cs typeface="Consolas" panose="020B0609020204030204" pitchFamily="49" charset="0"/>
+              </a:rPr>
               <a:t>"&gt;</a:t>
             </a:r>
             <a:br>
-              <a:rPr lang="en-US" dirty="0"/>
+              <a:rPr lang="en-US" dirty="0">
+                <a:latin typeface="Consolas" panose="020B0609020204030204" pitchFamily="49" charset="0"/>
+                <a:cs typeface="Consolas" panose="020B0609020204030204" pitchFamily="49" charset="0"/>
+              </a:rPr>
             </a:br>
             <a:r>
-              <a:rPr lang="en-US" dirty="0" smtClean="0"/>
-              <a:t>  {{ data['name'] }}</a:t>
+              <a:rPr lang="en-US" dirty="0" smtClean="0">
+                <a:latin typeface="Consolas" panose="020B0609020204030204" pitchFamily="49" charset="0"/>
+                <a:cs typeface="Consolas" panose="020B0609020204030204" pitchFamily="49" charset="0"/>
+              </a:rPr>
+              <a:t>  </a:t>
+            </a:r>
+            <a:r>
+              <a:rPr lang="en-US" dirty="0" smtClean="0">
+                <a:latin typeface="Consolas" panose="020B0609020204030204" pitchFamily="49" charset="0"/>
+                <a:cs typeface="Consolas" panose="020B0609020204030204" pitchFamily="49" charset="0"/>
+              </a:rPr>
+              <a:t>{{data</a:t>
+            </a:r>
+            <a:r>
+              <a:rPr lang="en-US" dirty="0" smtClean="0">
+                <a:latin typeface="Consolas" panose="020B0609020204030204" pitchFamily="49" charset="0"/>
+                <a:cs typeface="Consolas" panose="020B0609020204030204" pitchFamily="49" charset="0"/>
+              </a:rPr>
+              <a:t>['name</a:t>
+            </a:r>
+            <a:r>
+              <a:rPr lang="en-US" dirty="0" smtClean="0">
+                <a:latin typeface="Consolas" panose="020B0609020204030204" pitchFamily="49" charset="0"/>
+                <a:cs typeface="Consolas" panose="020B0609020204030204" pitchFamily="49" charset="0"/>
+              </a:rPr>
+              <a:t>']}}</a:t>
+            </a:r>
+            <a:r>
+              <a:rPr lang="en-US" dirty="0" smtClean="0">
+                <a:latin typeface="Consolas" panose="020B0609020204030204" pitchFamily="49" charset="0"/>
+                <a:cs typeface="Consolas" panose="020B0609020204030204" pitchFamily="49" charset="0"/>
+              </a:rPr>
+              <a:t/>
             </a:r>
             <a:br>
-              <a:rPr lang="en-US" dirty="0" smtClean="0"/>
+              <a:rPr lang="en-US" dirty="0" smtClean="0">
+                <a:latin typeface="Consolas" panose="020B0609020204030204" pitchFamily="49" charset="0"/>
+                <a:cs typeface="Consolas" panose="020B0609020204030204" pitchFamily="49" charset="0"/>
+              </a:rPr>
             </a:br>
             <a:r>
-              <a:rPr lang="en-US" dirty="0"/>
+              <a:rPr lang="en-US" dirty="0">
+                <a:latin typeface="Consolas" panose="020B0609020204030204" pitchFamily="49" charset="0"/>
+                <a:cs typeface="Consolas" panose="020B0609020204030204" pitchFamily="49" charset="0"/>
+              </a:rPr>
               <a:t>&lt;/div&gt;</a:t>
             </a:r>
           </a:p>
@@ -18379,86 +19572,152 @@
               <a:buNone/>
             </a:pPr>
             <a:r>
-              <a:rPr lang="en-US" sz="2000" dirty="0"/>
+              <a:rPr lang="en-US" sz="2000" dirty="0">
+                <a:latin typeface="Consolas" panose="020B0609020204030204" pitchFamily="49" charset="0"/>
+                <a:cs typeface="Consolas" panose="020B0609020204030204" pitchFamily="49" charset="0"/>
+              </a:rPr>
               <a:t>&lt;!DOCTYPE html&gt;</a:t>
             </a:r>
             <a:br>
-              <a:rPr lang="en-US" sz="2000" dirty="0"/>
+              <a:rPr lang="en-US" sz="2000" dirty="0">
+                <a:latin typeface="Consolas" panose="020B0609020204030204" pitchFamily="49" charset="0"/>
+                <a:cs typeface="Consolas" panose="020B0609020204030204" pitchFamily="49" charset="0"/>
+              </a:rPr>
             </a:br>
             <a:r>
-              <a:rPr lang="en-US" sz="2000" dirty="0"/>
+              <a:rPr lang="en-US" sz="2000" dirty="0">
+                <a:latin typeface="Consolas" panose="020B0609020204030204" pitchFamily="49" charset="0"/>
+                <a:cs typeface="Consolas" panose="020B0609020204030204" pitchFamily="49" charset="0"/>
+              </a:rPr>
               <a:t>&lt;html&gt;</a:t>
             </a:r>
             <a:br>
-              <a:rPr lang="en-US" sz="2000" dirty="0"/>
+              <a:rPr lang="en-US" sz="2000" dirty="0">
+                <a:latin typeface="Consolas" panose="020B0609020204030204" pitchFamily="49" charset="0"/>
+                <a:cs typeface="Consolas" panose="020B0609020204030204" pitchFamily="49" charset="0"/>
+              </a:rPr>
             </a:br>
             <a:r>
-              <a:rPr lang="en-US" sz="2000" dirty="0"/>
+              <a:rPr lang="en-US" sz="2000" dirty="0">
+                <a:latin typeface="Consolas" panose="020B0609020204030204" pitchFamily="49" charset="0"/>
+                <a:cs typeface="Consolas" panose="020B0609020204030204" pitchFamily="49" charset="0"/>
+              </a:rPr>
               <a:t>  &lt;head&gt;</a:t>
             </a:r>
             <a:br>
-              <a:rPr lang="en-US" sz="2000" dirty="0"/>
+              <a:rPr lang="en-US" sz="2000" dirty="0">
+                <a:latin typeface="Consolas" panose="020B0609020204030204" pitchFamily="49" charset="0"/>
+                <a:cs typeface="Consolas" panose="020B0609020204030204" pitchFamily="49" charset="0"/>
+              </a:rPr>
             </a:br>
             <a:r>
-              <a:rPr lang="en-US" sz="2000" dirty="0"/>
+              <a:rPr lang="en-US" sz="2000" dirty="0">
+                <a:latin typeface="Consolas" panose="020B0609020204030204" pitchFamily="49" charset="0"/>
+                <a:cs typeface="Consolas" panose="020B0609020204030204" pitchFamily="49" charset="0"/>
+              </a:rPr>
               <a:t>    &lt;</a:t>
             </a:r>
             <a:r>
-              <a:rPr lang="en-US" sz="2000" dirty="0" smtClean="0"/>
+              <a:rPr lang="en-US" sz="2000" dirty="0" smtClean="0">
+                <a:latin typeface="Consolas" panose="020B0609020204030204" pitchFamily="49" charset="0"/>
+                <a:cs typeface="Consolas" panose="020B0609020204030204" pitchFamily="49" charset="0"/>
+              </a:rPr>
               <a:t>title&gt;My Angular 2 App&lt;/</a:t>
             </a:r>
             <a:r>
-              <a:rPr lang="en-US" sz="2000" dirty="0"/>
+              <a:rPr lang="en-US" sz="2000" dirty="0">
+                <a:latin typeface="Consolas" panose="020B0609020204030204" pitchFamily="49" charset="0"/>
+                <a:cs typeface="Consolas" panose="020B0609020204030204" pitchFamily="49" charset="0"/>
+              </a:rPr>
               <a:t>title</a:t>
             </a:r>
             <a:r>
-              <a:rPr lang="en-US" sz="2000" dirty="0" smtClean="0"/>
+              <a:rPr lang="en-US" sz="2000" dirty="0" smtClean="0">
+                <a:latin typeface="Consolas" panose="020B0609020204030204" pitchFamily="49" charset="0"/>
+                <a:cs typeface="Consolas" panose="020B0609020204030204" pitchFamily="49" charset="0"/>
+              </a:rPr>
               <a:t>&gt;</a:t>
             </a:r>
             <a:r>
-              <a:rPr lang="en-US" sz="2000" dirty="0"/>
+              <a:rPr lang="en-US" sz="2000" dirty="0">
+                <a:latin typeface="Consolas" panose="020B0609020204030204" pitchFamily="49" charset="0"/>
+                <a:cs typeface="Consolas" panose="020B0609020204030204" pitchFamily="49" charset="0"/>
+              </a:rPr>
               <a:t/>
             </a:r>
             <a:br>
-              <a:rPr lang="en-US" sz="2000" dirty="0"/>
+              <a:rPr lang="en-US" sz="2000" dirty="0">
+                <a:latin typeface="Consolas" panose="020B0609020204030204" pitchFamily="49" charset="0"/>
+                <a:cs typeface="Consolas" panose="020B0609020204030204" pitchFamily="49" charset="0"/>
+              </a:rPr>
             </a:br>
             <a:r>
-              <a:rPr lang="en-US" sz="2000" dirty="0"/>
+              <a:rPr lang="en-US" sz="2000" dirty="0">
+                <a:latin typeface="Consolas" panose="020B0609020204030204" pitchFamily="49" charset="0"/>
+                <a:cs typeface="Consolas" panose="020B0609020204030204" pitchFamily="49" charset="0"/>
+              </a:rPr>
               <a:t>    &lt;script defer </a:t>
             </a:r>
             <a:r>
-              <a:rPr lang="en-US" sz="2000" dirty="0" err="1"/>
+              <a:rPr lang="en-US" sz="2000" dirty="0" err="1">
+                <a:latin typeface="Consolas" panose="020B0609020204030204" pitchFamily="49" charset="0"/>
+                <a:cs typeface="Consolas" panose="020B0609020204030204" pitchFamily="49" charset="0"/>
+              </a:rPr>
               <a:t>src</a:t>
             </a:r>
             <a:r>
-              <a:rPr lang="en-US" sz="2000" dirty="0"/>
+              <a:rPr lang="en-US" sz="2000" dirty="0">
+                <a:latin typeface="Consolas" panose="020B0609020204030204" pitchFamily="49" charset="0"/>
+                <a:cs typeface="Consolas" panose="020B0609020204030204" pitchFamily="49" charset="0"/>
+              </a:rPr>
               <a:t>="</a:t>
             </a:r>
             <a:r>
-              <a:rPr lang="en-US" sz="2000" dirty="0" err="1"/>
+              <a:rPr lang="en-US" sz="2000" dirty="0" err="1">
+                <a:latin typeface="Consolas" panose="020B0609020204030204" pitchFamily="49" charset="0"/>
+                <a:cs typeface="Consolas" panose="020B0609020204030204" pitchFamily="49" charset="0"/>
+              </a:rPr>
               <a:t>main.dart</a:t>
             </a:r>
             <a:r>
-              <a:rPr lang="en-US" sz="2000" dirty="0"/>
+              <a:rPr lang="en-US" sz="2000" dirty="0">
+                <a:latin typeface="Consolas" panose="020B0609020204030204" pitchFamily="49" charset="0"/>
+                <a:cs typeface="Consolas" panose="020B0609020204030204" pitchFamily="49" charset="0"/>
+              </a:rPr>
               <a:t>" type="application/dart"&gt;&lt;/script&gt;</a:t>
             </a:r>
             <a:br>
-              <a:rPr lang="en-US" sz="2000" dirty="0"/>
+              <a:rPr lang="en-US" sz="2000" dirty="0">
+                <a:latin typeface="Consolas" panose="020B0609020204030204" pitchFamily="49" charset="0"/>
+                <a:cs typeface="Consolas" panose="020B0609020204030204" pitchFamily="49" charset="0"/>
+              </a:rPr>
             </a:br>
             <a:r>
-              <a:rPr lang="en-US" sz="2000" dirty="0"/>
+              <a:rPr lang="en-US" sz="2000" dirty="0">
+                <a:latin typeface="Consolas" panose="020B0609020204030204" pitchFamily="49" charset="0"/>
+                <a:cs typeface="Consolas" panose="020B0609020204030204" pitchFamily="49" charset="0"/>
+              </a:rPr>
               <a:t>    &lt;script defer </a:t>
             </a:r>
             <a:r>
-              <a:rPr lang="en-US" sz="2000" dirty="0" err="1"/>
+              <a:rPr lang="en-US" sz="2000" dirty="0" err="1">
+                <a:latin typeface="Consolas" panose="020B0609020204030204" pitchFamily="49" charset="0"/>
+                <a:cs typeface="Consolas" panose="020B0609020204030204" pitchFamily="49" charset="0"/>
+              </a:rPr>
               <a:t>src</a:t>
             </a:r>
             <a:r>
-              <a:rPr lang="en-US" sz="2000" dirty="0"/>
+              <a:rPr lang="en-US" sz="2000" dirty="0">
+                <a:latin typeface="Consolas" panose="020B0609020204030204" pitchFamily="49" charset="0"/>
+                <a:cs typeface="Consolas" panose="020B0609020204030204" pitchFamily="49" charset="0"/>
+              </a:rPr>
               <a:t>="packages/browser/dart.js"&gt;&lt;/script</a:t>
             </a:r>
             <a:r>
-              <a:rPr lang="en-US" sz="2000" dirty="0" smtClean="0"/>
+              <a:rPr lang="en-US" sz="2000" dirty="0" smtClean="0">
+                <a:latin typeface="Consolas" panose="020B0609020204030204" pitchFamily="49" charset="0"/>
+                <a:cs typeface="Consolas" panose="020B0609020204030204" pitchFamily="49" charset="0"/>
+              </a:rPr>
               <a:t>&gt;</a:t>
             </a:r>
           </a:p>
@@ -18467,15 +19726,24 @@
               <a:buNone/>
             </a:pPr>
             <a:r>
-              <a:rPr lang="en-US" sz="2000" dirty="0" smtClean="0"/>
+              <a:rPr lang="en-US" sz="2000" dirty="0" smtClean="0">
+                <a:latin typeface="Consolas" panose="020B0609020204030204" pitchFamily="49" charset="0"/>
+                <a:cs typeface="Consolas" panose="020B0609020204030204" pitchFamily="49" charset="0"/>
+              </a:rPr>
               <a:t>  </a:t>
             </a:r>
             <a:r>
-              <a:rPr lang="en-US" sz="2000" dirty="0"/>
+              <a:rPr lang="en-US" sz="2000" dirty="0">
+                <a:latin typeface="Consolas" panose="020B0609020204030204" pitchFamily="49" charset="0"/>
+                <a:cs typeface="Consolas" panose="020B0609020204030204" pitchFamily="49" charset="0"/>
+              </a:rPr>
               <a:t>&lt;/head</a:t>
             </a:r>
             <a:r>
-              <a:rPr lang="en-US" sz="2000" dirty="0" smtClean="0"/>
+              <a:rPr lang="en-US" sz="2000" dirty="0" smtClean="0">
+                <a:latin typeface="Consolas" panose="020B0609020204030204" pitchFamily="49" charset="0"/>
+                <a:cs typeface="Consolas" panose="020B0609020204030204" pitchFamily="49" charset="0"/>
+              </a:rPr>
               <a:t>&gt;</a:t>
             </a:r>
           </a:p>
@@ -18484,40 +19752,70 @@
               <a:buNone/>
             </a:pPr>
             <a:r>
-              <a:rPr lang="en-US" sz="2000" dirty="0" smtClean="0"/>
+              <a:rPr lang="en-US" sz="2000" dirty="0" smtClean="0">
+                <a:latin typeface="Consolas" panose="020B0609020204030204" pitchFamily="49" charset="0"/>
+                <a:cs typeface="Consolas" panose="020B0609020204030204" pitchFamily="49" charset="0"/>
+              </a:rPr>
               <a:t>  </a:t>
             </a:r>
             <a:r>
-              <a:rPr lang="en-US" sz="2000" dirty="0"/>
+              <a:rPr lang="en-US" sz="2000" dirty="0">
+                <a:latin typeface="Consolas" panose="020B0609020204030204" pitchFamily="49" charset="0"/>
+                <a:cs typeface="Consolas" panose="020B0609020204030204" pitchFamily="49" charset="0"/>
+              </a:rPr>
               <a:t>&lt;body&gt;</a:t>
             </a:r>
             <a:br>
-              <a:rPr lang="en-US" sz="2000" dirty="0"/>
+              <a:rPr lang="en-US" sz="2000" dirty="0">
+                <a:latin typeface="Consolas" panose="020B0609020204030204" pitchFamily="49" charset="0"/>
+                <a:cs typeface="Consolas" panose="020B0609020204030204" pitchFamily="49" charset="0"/>
+              </a:rPr>
             </a:br>
             <a:r>
-              <a:rPr lang="en-US" sz="2000" dirty="0"/>
+              <a:rPr lang="en-US" sz="2000" dirty="0">
+                <a:latin typeface="Consolas" panose="020B0609020204030204" pitchFamily="49" charset="0"/>
+                <a:cs typeface="Consolas" panose="020B0609020204030204" pitchFamily="49" charset="0"/>
+              </a:rPr>
               <a:t>    &lt;my-app&gt;</a:t>
             </a:r>
             <a:r>
-              <a:rPr lang="en-US" sz="2000" dirty="0" smtClean="0"/>
+              <a:rPr lang="en-US" sz="2000" dirty="0" smtClean="0">
+                <a:latin typeface="Consolas" panose="020B0609020204030204" pitchFamily="49" charset="0"/>
+                <a:cs typeface="Consolas" panose="020B0609020204030204" pitchFamily="49" charset="0"/>
+              </a:rPr>
               <a:t>Loading...</a:t>
             </a:r>
             <a:r>
-              <a:rPr lang="en-US" sz="2000" dirty="0"/>
+              <a:rPr lang="en-US" sz="2000" dirty="0">
+                <a:latin typeface="Consolas" panose="020B0609020204030204" pitchFamily="49" charset="0"/>
+                <a:cs typeface="Consolas" panose="020B0609020204030204" pitchFamily="49" charset="0"/>
+              </a:rPr>
               <a:t>&lt;/my-app&gt;</a:t>
             </a:r>
             <a:br>
-              <a:rPr lang="en-US" sz="2000" dirty="0"/>
+              <a:rPr lang="en-US" sz="2000" dirty="0">
+                <a:latin typeface="Consolas" panose="020B0609020204030204" pitchFamily="49" charset="0"/>
+                <a:cs typeface="Consolas" panose="020B0609020204030204" pitchFamily="49" charset="0"/>
+              </a:rPr>
             </a:br>
             <a:r>
-              <a:rPr lang="en-US" sz="2000" dirty="0"/>
+              <a:rPr lang="en-US" sz="2000" dirty="0">
+                <a:latin typeface="Consolas" panose="020B0609020204030204" pitchFamily="49" charset="0"/>
+                <a:cs typeface="Consolas" panose="020B0609020204030204" pitchFamily="49" charset="0"/>
+              </a:rPr>
               <a:t>  &lt;/body&gt;</a:t>
             </a:r>
             <a:br>
-              <a:rPr lang="en-US" sz="2000" dirty="0"/>
+              <a:rPr lang="en-US" sz="2000" dirty="0">
+                <a:latin typeface="Consolas" panose="020B0609020204030204" pitchFamily="49" charset="0"/>
+                <a:cs typeface="Consolas" panose="020B0609020204030204" pitchFamily="49" charset="0"/>
+              </a:rPr>
             </a:br>
             <a:r>
-              <a:rPr lang="en-US" sz="2000" dirty="0"/>
+              <a:rPr lang="en-US" sz="2000" dirty="0">
+                <a:latin typeface="Consolas" panose="020B0609020204030204" pitchFamily="49" charset="0"/>
+                <a:cs typeface="Consolas" panose="020B0609020204030204" pitchFamily="49" charset="0"/>
+              </a:rPr>
               <a:t>&lt;/html&gt;</a:t>
             </a:r>
           </a:p>
@@ -18904,89 +20202,158 @@
               <a:buNone/>
             </a:pPr>
             <a:r>
-              <a:rPr lang="en-US" sz="2800" b="1" dirty="0"/>
+              <a:rPr lang="en-US" sz="2800" b="1" dirty="0">
+                <a:latin typeface="Consolas" panose="020B0609020204030204" pitchFamily="49" charset="0"/>
+                <a:cs typeface="Consolas" panose="020B0609020204030204" pitchFamily="49" charset="0"/>
+              </a:rPr>
               <a:t>import </a:t>
             </a:r>
             <a:r>
-              <a:rPr lang="en-US" sz="2800" dirty="0"/>
+              <a:rPr lang="en-US" sz="2800" dirty="0">
+                <a:latin typeface="Consolas" panose="020B0609020204030204" pitchFamily="49" charset="0"/>
+                <a:cs typeface="Consolas" panose="020B0609020204030204" pitchFamily="49" charset="0"/>
+              </a:rPr>
               <a:t>'package:angular2/</a:t>
             </a:r>
             <a:r>
-              <a:rPr lang="en-US" sz="2800" dirty="0" err="1"/>
+              <a:rPr lang="en-US" sz="2800" dirty="0" err="1">
+                <a:latin typeface="Consolas" panose="020B0609020204030204" pitchFamily="49" charset="0"/>
+                <a:cs typeface="Consolas" panose="020B0609020204030204" pitchFamily="49" charset="0"/>
+              </a:rPr>
               <a:t>bootstrap.dart</a:t>
             </a:r>
             <a:r>
-              <a:rPr lang="en-US" sz="2800" dirty="0" smtClean="0"/>
+              <a:rPr lang="en-US" sz="2800" dirty="0" smtClean="0">
+                <a:latin typeface="Consolas" panose="020B0609020204030204" pitchFamily="49" charset="0"/>
+                <a:cs typeface="Consolas" panose="020B0609020204030204" pitchFamily="49" charset="0"/>
+              </a:rPr>
               <a:t>';</a:t>
             </a:r>
             <a:r>
-              <a:rPr lang="en-US" sz="2800" dirty="0"/>
+              <a:rPr lang="en-US" sz="2800" dirty="0">
+                <a:latin typeface="Consolas" panose="020B0609020204030204" pitchFamily="49" charset="0"/>
+                <a:cs typeface="Consolas" panose="020B0609020204030204" pitchFamily="49" charset="0"/>
+              </a:rPr>
               <a:t/>
             </a:r>
             <a:br>
-              <a:rPr lang="en-US" sz="2800" dirty="0"/>
+              <a:rPr lang="en-US" sz="2800" dirty="0">
+                <a:latin typeface="Consolas" panose="020B0609020204030204" pitchFamily="49" charset="0"/>
+                <a:cs typeface="Consolas" panose="020B0609020204030204" pitchFamily="49" charset="0"/>
+              </a:rPr>
             </a:br>
             <a:r>
-              <a:rPr lang="en-US" sz="2800" b="1" dirty="0"/>
+              <a:rPr lang="en-US" sz="2800" b="1" dirty="0">
+                <a:latin typeface="Consolas" panose="020B0609020204030204" pitchFamily="49" charset="0"/>
+                <a:cs typeface="Consolas" panose="020B0609020204030204" pitchFamily="49" charset="0"/>
+              </a:rPr>
               <a:t>import </a:t>
             </a:r>
             <a:r>
-              <a:rPr lang="en-US" sz="2800" dirty="0" smtClean="0"/>
+              <a:rPr lang="en-US" sz="2800" dirty="0" smtClean="0">
+                <a:latin typeface="Consolas" panose="020B0609020204030204" pitchFamily="49" charset="0"/>
+                <a:cs typeface="Consolas" panose="020B0609020204030204" pitchFamily="49" charset="0"/>
+              </a:rPr>
               <a:t>'package:untitled7/</a:t>
             </a:r>
             <a:r>
-              <a:rPr lang="en-US" sz="2800" dirty="0" err="1" smtClean="0"/>
+              <a:rPr lang="en-US" sz="2800" dirty="0" err="1" smtClean="0">
+                <a:latin typeface="Consolas" panose="020B0609020204030204" pitchFamily="49" charset="0"/>
+                <a:cs typeface="Consolas" panose="020B0609020204030204" pitchFamily="49" charset="0"/>
+              </a:rPr>
               <a:t>main_component.dart</a:t>
             </a:r>
             <a:r>
-              <a:rPr lang="en-US" sz="2800" dirty="0"/>
+              <a:rPr lang="en-US" sz="2800" dirty="0">
+                <a:latin typeface="Consolas" panose="020B0609020204030204" pitchFamily="49" charset="0"/>
+                <a:cs typeface="Consolas" panose="020B0609020204030204" pitchFamily="49" charset="0"/>
+              </a:rPr>
               <a:t>';</a:t>
             </a:r>
             <a:br>
-              <a:rPr lang="en-US" sz="2800" dirty="0"/>
+              <a:rPr lang="en-US" sz="2800" dirty="0">
+                <a:latin typeface="Consolas" panose="020B0609020204030204" pitchFamily="49" charset="0"/>
+                <a:cs typeface="Consolas" panose="020B0609020204030204" pitchFamily="49" charset="0"/>
+              </a:rPr>
             </a:br>
             <a:r>
-              <a:rPr lang="en-US" sz="2800" dirty="0"/>
+              <a:rPr lang="en-US" sz="2800" dirty="0">
+                <a:latin typeface="Consolas" panose="020B0609020204030204" pitchFamily="49" charset="0"/>
+                <a:cs typeface="Consolas" panose="020B0609020204030204" pitchFamily="49" charset="0"/>
+              </a:rPr>
               <a:t/>
             </a:r>
             <a:br>
-              <a:rPr lang="en-US" sz="2800" dirty="0"/>
+              <a:rPr lang="en-US" sz="2800" dirty="0">
+                <a:latin typeface="Consolas" panose="020B0609020204030204" pitchFamily="49" charset="0"/>
+                <a:cs typeface="Consolas" panose="020B0609020204030204" pitchFamily="49" charset="0"/>
+              </a:rPr>
             </a:br>
             <a:r>
-              <a:rPr lang="en-US" sz="2800" dirty="0"/>
+              <a:rPr lang="en-US" sz="2800" dirty="0">
+                <a:latin typeface="Consolas" panose="020B0609020204030204" pitchFamily="49" charset="0"/>
+                <a:cs typeface="Consolas" panose="020B0609020204030204" pitchFamily="49" charset="0"/>
+              </a:rPr>
               <a:t>main</a:t>
             </a:r>
             <a:r>
-              <a:rPr lang="en-US" sz="2800" dirty="0" smtClean="0"/>
+              <a:rPr lang="en-US" sz="2800" dirty="0" smtClean="0">
+                <a:latin typeface="Consolas" panose="020B0609020204030204" pitchFamily="49" charset="0"/>
+                <a:cs typeface="Consolas" panose="020B0609020204030204" pitchFamily="49" charset="0"/>
+              </a:rPr>
               <a:t>() {</a:t>
             </a:r>
             <a:br>
-              <a:rPr lang="en-US" sz="2800" dirty="0" smtClean="0"/>
+              <a:rPr lang="en-US" sz="2800" dirty="0" smtClean="0">
+                <a:latin typeface="Consolas" panose="020B0609020204030204" pitchFamily="49" charset="0"/>
+                <a:cs typeface="Consolas" panose="020B0609020204030204" pitchFamily="49" charset="0"/>
+              </a:rPr>
             </a:br>
             <a:r>
-              <a:rPr lang="en-US" sz="2800" dirty="0" smtClean="0"/>
+              <a:rPr lang="en-US" sz="2800" dirty="0" smtClean="0">
+                <a:latin typeface="Consolas" panose="020B0609020204030204" pitchFamily="49" charset="0"/>
+                <a:cs typeface="Consolas" panose="020B0609020204030204" pitchFamily="49" charset="0"/>
+              </a:rPr>
               <a:t>  bootstrap(</a:t>
             </a:r>
             <a:r>
-              <a:rPr lang="en-US" sz="2800" dirty="0" err="1" smtClean="0"/>
+              <a:rPr lang="en-US" sz="2800" dirty="0" err="1" smtClean="0">
+                <a:latin typeface="Consolas" panose="020B0609020204030204" pitchFamily="49" charset="0"/>
+                <a:cs typeface="Consolas" panose="020B0609020204030204" pitchFamily="49" charset="0"/>
+              </a:rPr>
               <a:t>MainComponent</a:t>
             </a:r>
             <a:r>
-              <a:rPr lang="en-US" sz="2800" dirty="0" smtClean="0"/>
+              <a:rPr lang="en-US" sz="2800" dirty="0" smtClean="0">
+                <a:latin typeface="Consolas" panose="020B0609020204030204" pitchFamily="49" charset="0"/>
+                <a:cs typeface="Consolas" panose="020B0609020204030204" pitchFamily="49" charset="0"/>
+              </a:rPr>
               <a:t>)</a:t>
             </a:r>
             <a:r>
-              <a:rPr lang="en-US" sz="2800" dirty="0"/>
+              <a:rPr lang="en-US" sz="2800" dirty="0">
+                <a:latin typeface="Consolas" panose="020B0609020204030204" pitchFamily="49" charset="0"/>
+                <a:cs typeface="Consolas" panose="020B0609020204030204" pitchFamily="49" charset="0"/>
+              </a:rPr>
               <a:t>;</a:t>
             </a:r>
             <a:br>
-              <a:rPr lang="en-US" sz="2800" dirty="0"/>
+              <a:rPr lang="en-US" sz="2800" dirty="0">
+                <a:latin typeface="Consolas" panose="020B0609020204030204" pitchFamily="49" charset="0"/>
+                <a:cs typeface="Consolas" panose="020B0609020204030204" pitchFamily="49" charset="0"/>
+              </a:rPr>
             </a:br>
             <a:r>
-              <a:rPr lang="en-US" sz="2800" dirty="0" smtClean="0"/>
+              <a:rPr lang="en-US" sz="2800" dirty="0" smtClean="0">
+                <a:latin typeface="Consolas" panose="020B0609020204030204" pitchFamily="49" charset="0"/>
+                <a:cs typeface="Consolas" panose="020B0609020204030204" pitchFamily="49" charset="0"/>
+              </a:rPr>
               <a:t>}</a:t>
             </a:r>
-            <a:endParaRPr lang="en-US" sz="2800" dirty="0"/>
+            <a:endParaRPr lang="en-US" sz="2800" dirty="0">
+              <a:latin typeface="Consolas" panose="020B0609020204030204" pitchFamily="49" charset="0"/>
+              <a:cs typeface="Consolas" panose="020B0609020204030204" pitchFamily="49" charset="0"/>
+            </a:endParaRPr>
           </a:p>
         </p:txBody>
       </p:sp>
@@ -19197,30 +20564,44 @@
               <a:buNone/>
             </a:pPr>
             <a:r>
-              <a:rPr lang="en-US" b="1" dirty="0"/>
+              <a:rPr lang="en-US" sz="2800" b="1" dirty="0" smtClean="0">
+                <a:latin typeface="Consolas" panose="020B0609020204030204" pitchFamily="49" charset="0"/>
+                <a:cs typeface="Consolas" panose="020B0609020204030204" pitchFamily="49" charset="0"/>
+              </a:rPr>
               <a:t>import </a:t>
             </a:r>
             <a:r>
-              <a:rPr lang="en-US" dirty="0"/>
+              <a:rPr lang="en-US" sz="2800" dirty="0" smtClean="0">
+                <a:latin typeface="Consolas" panose="020B0609020204030204" pitchFamily="49" charset="0"/>
+                <a:cs typeface="Consolas" panose="020B0609020204030204" pitchFamily="49" charset="0"/>
+              </a:rPr>
               <a:t>'package:angular2/angular2.dart';</a:t>
             </a:r>
             <a:br>
-              <a:rPr lang="en-US" dirty="0"/>
+              <a:rPr lang="en-US" sz="2800" dirty="0" smtClean="0">
+                <a:latin typeface="Consolas" panose="020B0609020204030204" pitchFamily="49" charset="0"/>
+                <a:cs typeface="Consolas" panose="020B0609020204030204" pitchFamily="49" charset="0"/>
+              </a:rPr>
             </a:br>
             <a:r>
-              <a:rPr lang="en-US" dirty="0"/>
+              <a:rPr lang="en-US" sz="2800" dirty="0" smtClean="0">
+                <a:latin typeface="Consolas" panose="020B0609020204030204" pitchFamily="49" charset="0"/>
+                <a:cs typeface="Consolas" panose="020B0609020204030204" pitchFamily="49" charset="0"/>
+              </a:rPr>
               <a:t/>
             </a:r>
             <a:br>
-              <a:rPr lang="en-US" dirty="0"/>
+              <a:rPr lang="en-US" sz="2800" dirty="0" smtClean="0">
+                <a:latin typeface="Consolas" panose="020B0609020204030204" pitchFamily="49" charset="0"/>
+                <a:cs typeface="Consolas" panose="020B0609020204030204" pitchFamily="49" charset="0"/>
+              </a:rPr>
             </a:br>
             <a:r>
-              <a:rPr lang="en-US" dirty="0"/>
-              <a:t>@Component</a:t>
-            </a:r>
-            <a:r>
-              <a:rPr lang="en-US" dirty="0" smtClean="0"/>
-              <a:t>(</a:t>
+              <a:rPr lang="en-US" sz="2800" dirty="0" smtClean="0">
+                <a:latin typeface="Consolas" panose="020B0609020204030204" pitchFamily="49" charset="0"/>
+                <a:cs typeface="Consolas" panose="020B0609020204030204" pitchFamily="49" charset="0"/>
+              </a:rPr>
+              <a:t>@Component(</a:t>
             </a:r>
           </a:p>
           <a:p>
@@ -19228,29 +20609,36 @@
               <a:buNone/>
             </a:pPr>
             <a:r>
-              <a:rPr lang="en-US" dirty="0" smtClean="0"/>
-              <a:t>  selector: </a:t>
-            </a:r>
-            <a:r>
-              <a:rPr lang="en-US" dirty="0"/>
-              <a:t>'my-app', </a:t>
-            </a:r>
-            <a:endParaRPr lang="en-US" dirty="0" smtClean="0"/>
+              <a:rPr lang="en-US" sz="2800" dirty="0" smtClean="0">
+                <a:latin typeface="Consolas" panose="020B0609020204030204" pitchFamily="49" charset="0"/>
+                <a:cs typeface="Consolas" panose="020B0609020204030204" pitchFamily="49" charset="0"/>
+              </a:rPr>
+              <a:t>  selector: 'my-app', </a:t>
+            </a:r>
           </a:p>
           <a:p>
             <a:pPr marL="0" indent="0">
               <a:buNone/>
             </a:pPr>
             <a:r>
-              <a:rPr lang="en-US" dirty="0" smtClean="0"/>
+              <a:rPr lang="en-US" sz="2800" dirty="0" smtClean="0">
+                <a:latin typeface="Consolas" panose="020B0609020204030204" pitchFamily="49" charset="0"/>
+                <a:cs typeface="Consolas" panose="020B0609020204030204" pitchFamily="49" charset="0"/>
+              </a:rPr>
               <a:t>  </a:t>
             </a:r>
             <a:r>
-              <a:rPr lang="en-US" dirty="0" err="1" smtClean="0"/>
+              <a:rPr lang="en-US" sz="2800" dirty="0" err="1" smtClean="0">
+                <a:latin typeface="Consolas" panose="020B0609020204030204" pitchFamily="49" charset="0"/>
+                <a:cs typeface="Consolas" panose="020B0609020204030204" pitchFamily="49" charset="0"/>
+              </a:rPr>
               <a:t>templateUrl</a:t>
             </a:r>
             <a:r>
-              <a:rPr lang="en-US" dirty="0" smtClean="0"/>
+              <a:rPr lang="en-US" sz="2800" dirty="0" smtClean="0">
+                <a:latin typeface="Consolas" panose="020B0609020204030204" pitchFamily="49" charset="0"/>
+                <a:cs typeface="Consolas" panose="020B0609020204030204" pitchFamily="49" charset="0"/>
+              </a:rPr>
               <a:t>: ‘main_component.html')</a:t>
             </a:r>
           </a:p>
@@ -19259,25 +20647,43 @@
               <a:buNone/>
             </a:pPr>
             <a:r>
-              <a:rPr lang="en-US" dirty="0" smtClean="0"/>
+              <a:rPr lang="en-US" sz="2800" dirty="0" smtClean="0">
+                <a:latin typeface="Consolas" panose="020B0609020204030204" pitchFamily="49" charset="0"/>
+                <a:cs typeface="Consolas" panose="020B0609020204030204" pitchFamily="49" charset="0"/>
+              </a:rPr>
               <a:t/>
             </a:r>
             <a:br>
-              <a:rPr lang="en-US" dirty="0" smtClean="0"/>
+              <a:rPr lang="en-US" sz="2800" dirty="0" smtClean="0">
+                <a:latin typeface="Consolas" panose="020B0609020204030204" pitchFamily="49" charset="0"/>
+                <a:cs typeface="Consolas" panose="020B0609020204030204" pitchFamily="49" charset="0"/>
+              </a:rPr>
             </a:br>
             <a:r>
-              <a:rPr lang="en-US" b="1" dirty="0"/>
+              <a:rPr lang="en-US" sz="2800" b="1" dirty="0" smtClean="0">
+                <a:latin typeface="Consolas" panose="020B0609020204030204" pitchFamily="49" charset="0"/>
+                <a:cs typeface="Consolas" panose="020B0609020204030204" pitchFamily="49" charset="0"/>
+              </a:rPr>
               <a:t>class </a:t>
             </a:r>
             <a:r>
-              <a:rPr lang="en-US" dirty="0" err="1" smtClean="0"/>
+              <a:rPr lang="en-US" sz="2800" dirty="0" err="1" smtClean="0">
+                <a:latin typeface="Consolas" panose="020B0609020204030204" pitchFamily="49" charset="0"/>
+                <a:cs typeface="Consolas" panose="020B0609020204030204" pitchFamily="49" charset="0"/>
+              </a:rPr>
               <a:t>MainComponent</a:t>
             </a:r>
             <a:r>
-              <a:rPr lang="en-US" dirty="0" smtClean="0"/>
+              <a:rPr lang="en-US" sz="2800" dirty="0" smtClean="0">
+                <a:latin typeface="Consolas" panose="020B0609020204030204" pitchFamily="49" charset="0"/>
+                <a:cs typeface="Consolas" panose="020B0609020204030204" pitchFamily="49" charset="0"/>
+              </a:rPr>
               <a:t> {}</a:t>
             </a:r>
-            <a:endParaRPr lang="en-US" dirty="0"/>
+            <a:endParaRPr lang="en-US" sz="2800" dirty="0">
+              <a:latin typeface="Consolas" panose="020B0609020204030204" pitchFamily="49" charset="0"/>
+              <a:cs typeface="Consolas" panose="020B0609020204030204" pitchFamily="49" charset="0"/>
+            </a:endParaRPr>
           </a:p>
         </p:txBody>
       </p:sp>
@@ -19741,15 +21147,24 @@
               <a:buNone/>
             </a:pPr>
             <a:r>
-              <a:rPr lang="en-US" dirty="0"/>
+              <a:rPr lang="en-US" dirty="0">
+                <a:latin typeface="Consolas" panose="020B0609020204030204" pitchFamily="49" charset="0"/>
+                <a:cs typeface="Consolas" panose="020B0609020204030204" pitchFamily="49" charset="0"/>
+              </a:rPr>
               <a:t>&lt;h1&gt;</a:t>
             </a:r>
             <a:r>
-              <a:rPr lang="en-US" dirty="0" smtClean="0"/>
+              <a:rPr lang="en-US" dirty="0" smtClean="0">
+                <a:latin typeface="Consolas" panose="020B0609020204030204" pitchFamily="49" charset="0"/>
+                <a:cs typeface="Consolas" panose="020B0609020204030204" pitchFamily="49" charset="0"/>
+              </a:rPr>
               <a:t>My Angular 2 App</a:t>
             </a:r>
             <a:r>
-              <a:rPr lang="en-US" dirty="0"/>
+              <a:rPr lang="en-US" dirty="0">
+                <a:latin typeface="Consolas" panose="020B0609020204030204" pitchFamily="49" charset="0"/>
+                <a:cs typeface="Consolas" panose="020B0609020204030204" pitchFamily="49" charset="0"/>
+              </a:rPr>
               <a:t>&lt;/h1&gt;</a:t>
             </a:r>
           </a:p>

</xml_diff>